<commit_message>
Added the util function module.
</commit_message>
<xml_diff>
--- a/doc/designDoc.pptx
+++ b/doc/designDoc.pptx
@@ -6,6 +6,7 @@
   </p:sldMasterIdLst>
   <p:sldIdLst>
     <p:sldId id="256" r:id="rId2"/>
+    <p:sldId id="257" r:id="rId3"/>
   </p:sldIdLst>
   <p:sldSz cx="12192000" cy="6858000"/>
   <p:notesSz cx="6858000" cy="9144000"/>
@@ -261,7 +262,7 @@
           <a:p>
             <a:fld id="{CDC0ED0E-9E26-476D-92D2-B594C12CD538}" type="datetimeFigureOut">
               <a:rPr lang="en-SG" smtClean="0"/>
-              <a:t>13/8/2023</a:t>
+              <a:t>14/8/2023</a:t>
             </a:fld>
             <a:endParaRPr lang="en-SG"/>
           </a:p>
@@ -461,7 +462,7 @@
           <a:p>
             <a:fld id="{CDC0ED0E-9E26-476D-92D2-B594C12CD538}" type="datetimeFigureOut">
               <a:rPr lang="en-SG" smtClean="0"/>
-              <a:t>13/8/2023</a:t>
+              <a:t>14/8/2023</a:t>
             </a:fld>
             <a:endParaRPr lang="en-SG"/>
           </a:p>
@@ -671,7 +672,7 @@
           <a:p>
             <a:fld id="{CDC0ED0E-9E26-476D-92D2-B594C12CD538}" type="datetimeFigureOut">
               <a:rPr lang="en-SG" smtClean="0"/>
-              <a:t>13/8/2023</a:t>
+              <a:t>14/8/2023</a:t>
             </a:fld>
             <a:endParaRPr lang="en-SG"/>
           </a:p>
@@ -871,7 +872,7 @@
           <a:p>
             <a:fld id="{CDC0ED0E-9E26-476D-92D2-B594C12CD538}" type="datetimeFigureOut">
               <a:rPr lang="en-SG" smtClean="0"/>
-              <a:t>13/8/2023</a:t>
+              <a:t>14/8/2023</a:t>
             </a:fld>
             <a:endParaRPr lang="en-SG"/>
           </a:p>
@@ -1147,7 +1148,7 @@
           <a:p>
             <a:fld id="{CDC0ED0E-9E26-476D-92D2-B594C12CD538}" type="datetimeFigureOut">
               <a:rPr lang="en-SG" smtClean="0"/>
-              <a:t>13/8/2023</a:t>
+              <a:t>14/8/2023</a:t>
             </a:fld>
             <a:endParaRPr lang="en-SG"/>
           </a:p>
@@ -1415,7 +1416,7 @@
           <a:p>
             <a:fld id="{CDC0ED0E-9E26-476D-92D2-B594C12CD538}" type="datetimeFigureOut">
               <a:rPr lang="en-SG" smtClean="0"/>
-              <a:t>13/8/2023</a:t>
+              <a:t>14/8/2023</a:t>
             </a:fld>
             <a:endParaRPr lang="en-SG"/>
           </a:p>
@@ -1830,7 +1831,7 @@
           <a:p>
             <a:fld id="{CDC0ED0E-9E26-476D-92D2-B594C12CD538}" type="datetimeFigureOut">
               <a:rPr lang="en-SG" smtClean="0"/>
-              <a:t>13/8/2023</a:t>
+              <a:t>14/8/2023</a:t>
             </a:fld>
             <a:endParaRPr lang="en-SG"/>
           </a:p>
@@ -1972,7 +1973,7 @@
           <a:p>
             <a:fld id="{CDC0ED0E-9E26-476D-92D2-B594C12CD538}" type="datetimeFigureOut">
               <a:rPr lang="en-SG" smtClean="0"/>
-              <a:t>13/8/2023</a:t>
+              <a:t>14/8/2023</a:t>
             </a:fld>
             <a:endParaRPr lang="en-SG"/>
           </a:p>
@@ -2085,7 +2086,7 @@
           <a:p>
             <a:fld id="{CDC0ED0E-9E26-476D-92D2-B594C12CD538}" type="datetimeFigureOut">
               <a:rPr lang="en-SG" smtClean="0"/>
-              <a:t>13/8/2023</a:t>
+              <a:t>14/8/2023</a:t>
             </a:fld>
             <a:endParaRPr lang="en-SG"/>
           </a:p>
@@ -2398,7 +2399,7 @@
           <a:p>
             <a:fld id="{CDC0ED0E-9E26-476D-92D2-B594C12CD538}" type="datetimeFigureOut">
               <a:rPr lang="en-SG" smtClean="0"/>
-              <a:t>13/8/2023</a:t>
+              <a:t>14/8/2023</a:t>
             </a:fld>
             <a:endParaRPr lang="en-SG"/>
           </a:p>
@@ -2687,7 +2688,7 @@
           <a:p>
             <a:fld id="{CDC0ED0E-9E26-476D-92D2-B594C12CD538}" type="datetimeFigureOut">
               <a:rPr lang="en-SG" smtClean="0"/>
-              <a:t>13/8/2023</a:t>
+              <a:t>14/8/2023</a:t>
             </a:fld>
             <a:endParaRPr lang="en-SG"/>
           </a:p>
@@ -2930,7 +2931,7 @@
           <a:p>
             <a:fld id="{CDC0ED0E-9E26-476D-92D2-B594C12CD538}" type="datetimeFigureOut">
               <a:rPr lang="en-SG" smtClean="0"/>
-              <a:t>13/8/2023</a:t>
+              <a:t>14/8/2023</a:t>
             </a:fld>
             <a:endParaRPr lang="en-SG"/>
           </a:p>
@@ -5441,6 +5442,2048 @@
 </p:sld>
 </file>
 
+<file path=ppt/slides/slide2.xml><?xml version="1.0" encoding="utf-8"?>
+<p:sld xmlns:a="http://schemas.openxmlformats.org/drawingml/2006/main" xmlns:r="http://schemas.openxmlformats.org/officeDocument/2006/relationships" xmlns:p="http://schemas.openxmlformats.org/presentationml/2006/main">
+  <p:cSld>
+    <p:spTree>
+      <p:nvGrpSpPr>
+        <p:cNvPr id="1" name=""/>
+        <p:cNvGrpSpPr/>
+        <p:nvPr/>
+      </p:nvGrpSpPr>
+      <p:grpSpPr>
+        <a:xfrm>
+          <a:off x="0" y="0"/>
+          <a:ext cx="0" cy="0"/>
+          <a:chOff x="0" y="0"/>
+          <a:chExt cx="0" cy="0"/>
+        </a:xfrm>
+      </p:grpSpPr>
+      <p:sp>
+        <p:nvSpPr>
+          <p:cNvPr id="63" name="Rectangle 62">
+            <a:extLst>
+              <a:ext uri="{FF2B5EF4-FFF2-40B4-BE49-F238E27FC236}">
+                <a16:creationId xmlns:a16="http://schemas.microsoft.com/office/drawing/2014/main" id="{D2062C47-B74E-78E2-8DC3-D467EFCC1A5E}"/>
+              </a:ext>
+            </a:extLst>
+          </p:cNvPr>
+          <p:cNvSpPr/>
+          <p:nvPr/>
+        </p:nvSpPr>
+        <p:spPr>
+          <a:xfrm>
+            <a:off x="5353457" y="3825516"/>
+            <a:ext cx="1145024" cy="2426655"/>
+          </a:xfrm>
+          <a:prstGeom prst="rect">
+            <a:avLst/>
+          </a:prstGeom>
+          <a:solidFill>
+            <a:schemeClr val="accent6">
+              <a:lumMod val="20000"/>
+              <a:lumOff val="80000"/>
+            </a:schemeClr>
+          </a:solidFill>
+        </p:spPr>
+        <p:style>
+          <a:lnRef idx="2">
+            <a:schemeClr val="accent1">
+              <a:shade val="15000"/>
+            </a:schemeClr>
+          </a:lnRef>
+          <a:fillRef idx="1">
+            <a:schemeClr val="accent1"/>
+          </a:fillRef>
+          <a:effectRef idx="0">
+            <a:schemeClr val="accent1"/>
+          </a:effectRef>
+          <a:fontRef idx="minor">
+            <a:schemeClr val="lt1"/>
+          </a:fontRef>
+        </p:style>
+        <p:txBody>
+          <a:bodyPr rtlCol="0" anchor="ctr"/>
+          <a:lstStyle/>
+          <a:p>
+            <a:pPr algn="ctr"/>
+            <a:endParaRPr lang="en-SG" dirty="0"/>
+          </a:p>
+        </p:txBody>
+      </p:sp>
+      <p:sp>
+        <p:nvSpPr>
+          <p:cNvPr id="64" name="TextBox 63">
+            <a:extLst>
+              <a:ext uri="{FF2B5EF4-FFF2-40B4-BE49-F238E27FC236}">
+                <a16:creationId xmlns:a16="http://schemas.microsoft.com/office/drawing/2014/main" id="{5D8CA7B9-DD2A-D94B-4BCE-DE49100D2997}"/>
+              </a:ext>
+            </a:extLst>
+          </p:cNvPr>
+          <p:cNvSpPr txBox="1"/>
+          <p:nvPr/>
+        </p:nvSpPr>
+        <p:spPr>
+          <a:xfrm>
+            <a:off x="5338376" y="3449243"/>
+            <a:ext cx="1175184" cy="261610"/>
+          </a:xfrm>
+          <a:prstGeom prst="rect">
+            <a:avLst/>
+          </a:prstGeom>
+          <a:noFill/>
+        </p:spPr>
+        <p:txBody>
+          <a:bodyPr wrap="square">
+            <a:spAutoFit/>
+          </a:bodyPr>
+          <a:lstStyle/>
+          <a:p>
+            <a:r>
+              <a:rPr lang="en-US" sz="1100" b="1" dirty="0" err="1">
+                <a:solidFill>
+                  <a:schemeClr val="tx1">
+                    <a:lumMod val="75000"/>
+                    <a:lumOff val="25000"/>
+                  </a:schemeClr>
+                </a:solidFill>
+              </a:rPr>
+              <a:t>Pwn</a:t>
+            </a:r>
+            <a:r>
+              <a:rPr lang="en-US" sz="1100" b="1" dirty="0">
+                <a:solidFill>
+                  <a:schemeClr val="tx1">
+                    <a:lumMod val="75000"/>
+                    <a:lumOff val="25000"/>
+                  </a:schemeClr>
+                </a:solidFill>
+              </a:rPr>
+              <a:t>-Tools bank</a:t>
+            </a:r>
+            <a:endParaRPr lang="en-SG" sz="1100" b="1" dirty="0">
+              <a:solidFill>
+                <a:schemeClr val="tx1">
+                  <a:lumMod val="75000"/>
+                  <a:lumOff val="25000"/>
+                </a:schemeClr>
+              </a:solidFill>
+            </a:endParaRPr>
+          </a:p>
+        </p:txBody>
+      </p:sp>
+      <p:sp>
+        <p:nvSpPr>
+          <p:cNvPr id="4" name="Rectangle 3">
+            <a:extLst>
+              <a:ext uri="{FF2B5EF4-FFF2-40B4-BE49-F238E27FC236}">
+                <a16:creationId xmlns:a16="http://schemas.microsoft.com/office/drawing/2014/main" id="{FAFF11FF-5AA3-27EF-54EB-61813BE0A74C}"/>
+              </a:ext>
+            </a:extLst>
+          </p:cNvPr>
+          <p:cNvSpPr/>
+          <p:nvPr/>
+        </p:nvSpPr>
+        <p:spPr>
+          <a:xfrm>
+            <a:off x="2855122" y="440290"/>
+            <a:ext cx="1500496" cy="346917"/>
+          </a:xfrm>
+          <a:prstGeom prst="rect">
+            <a:avLst/>
+          </a:prstGeom>
+        </p:spPr>
+        <p:style>
+          <a:lnRef idx="2">
+            <a:schemeClr val="accent1">
+              <a:shade val="50000"/>
+            </a:schemeClr>
+          </a:lnRef>
+          <a:fillRef idx="1">
+            <a:schemeClr val="accent1"/>
+          </a:fillRef>
+          <a:effectRef idx="0">
+            <a:schemeClr val="accent1"/>
+          </a:effectRef>
+          <a:fontRef idx="minor">
+            <a:schemeClr val="lt1"/>
+          </a:fontRef>
+        </p:style>
+        <p:txBody>
+          <a:bodyPr rtlCol="0" anchor="ctr"/>
+          <a:lstStyle/>
+          <a:p>
+            <a:r>
+              <a:rPr lang="en-US" sz="1200" b="1" dirty="0"/>
+              <a:t>PWN-GPT Bot start </a:t>
+            </a:r>
+            <a:endParaRPr lang="en-SG" sz="1200" b="1" dirty="0"/>
+          </a:p>
+        </p:txBody>
+      </p:sp>
+      <p:cxnSp>
+        <p:nvCxnSpPr>
+          <p:cNvPr id="5" name="Straight Arrow Connector 4">
+            <a:extLst>
+              <a:ext uri="{FF2B5EF4-FFF2-40B4-BE49-F238E27FC236}">
+                <a16:creationId xmlns:a16="http://schemas.microsoft.com/office/drawing/2014/main" id="{A79484A5-B1CC-D6D4-941E-E2C54FD2B1B2}"/>
+              </a:ext>
+            </a:extLst>
+          </p:cNvPr>
+          <p:cNvCxnSpPr>
+            <a:cxnSpLocks/>
+          </p:cNvCxnSpPr>
+          <p:nvPr/>
+        </p:nvCxnSpPr>
+        <p:spPr>
+          <a:xfrm>
+            <a:off x="3404138" y="787207"/>
+            <a:ext cx="0" cy="303620"/>
+          </a:xfrm>
+          <a:prstGeom prst="straightConnector1">
+            <a:avLst/>
+          </a:prstGeom>
+          <a:ln w="19050">
+            <a:prstDash val="sysDash"/>
+            <a:tailEnd type="triangle"/>
+          </a:ln>
+        </p:spPr>
+        <p:style>
+          <a:lnRef idx="1">
+            <a:schemeClr val="accent1"/>
+          </a:lnRef>
+          <a:fillRef idx="0">
+            <a:schemeClr val="accent1"/>
+          </a:fillRef>
+          <a:effectRef idx="0">
+            <a:schemeClr val="accent1"/>
+          </a:effectRef>
+          <a:fontRef idx="minor">
+            <a:schemeClr val="tx1"/>
+          </a:fontRef>
+        </p:style>
+      </p:cxnSp>
+      <p:sp>
+        <p:nvSpPr>
+          <p:cNvPr id="6" name="Rectangle 5">
+            <a:extLst>
+              <a:ext uri="{FF2B5EF4-FFF2-40B4-BE49-F238E27FC236}">
+                <a16:creationId xmlns:a16="http://schemas.microsoft.com/office/drawing/2014/main" id="{C5344DDC-0597-01CF-DE60-3AE5C24E2211}"/>
+              </a:ext>
+            </a:extLst>
+          </p:cNvPr>
+          <p:cNvSpPr/>
+          <p:nvPr/>
+        </p:nvSpPr>
+        <p:spPr>
+          <a:xfrm>
+            <a:off x="2855122" y="1120977"/>
+            <a:ext cx="1515721" cy="346917"/>
+          </a:xfrm>
+          <a:prstGeom prst="rect">
+            <a:avLst/>
+          </a:prstGeom>
+        </p:spPr>
+        <p:style>
+          <a:lnRef idx="2">
+            <a:schemeClr val="accent1">
+              <a:shade val="50000"/>
+            </a:schemeClr>
+          </a:lnRef>
+          <a:fillRef idx="1">
+            <a:schemeClr val="accent1"/>
+          </a:fillRef>
+          <a:effectRef idx="0">
+            <a:schemeClr val="accent1"/>
+          </a:effectRef>
+          <a:fontRef idx="minor">
+            <a:schemeClr val="lt1"/>
+          </a:fontRef>
+        </p:style>
+        <p:txBody>
+          <a:bodyPr rtlCol="0" anchor="ctr"/>
+          <a:lstStyle/>
+          <a:p>
+            <a:r>
+              <a:rPr lang="en-US" sz="1200" b="1" dirty="0"/>
+              <a:t>Loading config files</a:t>
+            </a:r>
+            <a:endParaRPr lang="en-SG" sz="1200" b="1" dirty="0"/>
+          </a:p>
+        </p:txBody>
+      </p:sp>
+      <p:pic>
+        <p:nvPicPr>
+          <p:cNvPr id="7" name="Picture 6">
+            <a:extLst>
+              <a:ext uri="{FF2B5EF4-FFF2-40B4-BE49-F238E27FC236}">
+                <a16:creationId xmlns:a16="http://schemas.microsoft.com/office/drawing/2014/main" id="{10A7A53C-01F8-D528-A0CE-E46981718051}"/>
+              </a:ext>
+            </a:extLst>
+          </p:cNvPr>
+          <p:cNvPicPr>
+            <a:picLocks noChangeAspect="1"/>
+          </p:cNvPicPr>
+          <p:nvPr/>
+        </p:nvPicPr>
+        <p:blipFill>
+          <a:blip r:embed="rId2"/>
+          <a:stretch>
+            <a:fillRect/>
+          </a:stretch>
+        </p:blipFill>
+        <p:spPr>
+          <a:xfrm>
+            <a:off x="4813931" y="440290"/>
+            <a:ext cx="324555" cy="372004"/>
+          </a:xfrm>
+          <a:prstGeom prst="rect">
+            <a:avLst/>
+          </a:prstGeom>
+        </p:spPr>
+      </p:pic>
+      <p:cxnSp>
+        <p:nvCxnSpPr>
+          <p:cNvPr id="8" name="Connector: Elbow 7">
+            <a:extLst>
+              <a:ext uri="{FF2B5EF4-FFF2-40B4-BE49-F238E27FC236}">
+                <a16:creationId xmlns:a16="http://schemas.microsoft.com/office/drawing/2014/main" id="{E4ED5EDF-97B5-A948-AFF1-50426CFE3050}"/>
+              </a:ext>
+            </a:extLst>
+          </p:cNvPr>
+          <p:cNvCxnSpPr>
+            <a:stCxn id="7" idx="2"/>
+          </p:cNvCxnSpPr>
+          <p:nvPr/>
+        </p:nvCxnSpPr>
+        <p:spPr>
+          <a:xfrm rot="5400000">
+            <a:off x="4519185" y="663952"/>
+            <a:ext cx="308683" cy="605366"/>
+          </a:xfrm>
+          <a:prstGeom prst="bentConnector2">
+            <a:avLst/>
+          </a:prstGeom>
+          <a:ln>
+            <a:tailEnd type="triangle"/>
+          </a:ln>
+        </p:spPr>
+        <p:style>
+          <a:lnRef idx="1">
+            <a:schemeClr val="accent1"/>
+          </a:lnRef>
+          <a:fillRef idx="0">
+            <a:schemeClr val="accent1"/>
+          </a:fillRef>
+          <a:effectRef idx="0">
+            <a:schemeClr val="accent1"/>
+          </a:effectRef>
+          <a:fontRef idx="minor">
+            <a:schemeClr val="tx1"/>
+          </a:fontRef>
+        </p:style>
+      </p:cxnSp>
+      <p:sp>
+        <p:nvSpPr>
+          <p:cNvPr id="9" name="TextBox 8">
+            <a:extLst>
+              <a:ext uri="{FF2B5EF4-FFF2-40B4-BE49-F238E27FC236}">
+                <a16:creationId xmlns:a16="http://schemas.microsoft.com/office/drawing/2014/main" id="{661F3FAD-F639-FF83-6881-6D5362C1DB52}"/>
+              </a:ext>
+            </a:extLst>
+          </p:cNvPr>
+          <p:cNvSpPr txBox="1"/>
+          <p:nvPr/>
+        </p:nvSpPr>
+        <p:spPr>
+          <a:xfrm>
+            <a:off x="4539368" y="89949"/>
+            <a:ext cx="1198235" cy="400110"/>
+          </a:xfrm>
+          <a:prstGeom prst="rect">
+            <a:avLst/>
+          </a:prstGeom>
+          <a:noFill/>
+        </p:spPr>
+        <p:txBody>
+          <a:bodyPr wrap="square" rtlCol="0">
+            <a:spAutoFit/>
+          </a:bodyPr>
+          <a:lstStyle/>
+          <a:p>
+            <a:r>
+              <a:rPr lang="en-US" sz="1000" dirty="0"/>
+              <a:t>Program system config file</a:t>
+            </a:r>
+            <a:endParaRPr lang="en-SG" sz="1000" dirty="0"/>
+          </a:p>
+        </p:txBody>
+      </p:sp>
+      <p:cxnSp>
+        <p:nvCxnSpPr>
+          <p:cNvPr id="2" name="Straight Arrow Connector 1">
+            <a:extLst>
+              <a:ext uri="{FF2B5EF4-FFF2-40B4-BE49-F238E27FC236}">
+                <a16:creationId xmlns:a16="http://schemas.microsoft.com/office/drawing/2014/main" id="{16546F25-A019-B50C-EA4B-8216CAF69CF3}"/>
+              </a:ext>
+            </a:extLst>
+          </p:cNvPr>
+          <p:cNvCxnSpPr>
+            <a:cxnSpLocks/>
+          </p:cNvCxnSpPr>
+          <p:nvPr/>
+        </p:nvCxnSpPr>
+        <p:spPr>
+          <a:xfrm>
+            <a:off x="3404138" y="1467894"/>
+            <a:ext cx="0" cy="303620"/>
+          </a:xfrm>
+          <a:prstGeom prst="straightConnector1">
+            <a:avLst/>
+          </a:prstGeom>
+          <a:ln w="19050">
+            <a:prstDash val="sysDash"/>
+            <a:tailEnd type="triangle"/>
+          </a:ln>
+        </p:spPr>
+        <p:style>
+          <a:lnRef idx="1">
+            <a:schemeClr val="accent1"/>
+          </a:lnRef>
+          <a:fillRef idx="0">
+            <a:schemeClr val="accent1"/>
+          </a:fillRef>
+          <a:effectRef idx="0">
+            <a:schemeClr val="accent1"/>
+          </a:effectRef>
+          <a:fontRef idx="minor">
+            <a:schemeClr val="tx1"/>
+          </a:fontRef>
+        </p:style>
+      </p:cxnSp>
+      <p:sp>
+        <p:nvSpPr>
+          <p:cNvPr id="3" name="Rectangle 2">
+            <a:extLst>
+              <a:ext uri="{FF2B5EF4-FFF2-40B4-BE49-F238E27FC236}">
+                <a16:creationId xmlns:a16="http://schemas.microsoft.com/office/drawing/2014/main" id="{95FB41B5-50B9-2F32-1752-AEB0D103E81B}"/>
+              </a:ext>
+            </a:extLst>
+          </p:cNvPr>
+          <p:cNvSpPr/>
+          <p:nvPr/>
+        </p:nvSpPr>
+        <p:spPr>
+          <a:xfrm>
+            <a:off x="2855123" y="1771514"/>
+            <a:ext cx="1411070" cy="482479"/>
+          </a:xfrm>
+          <a:prstGeom prst="rect">
+            <a:avLst/>
+          </a:prstGeom>
+        </p:spPr>
+        <p:style>
+          <a:lnRef idx="2">
+            <a:schemeClr val="accent1">
+              <a:shade val="50000"/>
+            </a:schemeClr>
+          </a:lnRef>
+          <a:fillRef idx="1">
+            <a:schemeClr val="accent1"/>
+          </a:fillRef>
+          <a:effectRef idx="0">
+            <a:schemeClr val="accent1"/>
+          </a:effectRef>
+          <a:fontRef idx="minor">
+            <a:schemeClr val="lt1"/>
+          </a:fontRef>
+        </p:style>
+        <p:txBody>
+          <a:bodyPr rtlCol="0" anchor="ctr"/>
+          <a:lstStyle/>
+          <a:p>
+            <a:r>
+              <a:rPr lang="en-US" sz="1200" b="1" dirty="0"/>
+              <a:t>Load and CTF-</a:t>
+            </a:r>
+            <a:r>
+              <a:rPr lang="en-US" sz="1200" b="1" dirty="0" err="1"/>
+              <a:t>Pwn</a:t>
+            </a:r>
+            <a:r>
+              <a:rPr lang="en-US" sz="1200" b="1" dirty="0"/>
+              <a:t> question</a:t>
+            </a:r>
+            <a:endParaRPr lang="en-SG" sz="1200" b="1" dirty="0"/>
+          </a:p>
+        </p:txBody>
+      </p:sp>
+      <p:cxnSp>
+        <p:nvCxnSpPr>
+          <p:cNvPr id="32" name="Straight Arrow Connector 31">
+            <a:extLst>
+              <a:ext uri="{FF2B5EF4-FFF2-40B4-BE49-F238E27FC236}">
+                <a16:creationId xmlns:a16="http://schemas.microsoft.com/office/drawing/2014/main" id="{EA0BC1FA-38C7-9F58-78FA-02C6C1B5EF1B}"/>
+              </a:ext>
+            </a:extLst>
+          </p:cNvPr>
+          <p:cNvCxnSpPr>
+            <a:cxnSpLocks/>
+          </p:cNvCxnSpPr>
+          <p:nvPr/>
+        </p:nvCxnSpPr>
+        <p:spPr>
+          <a:xfrm>
+            <a:off x="3404138" y="2253993"/>
+            <a:ext cx="0" cy="303620"/>
+          </a:xfrm>
+          <a:prstGeom prst="straightConnector1">
+            <a:avLst/>
+          </a:prstGeom>
+          <a:ln w="19050">
+            <a:prstDash val="sysDash"/>
+            <a:tailEnd type="triangle"/>
+          </a:ln>
+        </p:spPr>
+        <p:style>
+          <a:lnRef idx="1">
+            <a:schemeClr val="accent1"/>
+          </a:lnRef>
+          <a:fillRef idx="0">
+            <a:schemeClr val="accent1"/>
+          </a:fillRef>
+          <a:effectRef idx="0">
+            <a:schemeClr val="accent1"/>
+          </a:effectRef>
+          <a:fontRef idx="minor">
+            <a:schemeClr val="tx1"/>
+          </a:fontRef>
+        </p:style>
+      </p:cxnSp>
+      <p:sp>
+        <p:nvSpPr>
+          <p:cNvPr id="33" name="Rectangle 32">
+            <a:extLst>
+              <a:ext uri="{FF2B5EF4-FFF2-40B4-BE49-F238E27FC236}">
+                <a16:creationId xmlns:a16="http://schemas.microsoft.com/office/drawing/2014/main" id="{EF77DB9A-4F2D-6881-4E3F-9727AA07A474}"/>
+              </a:ext>
+            </a:extLst>
+          </p:cNvPr>
+          <p:cNvSpPr/>
+          <p:nvPr/>
+        </p:nvSpPr>
+        <p:spPr>
+          <a:xfrm>
+            <a:off x="2855122" y="2597047"/>
+            <a:ext cx="1958805" cy="482479"/>
+          </a:xfrm>
+          <a:prstGeom prst="rect">
+            <a:avLst/>
+          </a:prstGeom>
+        </p:spPr>
+        <p:style>
+          <a:lnRef idx="2">
+            <a:schemeClr val="accent1">
+              <a:shade val="50000"/>
+            </a:schemeClr>
+          </a:lnRef>
+          <a:fillRef idx="1">
+            <a:schemeClr val="accent1"/>
+          </a:fillRef>
+          <a:effectRef idx="0">
+            <a:schemeClr val="accent1"/>
+          </a:effectRef>
+          <a:fontRef idx="minor">
+            <a:schemeClr val="lt1"/>
+          </a:fontRef>
+        </p:style>
+        <p:txBody>
+          <a:bodyPr rtlCol="0" anchor="ctr"/>
+          <a:lstStyle/>
+          <a:p>
+            <a:r>
+              <a:rPr lang="en-US" sz="1200" b="1" dirty="0"/>
+              <a:t>Question parser [ </a:t>
+            </a:r>
+            <a:r>
+              <a:rPr lang="en-US" sz="1200" b="1" dirty="0" err="1"/>
+              <a:t>langchain</a:t>
+            </a:r>
+            <a:r>
+              <a:rPr lang="en-US" sz="1200" b="1" dirty="0"/>
+              <a:t> + Ret2GPT]</a:t>
+            </a:r>
+            <a:endParaRPr lang="en-SG" sz="1200" b="1" dirty="0"/>
+          </a:p>
+        </p:txBody>
+      </p:sp>
+      <p:sp>
+        <p:nvSpPr>
+          <p:cNvPr id="36" name="Arrow: Left 35">
+            <a:extLst>
+              <a:ext uri="{FF2B5EF4-FFF2-40B4-BE49-F238E27FC236}">
+                <a16:creationId xmlns:a16="http://schemas.microsoft.com/office/drawing/2014/main" id="{81F71DEA-23CC-3DD7-4D6E-5A6922E5E9EE}"/>
+              </a:ext>
+            </a:extLst>
+          </p:cNvPr>
+          <p:cNvSpPr/>
+          <p:nvPr/>
+        </p:nvSpPr>
+        <p:spPr>
+          <a:xfrm>
+            <a:off x="4302375" y="1960229"/>
+            <a:ext cx="788067" cy="153408"/>
+          </a:xfrm>
+          <a:prstGeom prst="leftArrow">
+            <a:avLst/>
+          </a:prstGeom>
+        </p:spPr>
+        <p:style>
+          <a:lnRef idx="2">
+            <a:schemeClr val="accent1">
+              <a:shade val="15000"/>
+            </a:schemeClr>
+          </a:lnRef>
+          <a:fillRef idx="1">
+            <a:schemeClr val="accent1"/>
+          </a:fillRef>
+          <a:effectRef idx="0">
+            <a:schemeClr val="accent1"/>
+          </a:effectRef>
+          <a:fontRef idx="minor">
+            <a:schemeClr val="lt1"/>
+          </a:fontRef>
+        </p:style>
+        <p:txBody>
+          <a:bodyPr rtlCol="0" anchor="ctr"/>
+          <a:lstStyle/>
+          <a:p>
+            <a:pPr algn="ctr"/>
+            <a:endParaRPr lang="en-SG"/>
+          </a:p>
+        </p:txBody>
+      </p:sp>
+      <p:cxnSp>
+        <p:nvCxnSpPr>
+          <p:cNvPr id="38" name="Straight Arrow Connector 37">
+            <a:extLst>
+              <a:ext uri="{FF2B5EF4-FFF2-40B4-BE49-F238E27FC236}">
+                <a16:creationId xmlns:a16="http://schemas.microsoft.com/office/drawing/2014/main" id="{4847D2CF-23DD-9274-E06D-957FFE34978A}"/>
+              </a:ext>
+            </a:extLst>
+          </p:cNvPr>
+          <p:cNvCxnSpPr>
+            <a:cxnSpLocks/>
+            <a:stCxn id="41" idx="3"/>
+          </p:cNvCxnSpPr>
+          <p:nvPr/>
+        </p:nvCxnSpPr>
+        <p:spPr>
+          <a:xfrm>
+            <a:off x="1537445" y="1552647"/>
+            <a:ext cx="1378058" cy="1044400"/>
+          </a:xfrm>
+          <a:prstGeom prst="straightConnector1">
+            <a:avLst/>
+          </a:prstGeom>
+          <a:ln w="19050">
+            <a:solidFill>
+              <a:schemeClr val="accent6">
+                <a:lumMod val="75000"/>
+              </a:schemeClr>
+            </a:solidFill>
+            <a:headEnd type="triangle"/>
+            <a:tailEnd type="triangle"/>
+          </a:ln>
+        </p:spPr>
+        <p:style>
+          <a:lnRef idx="1">
+            <a:schemeClr val="accent1"/>
+          </a:lnRef>
+          <a:fillRef idx="0">
+            <a:schemeClr val="accent1"/>
+          </a:fillRef>
+          <a:effectRef idx="0">
+            <a:schemeClr val="accent1"/>
+          </a:effectRef>
+          <a:fontRef idx="minor">
+            <a:schemeClr val="tx1"/>
+          </a:fontRef>
+        </p:style>
+      </p:cxnSp>
+      <p:pic>
+        <p:nvPicPr>
+          <p:cNvPr id="41" name="Picture 40">
+            <a:extLst>
+              <a:ext uri="{FF2B5EF4-FFF2-40B4-BE49-F238E27FC236}">
+                <a16:creationId xmlns:a16="http://schemas.microsoft.com/office/drawing/2014/main" id="{1870F8A1-4D54-AAF0-2435-64BB8B2AF08E}"/>
+              </a:ext>
+            </a:extLst>
+          </p:cNvPr>
+          <p:cNvPicPr>
+            <a:picLocks noChangeAspect="1"/>
+          </p:cNvPicPr>
+          <p:nvPr/>
+        </p:nvPicPr>
+        <p:blipFill>
+          <a:blip r:embed="rId3"/>
+          <a:stretch>
+            <a:fillRect/>
+          </a:stretch>
+        </p:blipFill>
+        <p:spPr>
+          <a:xfrm>
+            <a:off x="870763" y="1211898"/>
+            <a:ext cx="666682" cy="681497"/>
+          </a:xfrm>
+          <a:prstGeom prst="rect">
+            <a:avLst/>
+          </a:prstGeom>
+        </p:spPr>
+      </p:pic>
+      <p:sp>
+        <p:nvSpPr>
+          <p:cNvPr id="42" name="TextBox 41">
+            <a:extLst>
+              <a:ext uri="{FF2B5EF4-FFF2-40B4-BE49-F238E27FC236}">
+                <a16:creationId xmlns:a16="http://schemas.microsoft.com/office/drawing/2014/main" id="{0118B95D-C9E9-A96B-696A-D6EE1A19FEB7}"/>
+              </a:ext>
+            </a:extLst>
+          </p:cNvPr>
+          <p:cNvSpPr txBox="1"/>
+          <p:nvPr/>
+        </p:nvSpPr>
+        <p:spPr>
+          <a:xfrm>
+            <a:off x="891450" y="915343"/>
+            <a:ext cx="910357" cy="268469"/>
+          </a:xfrm>
+          <a:prstGeom prst="rect">
+            <a:avLst/>
+          </a:prstGeom>
+          <a:noFill/>
+        </p:spPr>
+        <p:txBody>
+          <a:bodyPr wrap="square">
+            <a:spAutoFit/>
+          </a:bodyPr>
+          <a:lstStyle/>
+          <a:p>
+            <a:r>
+              <a:rPr lang="en-US" sz="1100" b="1" dirty="0">
+                <a:solidFill>
+                  <a:schemeClr val="tx1">
+                    <a:lumMod val="75000"/>
+                    <a:lumOff val="25000"/>
+                  </a:schemeClr>
+                </a:solidFill>
+              </a:rPr>
+              <a:t>OpenAI</a:t>
+            </a:r>
+            <a:endParaRPr lang="en-SG" sz="1100" b="1" dirty="0">
+              <a:solidFill>
+                <a:schemeClr val="tx1">
+                  <a:lumMod val="75000"/>
+                  <a:lumOff val="25000"/>
+                </a:schemeClr>
+              </a:solidFill>
+            </a:endParaRPr>
+          </a:p>
+        </p:txBody>
+      </p:sp>
+      <p:cxnSp>
+        <p:nvCxnSpPr>
+          <p:cNvPr id="43" name="Straight Arrow Connector 42">
+            <a:extLst>
+              <a:ext uri="{FF2B5EF4-FFF2-40B4-BE49-F238E27FC236}">
+                <a16:creationId xmlns:a16="http://schemas.microsoft.com/office/drawing/2014/main" id="{4361013E-DA89-A8CB-1CBF-EB5C274AE95F}"/>
+              </a:ext>
+            </a:extLst>
+          </p:cNvPr>
+          <p:cNvCxnSpPr>
+            <a:cxnSpLocks/>
+            <a:stCxn id="33" idx="1"/>
+            <a:endCxn id="49" idx="3"/>
+          </p:cNvCxnSpPr>
+          <p:nvPr/>
+        </p:nvCxnSpPr>
+        <p:spPr>
+          <a:xfrm flipH="1">
+            <a:off x="2464172" y="2838287"/>
+            <a:ext cx="390950" cy="0"/>
+          </a:xfrm>
+          <a:prstGeom prst="straightConnector1">
+            <a:avLst/>
+          </a:prstGeom>
+          <a:ln w="19050">
+            <a:prstDash val="sysDash"/>
+            <a:tailEnd type="triangle"/>
+          </a:ln>
+        </p:spPr>
+        <p:style>
+          <a:lnRef idx="1">
+            <a:schemeClr val="accent1"/>
+          </a:lnRef>
+          <a:fillRef idx="0">
+            <a:schemeClr val="accent1"/>
+          </a:fillRef>
+          <a:effectRef idx="0">
+            <a:schemeClr val="accent1"/>
+          </a:effectRef>
+          <a:fontRef idx="minor">
+            <a:schemeClr val="tx1"/>
+          </a:fontRef>
+        </p:style>
+      </p:cxnSp>
+      <p:sp>
+        <p:nvSpPr>
+          <p:cNvPr id="49" name="Rectangle 48">
+            <a:extLst>
+              <a:ext uri="{FF2B5EF4-FFF2-40B4-BE49-F238E27FC236}">
+                <a16:creationId xmlns:a16="http://schemas.microsoft.com/office/drawing/2014/main" id="{B6923272-2913-20CE-27D0-B258D6855585}"/>
+              </a:ext>
+            </a:extLst>
+          </p:cNvPr>
+          <p:cNvSpPr/>
+          <p:nvPr/>
+        </p:nvSpPr>
+        <p:spPr>
+          <a:xfrm>
+            <a:off x="1538824" y="2612944"/>
+            <a:ext cx="925348" cy="466581"/>
+          </a:xfrm>
+          <a:prstGeom prst="rect">
+            <a:avLst/>
+          </a:prstGeom>
+        </p:spPr>
+        <p:style>
+          <a:lnRef idx="2">
+            <a:schemeClr val="accent1">
+              <a:shade val="50000"/>
+            </a:schemeClr>
+          </a:lnRef>
+          <a:fillRef idx="1">
+            <a:schemeClr val="accent1"/>
+          </a:fillRef>
+          <a:effectRef idx="0">
+            <a:schemeClr val="accent1"/>
+          </a:effectRef>
+          <a:fontRef idx="minor">
+            <a:schemeClr val="lt1"/>
+          </a:fontRef>
+        </p:style>
+        <p:txBody>
+          <a:bodyPr rtlCol="0" anchor="ctr"/>
+          <a:lstStyle/>
+          <a:p>
+            <a:r>
+              <a:rPr lang="en-US" sz="1200" b="1" dirty="0"/>
+              <a:t>Question categorizer   </a:t>
+            </a:r>
+            <a:endParaRPr lang="en-SG" sz="1200" b="1" dirty="0"/>
+          </a:p>
+        </p:txBody>
+      </p:sp>
+      <p:cxnSp>
+        <p:nvCxnSpPr>
+          <p:cNvPr id="84" name="Straight Arrow Connector 83">
+            <a:extLst>
+              <a:ext uri="{FF2B5EF4-FFF2-40B4-BE49-F238E27FC236}">
+                <a16:creationId xmlns:a16="http://schemas.microsoft.com/office/drawing/2014/main" id="{3902F617-F716-4BB3-B07E-001F12D7C9C2}"/>
+              </a:ext>
+            </a:extLst>
+          </p:cNvPr>
+          <p:cNvCxnSpPr>
+            <a:cxnSpLocks/>
+            <a:endCxn id="49" idx="0"/>
+          </p:cNvCxnSpPr>
+          <p:nvPr/>
+        </p:nvCxnSpPr>
+        <p:spPr>
+          <a:xfrm>
+            <a:off x="1572415" y="1758404"/>
+            <a:ext cx="429083" cy="854540"/>
+          </a:xfrm>
+          <a:prstGeom prst="straightConnector1">
+            <a:avLst/>
+          </a:prstGeom>
+          <a:ln w="19050">
+            <a:solidFill>
+              <a:schemeClr val="accent6">
+                <a:lumMod val="75000"/>
+              </a:schemeClr>
+            </a:solidFill>
+            <a:headEnd type="triangle"/>
+            <a:tailEnd type="triangle"/>
+          </a:ln>
+        </p:spPr>
+        <p:style>
+          <a:lnRef idx="1">
+            <a:schemeClr val="accent1"/>
+          </a:lnRef>
+          <a:fillRef idx="0">
+            <a:schemeClr val="accent1"/>
+          </a:fillRef>
+          <a:effectRef idx="0">
+            <a:schemeClr val="accent1"/>
+          </a:effectRef>
+          <a:fontRef idx="minor">
+            <a:schemeClr val="tx1"/>
+          </a:fontRef>
+        </p:style>
+      </p:cxnSp>
+      <p:cxnSp>
+        <p:nvCxnSpPr>
+          <p:cNvPr id="89" name="Straight Arrow Connector 88">
+            <a:extLst>
+              <a:ext uri="{FF2B5EF4-FFF2-40B4-BE49-F238E27FC236}">
+                <a16:creationId xmlns:a16="http://schemas.microsoft.com/office/drawing/2014/main" id="{15DEC972-6B4C-9EF4-318E-32207AC548E6}"/>
+              </a:ext>
+            </a:extLst>
+          </p:cNvPr>
+          <p:cNvCxnSpPr>
+            <a:cxnSpLocks/>
+          </p:cNvCxnSpPr>
+          <p:nvPr/>
+        </p:nvCxnSpPr>
+        <p:spPr>
+          <a:xfrm>
+            <a:off x="3404138" y="3118960"/>
+            <a:ext cx="0" cy="599993"/>
+          </a:xfrm>
+          <a:prstGeom prst="straightConnector1">
+            <a:avLst/>
+          </a:prstGeom>
+          <a:ln w="19050">
+            <a:prstDash val="sysDash"/>
+            <a:tailEnd type="triangle"/>
+          </a:ln>
+        </p:spPr>
+        <p:style>
+          <a:lnRef idx="1">
+            <a:schemeClr val="accent1"/>
+          </a:lnRef>
+          <a:fillRef idx="0">
+            <a:schemeClr val="accent1"/>
+          </a:fillRef>
+          <a:effectRef idx="0">
+            <a:schemeClr val="accent1"/>
+          </a:effectRef>
+          <a:fontRef idx="minor">
+            <a:schemeClr val="tx1"/>
+          </a:fontRef>
+        </p:style>
+      </p:cxnSp>
+      <p:sp>
+        <p:nvSpPr>
+          <p:cNvPr id="92" name="Rectangle 91">
+            <a:extLst>
+              <a:ext uri="{FF2B5EF4-FFF2-40B4-BE49-F238E27FC236}">
+                <a16:creationId xmlns:a16="http://schemas.microsoft.com/office/drawing/2014/main" id="{CA99C8DF-840A-8294-B21C-8B3DEDACB212}"/>
+              </a:ext>
+            </a:extLst>
+          </p:cNvPr>
+          <p:cNvSpPr/>
+          <p:nvPr/>
+        </p:nvSpPr>
+        <p:spPr>
+          <a:xfrm>
+            <a:off x="2737603" y="3765188"/>
+            <a:ext cx="1958805" cy="482479"/>
+          </a:xfrm>
+          <a:prstGeom prst="rect">
+            <a:avLst/>
+          </a:prstGeom>
+        </p:spPr>
+        <p:style>
+          <a:lnRef idx="2">
+            <a:schemeClr val="accent1">
+              <a:shade val="50000"/>
+            </a:schemeClr>
+          </a:lnRef>
+          <a:fillRef idx="1">
+            <a:schemeClr val="accent1"/>
+          </a:fillRef>
+          <a:effectRef idx="0">
+            <a:schemeClr val="accent1"/>
+          </a:effectRef>
+          <a:fontRef idx="minor">
+            <a:schemeClr val="lt1"/>
+          </a:fontRef>
+        </p:style>
+        <p:txBody>
+          <a:bodyPr rtlCol="0" anchor="ctr"/>
+          <a:lstStyle/>
+          <a:p>
+            <a:r>
+              <a:rPr lang="en-US" sz="1200" b="1" dirty="0"/>
+              <a:t>Question Solver [ OpenAI + scenario prompt ]</a:t>
+            </a:r>
+            <a:endParaRPr lang="en-SG" sz="1200" b="1" dirty="0"/>
+          </a:p>
+        </p:txBody>
+      </p:sp>
+      <p:pic>
+        <p:nvPicPr>
+          <p:cNvPr id="95" name="Picture 94">
+            <a:extLst>
+              <a:ext uri="{FF2B5EF4-FFF2-40B4-BE49-F238E27FC236}">
+                <a16:creationId xmlns:a16="http://schemas.microsoft.com/office/drawing/2014/main" id="{46EE22DF-3B60-1255-3E80-5F5215F808DA}"/>
+              </a:ext>
+            </a:extLst>
+          </p:cNvPr>
+          <p:cNvPicPr>
+            <a:picLocks noChangeAspect="1"/>
+          </p:cNvPicPr>
+          <p:nvPr/>
+        </p:nvPicPr>
+        <p:blipFill>
+          <a:blip r:embed="rId2"/>
+          <a:stretch>
+            <a:fillRect/>
+          </a:stretch>
+        </p:blipFill>
+        <p:spPr>
+          <a:xfrm>
+            <a:off x="2335092" y="3255952"/>
+            <a:ext cx="324555" cy="372004"/>
+          </a:xfrm>
+          <a:prstGeom prst="rect">
+            <a:avLst/>
+          </a:prstGeom>
+        </p:spPr>
+      </p:pic>
+      <p:cxnSp>
+        <p:nvCxnSpPr>
+          <p:cNvPr id="97" name="Straight Arrow Connector 96">
+            <a:extLst>
+              <a:ext uri="{FF2B5EF4-FFF2-40B4-BE49-F238E27FC236}">
+                <a16:creationId xmlns:a16="http://schemas.microsoft.com/office/drawing/2014/main" id="{73BF6E1E-B73D-A86C-1B1E-C09A7A899787}"/>
+              </a:ext>
+            </a:extLst>
+          </p:cNvPr>
+          <p:cNvCxnSpPr>
+            <a:cxnSpLocks/>
+            <a:stCxn id="49" idx="2"/>
+          </p:cNvCxnSpPr>
+          <p:nvPr/>
+        </p:nvCxnSpPr>
+        <p:spPr>
+          <a:xfrm>
+            <a:off x="2001498" y="3079525"/>
+            <a:ext cx="1011400" cy="618439"/>
+          </a:xfrm>
+          <a:prstGeom prst="straightConnector1">
+            <a:avLst/>
+          </a:prstGeom>
+          <a:ln>
+            <a:tailEnd type="triangle"/>
+          </a:ln>
+        </p:spPr>
+        <p:style>
+          <a:lnRef idx="1">
+            <a:schemeClr val="accent1"/>
+          </a:lnRef>
+          <a:fillRef idx="0">
+            <a:schemeClr val="accent1"/>
+          </a:fillRef>
+          <a:effectRef idx="0">
+            <a:schemeClr val="accent1"/>
+          </a:effectRef>
+          <a:fontRef idx="minor">
+            <a:schemeClr val="tx1"/>
+          </a:fontRef>
+        </p:style>
+      </p:cxnSp>
+      <p:sp>
+        <p:nvSpPr>
+          <p:cNvPr id="102" name="TextBox 101">
+            <a:extLst>
+              <a:ext uri="{FF2B5EF4-FFF2-40B4-BE49-F238E27FC236}">
+                <a16:creationId xmlns:a16="http://schemas.microsoft.com/office/drawing/2014/main" id="{7A612350-E7DF-0F57-3C1C-11EA2566040E}"/>
+              </a:ext>
+            </a:extLst>
+          </p:cNvPr>
+          <p:cNvSpPr txBox="1"/>
+          <p:nvPr/>
+        </p:nvSpPr>
+        <p:spPr>
+          <a:xfrm>
+            <a:off x="1713209" y="3164955"/>
+            <a:ext cx="826719" cy="553998"/>
+          </a:xfrm>
+          <a:prstGeom prst="rect">
+            <a:avLst/>
+          </a:prstGeom>
+          <a:noFill/>
+        </p:spPr>
+        <p:txBody>
+          <a:bodyPr wrap="square" rtlCol="0">
+            <a:spAutoFit/>
+          </a:bodyPr>
+          <a:lstStyle/>
+          <a:p>
+            <a:r>
+              <a:rPr lang="en-US" sz="1000" dirty="0"/>
+              <a:t>Question scenario prompt .</a:t>
+            </a:r>
+            <a:endParaRPr lang="en-SG" sz="1000" dirty="0"/>
+          </a:p>
+        </p:txBody>
+      </p:sp>
+      <p:cxnSp>
+        <p:nvCxnSpPr>
+          <p:cNvPr id="104" name="Connector: Elbow 103">
+            <a:extLst>
+              <a:ext uri="{FF2B5EF4-FFF2-40B4-BE49-F238E27FC236}">
+                <a16:creationId xmlns:a16="http://schemas.microsoft.com/office/drawing/2014/main" id="{D09472F2-5E30-D6E1-2045-228ABB7C9100}"/>
+              </a:ext>
+            </a:extLst>
+          </p:cNvPr>
+          <p:cNvCxnSpPr>
+            <a:stCxn id="92" idx="1"/>
+            <a:endCxn id="41" idx="2"/>
+          </p:cNvCxnSpPr>
+          <p:nvPr/>
+        </p:nvCxnSpPr>
+        <p:spPr>
+          <a:xfrm rot="10800000">
+            <a:off x="1204105" y="1893396"/>
+            <a:ext cx="1533499" cy="2113033"/>
+          </a:xfrm>
+          <a:prstGeom prst="bentConnector2">
+            <a:avLst/>
+          </a:prstGeom>
+          <a:ln w="19050">
+            <a:solidFill>
+              <a:schemeClr val="accent6">
+                <a:lumMod val="75000"/>
+              </a:schemeClr>
+            </a:solidFill>
+            <a:tailEnd type="triangle"/>
+          </a:ln>
+        </p:spPr>
+        <p:style>
+          <a:lnRef idx="1">
+            <a:schemeClr val="accent1"/>
+          </a:lnRef>
+          <a:fillRef idx="0">
+            <a:schemeClr val="accent1"/>
+          </a:fillRef>
+          <a:effectRef idx="0">
+            <a:schemeClr val="accent1"/>
+          </a:effectRef>
+          <a:fontRef idx="minor">
+            <a:schemeClr val="tx1"/>
+          </a:fontRef>
+        </p:style>
+      </p:cxnSp>
+      <p:cxnSp>
+        <p:nvCxnSpPr>
+          <p:cNvPr id="10" name="Straight Arrow Connector 9">
+            <a:extLst>
+              <a:ext uri="{FF2B5EF4-FFF2-40B4-BE49-F238E27FC236}">
+                <a16:creationId xmlns:a16="http://schemas.microsoft.com/office/drawing/2014/main" id="{423417BE-E4A9-52E2-2F05-B6DBE539BC1C}"/>
+              </a:ext>
+            </a:extLst>
+          </p:cNvPr>
+          <p:cNvCxnSpPr>
+            <a:cxnSpLocks/>
+          </p:cNvCxnSpPr>
+          <p:nvPr/>
+        </p:nvCxnSpPr>
+        <p:spPr>
+          <a:xfrm>
+            <a:off x="3404138" y="4247667"/>
+            <a:ext cx="0" cy="327066"/>
+          </a:xfrm>
+          <a:prstGeom prst="straightConnector1">
+            <a:avLst/>
+          </a:prstGeom>
+          <a:ln w="19050">
+            <a:prstDash val="sysDash"/>
+            <a:tailEnd type="triangle"/>
+          </a:ln>
+        </p:spPr>
+        <p:style>
+          <a:lnRef idx="1">
+            <a:schemeClr val="accent1"/>
+          </a:lnRef>
+          <a:fillRef idx="0">
+            <a:schemeClr val="accent1"/>
+          </a:fillRef>
+          <a:effectRef idx="0">
+            <a:schemeClr val="accent1"/>
+          </a:effectRef>
+          <a:fontRef idx="minor">
+            <a:schemeClr val="tx1"/>
+          </a:fontRef>
+        </p:style>
+      </p:cxnSp>
+      <p:sp>
+        <p:nvSpPr>
+          <p:cNvPr id="14" name="Rectangle 13">
+            <a:extLst>
+              <a:ext uri="{FF2B5EF4-FFF2-40B4-BE49-F238E27FC236}">
+                <a16:creationId xmlns:a16="http://schemas.microsoft.com/office/drawing/2014/main" id="{DF1FDFD8-7326-4129-0CEB-5958BB18947C}"/>
+              </a:ext>
+            </a:extLst>
+          </p:cNvPr>
+          <p:cNvSpPr/>
+          <p:nvPr/>
+        </p:nvSpPr>
+        <p:spPr>
+          <a:xfrm>
+            <a:off x="2769576" y="4591753"/>
+            <a:ext cx="1461357" cy="327066"/>
+          </a:xfrm>
+          <a:prstGeom prst="rect">
+            <a:avLst/>
+          </a:prstGeom>
+        </p:spPr>
+        <p:style>
+          <a:lnRef idx="2">
+            <a:schemeClr val="accent1">
+              <a:shade val="50000"/>
+            </a:schemeClr>
+          </a:lnRef>
+          <a:fillRef idx="1">
+            <a:schemeClr val="accent1"/>
+          </a:fillRef>
+          <a:effectRef idx="0">
+            <a:schemeClr val="accent1"/>
+          </a:effectRef>
+          <a:fontRef idx="minor">
+            <a:schemeClr val="lt1"/>
+          </a:fontRef>
+        </p:style>
+        <p:txBody>
+          <a:bodyPr rtlCol="0" anchor="ctr"/>
+          <a:lstStyle/>
+          <a:p>
+            <a:r>
+              <a:rPr lang="en-US" sz="1200" b="1" dirty="0"/>
+              <a:t>Command executer</a:t>
+            </a:r>
+            <a:endParaRPr lang="en-SG" sz="1200" b="1" dirty="0"/>
+          </a:p>
+        </p:txBody>
+      </p:sp>
+      <p:cxnSp>
+        <p:nvCxnSpPr>
+          <p:cNvPr id="16" name="Straight Arrow Connector 15">
+            <a:extLst>
+              <a:ext uri="{FF2B5EF4-FFF2-40B4-BE49-F238E27FC236}">
+                <a16:creationId xmlns:a16="http://schemas.microsoft.com/office/drawing/2014/main" id="{666CE269-511B-1599-3445-67343C4DAEEB}"/>
+              </a:ext>
+            </a:extLst>
+          </p:cNvPr>
+          <p:cNvCxnSpPr>
+            <a:cxnSpLocks/>
+            <a:stCxn id="14" idx="3"/>
+          </p:cNvCxnSpPr>
+          <p:nvPr/>
+        </p:nvCxnSpPr>
+        <p:spPr>
+          <a:xfrm flipV="1">
+            <a:off x="4230933" y="4279392"/>
+            <a:ext cx="1145025" cy="475894"/>
+          </a:xfrm>
+          <a:prstGeom prst="straightConnector1">
+            <a:avLst/>
+          </a:prstGeom>
+          <a:ln w="19050">
+            <a:prstDash val="sysDash"/>
+            <a:tailEnd type="triangle"/>
+          </a:ln>
+        </p:spPr>
+        <p:style>
+          <a:lnRef idx="1">
+            <a:schemeClr val="accent1"/>
+          </a:lnRef>
+          <a:fillRef idx="0">
+            <a:schemeClr val="accent1"/>
+          </a:fillRef>
+          <a:effectRef idx="0">
+            <a:schemeClr val="accent1"/>
+          </a:effectRef>
+          <a:fontRef idx="minor">
+            <a:schemeClr val="tx1"/>
+          </a:fontRef>
+        </p:style>
+      </p:cxnSp>
+      <p:pic>
+        <p:nvPicPr>
+          <p:cNvPr id="39" name="Picture 38">
+            <a:extLst>
+              <a:ext uri="{FF2B5EF4-FFF2-40B4-BE49-F238E27FC236}">
+                <a16:creationId xmlns:a16="http://schemas.microsoft.com/office/drawing/2014/main" id="{AC67AA64-A34D-D690-C43F-B2943BA82B7B}"/>
+              </a:ext>
+            </a:extLst>
+          </p:cNvPr>
+          <p:cNvPicPr>
+            <a:picLocks noChangeAspect="1"/>
+          </p:cNvPicPr>
+          <p:nvPr/>
+        </p:nvPicPr>
+        <p:blipFill>
+          <a:blip r:embed="rId4"/>
+          <a:stretch>
+            <a:fillRect/>
+          </a:stretch>
+        </p:blipFill>
+        <p:spPr>
+          <a:xfrm>
+            <a:off x="5453129" y="4035833"/>
+            <a:ext cx="572798" cy="423667"/>
+          </a:xfrm>
+          <a:prstGeom prst="rect">
+            <a:avLst/>
+          </a:prstGeom>
+        </p:spPr>
+      </p:pic>
+      <p:sp>
+        <p:nvSpPr>
+          <p:cNvPr id="40" name="TextBox 39">
+            <a:extLst>
+              <a:ext uri="{FF2B5EF4-FFF2-40B4-BE49-F238E27FC236}">
+                <a16:creationId xmlns:a16="http://schemas.microsoft.com/office/drawing/2014/main" id="{F9ECA290-7587-1AE7-C261-231949C60BBB}"/>
+              </a:ext>
+            </a:extLst>
+          </p:cNvPr>
+          <p:cNvSpPr txBox="1"/>
+          <p:nvPr/>
+        </p:nvSpPr>
+        <p:spPr>
+          <a:xfrm>
+            <a:off x="5375958" y="3758834"/>
+            <a:ext cx="1100020" cy="276999"/>
+          </a:xfrm>
+          <a:prstGeom prst="rect">
+            <a:avLst/>
+          </a:prstGeom>
+          <a:noFill/>
+        </p:spPr>
+        <p:txBody>
+          <a:bodyPr wrap="square" rtlCol="0">
+            <a:spAutoFit/>
+          </a:bodyPr>
+          <a:lstStyle/>
+          <a:p>
+            <a:r>
+              <a:rPr lang="en-US" sz="1200" dirty="0" err="1"/>
+              <a:t>Py-pwntools</a:t>
+            </a:r>
+            <a:endParaRPr lang="en-SG" sz="1200" dirty="0"/>
+          </a:p>
+        </p:txBody>
+      </p:sp>
+      <p:cxnSp>
+        <p:nvCxnSpPr>
+          <p:cNvPr id="45" name="Straight Arrow Connector 44">
+            <a:extLst>
+              <a:ext uri="{FF2B5EF4-FFF2-40B4-BE49-F238E27FC236}">
+                <a16:creationId xmlns:a16="http://schemas.microsoft.com/office/drawing/2014/main" id="{9E6F7811-09C2-3C00-DD95-5645C605523B}"/>
+              </a:ext>
+            </a:extLst>
+          </p:cNvPr>
+          <p:cNvCxnSpPr>
+            <a:cxnSpLocks/>
+            <a:stCxn id="14" idx="3"/>
+          </p:cNvCxnSpPr>
+          <p:nvPr/>
+        </p:nvCxnSpPr>
+        <p:spPr>
+          <a:xfrm>
+            <a:off x="4230933" y="4755286"/>
+            <a:ext cx="1145025" cy="0"/>
+          </a:xfrm>
+          <a:prstGeom prst="straightConnector1">
+            <a:avLst/>
+          </a:prstGeom>
+          <a:ln w="19050">
+            <a:prstDash val="sysDash"/>
+            <a:tailEnd type="triangle"/>
+          </a:ln>
+        </p:spPr>
+        <p:style>
+          <a:lnRef idx="1">
+            <a:schemeClr val="accent1"/>
+          </a:lnRef>
+          <a:fillRef idx="0">
+            <a:schemeClr val="accent1"/>
+          </a:fillRef>
+          <a:effectRef idx="0">
+            <a:schemeClr val="accent1"/>
+          </a:effectRef>
+          <a:fontRef idx="minor">
+            <a:schemeClr val="tx1"/>
+          </a:fontRef>
+        </p:style>
+      </p:cxnSp>
+      <p:pic>
+        <p:nvPicPr>
+          <p:cNvPr id="51" name="Picture 50">
+            <a:extLst>
+              <a:ext uri="{FF2B5EF4-FFF2-40B4-BE49-F238E27FC236}">
+                <a16:creationId xmlns:a16="http://schemas.microsoft.com/office/drawing/2014/main" id="{BB253CDE-B525-5A0C-185E-A1ADC8494E37}"/>
+              </a:ext>
+            </a:extLst>
+          </p:cNvPr>
+          <p:cNvPicPr>
+            <a:picLocks noChangeAspect="1"/>
+          </p:cNvPicPr>
+          <p:nvPr/>
+        </p:nvPicPr>
+        <p:blipFill>
+          <a:blip r:embed="rId4"/>
+          <a:stretch>
+            <a:fillRect/>
+          </a:stretch>
+        </p:blipFill>
+        <p:spPr>
+          <a:xfrm>
+            <a:off x="5453129" y="4615177"/>
+            <a:ext cx="572798" cy="423667"/>
+          </a:xfrm>
+          <a:prstGeom prst="rect">
+            <a:avLst/>
+          </a:prstGeom>
+        </p:spPr>
+      </p:pic>
+      <p:sp>
+        <p:nvSpPr>
+          <p:cNvPr id="52" name="TextBox 51">
+            <a:extLst>
+              <a:ext uri="{FF2B5EF4-FFF2-40B4-BE49-F238E27FC236}">
+                <a16:creationId xmlns:a16="http://schemas.microsoft.com/office/drawing/2014/main" id="{045C04D2-4E33-8199-5278-C315AC68B9CB}"/>
+              </a:ext>
+            </a:extLst>
+          </p:cNvPr>
+          <p:cNvSpPr txBox="1"/>
+          <p:nvPr/>
+        </p:nvSpPr>
+        <p:spPr>
+          <a:xfrm>
+            <a:off x="5457248" y="4375082"/>
+            <a:ext cx="1100020" cy="276999"/>
+          </a:xfrm>
+          <a:prstGeom prst="rect">
+            <a:avLst/>
+          </a:prstGeom>
+          <a:noFill/>
+        </p:spPr>
+        <p:txBody>
+          <a:bodyPr wrap="square" rtlCol="0">
+            <a:spAutoFit/>
+          </a:bodyPr>
+          <a:lstStyle/>
+          <a:p>
+            <a:r>
+              <a:rPr lang="en-US" sz="1200" dirty="0"/>
+              <a:t>GDB</a:t>
+            </a:r>
+            <a:endParaRPr lang="en-SG" sz="1200" dirty="0"/>
+          </a:p>
+        </p:txBody>
+      </p:sp>
+      <p:cxnSp>
+        <p:nvCxnSpPr>
+          <p:cNvPr id="53" name="Straight Arrow Connector 52">
+            <a:extLst>
+              <a:ext uri="{FF2B5EF4-FFF2-40B4-BE49-F238E27FC236}">
+                <a16:creationId xmlns:a16="http://schemas.microsoft.com/office/drawing/2014/main" id="{95711D87-4ADC-4E28-11E8-FEF71DE495AA}"/>
+              </a:ext>
+            </a:extLst>
+          </p:cNvPr>
+          <p:cNvCxnSpPr>
+            <a:cxnSpLocks/>
+            <a:stCxn id="14" idx="3"/>
+          </p:cNvCxnSpPr>
+          <p:nvPr/>
+        </p:nvCxnSpPr>
+        <p:spPr>
+          <a:xfrm>
+            <a:off x="4230933" y="4755286"/>
+            <a:ext cx="1145025" cy="489995"/>
+          </a:xfrm>
+          <a:prstGeom prst="straightConnector1">
+            <a:avLst/>
+          </a:prstGeom>
+          <a:ln w="19050">
+            <a:prstDash val="sysDash"/>
+            <a:tailEnd type="triangle"/>
+          </a:ln>
+        </p:spPr>
+        <p:style>
+          <a:lnRef idx="1">
+            <a:schemeClr val="accent1"/>
+          </a:lnRef>
+          <a:fillRef idx="0">
+            <a:schemeClr val="accent1"/>
+          </a:fillRef>
+          <a:effectRef idx="0">
+            <a:schemeClr val="accent1"/>
+          </a:effectRef>
+          <a:fontRef idx="minor">
+            <a:schemeClr val="tx1"/>
+          </a:fontRef>
+        </p:style>
+      </p:cxnSp>
+      <p:pic>
+        <p:nvPicPr>
+          <p:cNvPr id="56" name="Picture 55">
+            <a:extLst>
+              <a:ext uri="{FF2B5EF4-FFF2-40B4-BE49-F238E27FC236}">
+                <a16:creationId xmlns:a16="http://schemas.microsoft.com/office/drawing/2014/main" id="{4DC37941-CC8F-3313-E6E9-5FCE28C844BC}"/>
+              </a:ext>
+            </a:extLst>
+          </p:cNvPr>
+          <p:cNvPicPr>
+            <a:picLocks noChangeAspect="1"/>
+          </p:cNvPicPr>
+          <p:nvPr/>
+        </p:nvPicPr>
+        <p:blipFill>
+          <a:blip r:embed="rId4"/>
+          <a:stretch>
+            <a:fillRect/>
+          </a:stretch>
+        </p:blipFill>
+        <p:spPr>
+          <a:xfrm>
+            <a:off x="5453129" y="5194521"/>
+            <a:ext cx="572798" cy="423667"/>
+          </a:xfrm>
+          <a:prstGeom prst="rect">
+            <a:avLst/>
+          </a:prstGeom>
+        </p:spPr>
+      </p:pic>
+      <p:sp>
+        <p:nvSpPr>
+          <p:cNvPr id="58" name="TextBox 57">
+            <a:extLst>
+              <a:ext uri="{FF2B5EF4-FFF2-40B4-BE49-F238E27FC236}">
+                <a16:creationId xmlns:a16="http://schemas.microsoft.com/office/drawing/2014/main" id="{9A0C0BF0-54C5-3FF2-1563-0DBBB7106A1A}"/>
+              </a:ext>
+            </a:extLst>
+          </p:cNvPr>
+          <p:cNvSpPr txBox="1"/>
+          <p:nvPr/>
+        </p:nvSpPr>
+        <p:spPr>
+          <a:xfrm>
+            <a:off x="5375958" y="4980583"/>
+            <a:ext cx="1100020" cy="276999"/>
+          </a:xfrm>
+          <a:prstGeom prst="rect">
+            <a:avLst/>
+          </a:prstGeom>
+          <a:noFill/>
+        </p:spPr>
+        <p:txBody>
+          <a:bodyPr wrap="square" rtlCol="0">
+            <a:spAutoFit/>
+          </a:bodyPr>
+          <a:lstStyle/>
+          <a:p>
+            <a:r>
+              <a:rPr lang="en-SG" sz="1200" b="0" i="0" dirty="0" err="1">
+                <a:effectLst/>
+                <a:latin typeface="Times New Roman" panose="02020603050405020304" pitchFamily="18" charset="0"/>
+                <a:hlinkClick r:id="rId5"/>
+              </a:rPr>
+              <a:t>Ghidra</a:t>
+            </a:r>
+            <a:endParaRPr lang="en-SG" sz="1200" dirty="0"/>
+          </a:p>
+        </p:txBody>
+      </p:sp>
+      <p:cxnSp>
+        <p:nvCxnSpPr>
+          <p:cNvPr id="59" name="Straight Arrow Connector 58">
+            <a:extLst>
+              <a:ext uri="{FF2B5EF4-FFF2-40B4-BE49-F238E27FC236}">
+                <a16:creationId xmlns:a16="http://schemas.microsoft.com/office/drawing/2014/main" id="{EED2E2F0-5DDC-AF2B-4A5E-83A5B469D543}"/>
+              </a:ext>
+            </a:extLst>
+          </p:cNvPr>
+          <p:cNvCxnSpPr>
+            <a:cxnSpLocks/>
+          </p:cNvCxnSpPr>
+          <p:nvPr/>
+        </p:nvCxnSpPr>
+        <p:spPr>
+          <a:xfrm>
+            <a:off x="4241414" y="4787011"/>
+            <a:ext cx="1112042" cy="1066209"/>
+          </a:xfrm>
+          <a:prstGeom prst="straightConnector1">
+            <a:avLst/>
+          </a:prstGeom>
+          <a:ln w="19050">
+            <a:prstDash val="sysDash"/>
+            <a:tailEnd type="triangle"/>
+          </a:ln>
+        </p:spPr>
+        <p:style>
+          <a:lnRef idx="1">
+            <a:schemeClr val="accent1"/>
+          </a:lnRef>
+          <a:fillRef idx="0">
+            <a:schemeClr val="accent1"/>
+          </a:fillRef>
+          <a:effectRef idx="0">
+            <a:schemeClr val="accent1"/>
+          </a:effectRef>
+          <a:fontRef idx="minor">
+            <a:schemeClr val="tx1"/>
+          </a:fontRef>
+        </p:style>
+      </p:cxnSp>
+      <p:sp>
+        <p:nvSpPr>
+          <p:cNvPr id="61" name="TextBox 60">
+            <a:extLst>
+              <a:ext uri="{FF2B5EF4-FFF2-40B4-BE49-F238E27FC236}">
+                <a16:creationId xmlns:a16="http://schemas.microsoft.com/office/drawing/2014/main" id="{7EC296EE-FFF8-FB81-1ED5-5218D15EB1F6}"/>
+              </a:ext>
+            </a:extLst>
+          </p:cNvPr>
+          <p:cNvSpPr txBox="1"/>
+          <p:nvPr/>
+        </p:nvSpPr>
+        <p:spPr>
+          <a:xfrm>
+            <a:off x="5453129" y="5556044"/>
+            <a:ext cx="1100020" cy="276999"/>
+          </a:xfrm>
+          <a:prstGeom prst="rect">
+            <a:avLst/>
+          </a:prstGeom>
+          <a:noFill/>
+        </p:spPr>
+        <p:txBody>
+          <a:bodyPr wrap="square" rtlCol="0">
+            <a:spAutoFit/>
+          </a:bodyPr>
+          <a:lstStyle/>
+          <a:p>
+            <a:r>
+              <a:rPr lang="en-US" sz="1200" dirty="0"/>
+              <a:t>radare2</a:t>
+            </a:r>
+            <a:endParaRPr lang="en-SG" sz="1200" dirty="0"/>
+          </a:p>
+        </p:txBody>
+      </p:sp>
+      <p:pic>
+        <p:nvPicPr>
+          <p:cNvPr id="62" name="Picture 61">
+            <a:extLst>
+              <a:ext uri="{FF2B5EF4-FFF2-40B4-BE49-F238E27FC236}">
+                <a16:creationId xmlns:a16="http://schemas.microsoft.com/office/drawing/2014/main" id="{7E2090A3-5564-807E-BFAA-622C5211D6BF}"/>
+              </a:ext>
+            </a:extLst>
+          </p:cNvPr>
+          <p:cNvPicPr>
+            <a:picLocks noChangeAspect="1"/>
+          </p:cNvPicPr>
+          <p:nvPr/>
+        </p:nvPicPr>
+        <p:blipFill>
+          <a:blip r:embed="rId4"/>
+          <a:stretch>
+            <a:fillRect/>
+          </a:stretch>
+        </p:blipFill>
+        <p:spPr>
+          <a:xfrm>
+            <a:off x="5453129" y="5796974"/>
+            <a:ext cx="572798" cy="423667"/>
+          </a:xfrm>
+          <a:prstGeom prst="rect">
+            <a:avLst/>
+          </a:prstGeom>
+        </p:spPr>
+      </p:pic>
+      <p:cxnSp>
+        <p:nvCxnSpPr>
+          <p:cNvPr id="65" name="Straight Arrow Connector 64">
+            <a:extLst>
+              <a:ext uri="{FF2B5EF4-FFF2-40B4-BE49-F238E27FC236}">
+                <a16:creationId xmlns:a16="http://schemas.microsoft.com/office/drawing/2014/main" id="{1A1B8CAB-E4EF-74DF-6A18-352FCC988397}"/>
+              </a:ext>
+            </a:extLst>
+          </p:cNvPr>
+          <p:cNvCxnSpPr>
+            <a:cxnSpLocks/>
+          </p:cNvCxnSpPr>
+          <p:nvPr/>
+        </p:nvCxnSpPr>
+        <p:spPr>
+          <a:xfrm flipH="1">
+            <a:off x="4266193" y="6008807"/>
+            <a:ext cx="1087263" cy="0"/>
+          </a:xfrm>
+          <a:prstGeom prst="straightConnector1">
+            <a:avLst/>
+          </a:prstGeom>
+          <a:ln w="19050">
+            <a:prstDash val="sysDash"/>
+            <a:tailEnd type="triangle"/>
+          </a:ln>
+        </p:spPr>
+        <p:style>
+          <a:lnRef idx="1">
+            <a:schemeClr val="accent1"/>
+          </a:lnRef>
+          <a:fillRef idx="0">
+            <a:schemeClr val="accent1"/>
+          </a:fillRef>
+          <a:effectRef idx="0">
+            <a:schemeClr val="accent1"/>
+          </a:effectRef>
+          <a:fontRef idx="minor">
+            <a:schemeClr val="tx1"/>
+          </a:fontRef>
+        </p:style>
+      </p:cxnSp>
+      <p:sp>
+        <p:nvSpPr>
+          <p:cNvPr id="68" name="Rectangle 67">
+            <a:extLst>
+              <a:ext uri="{FF2B5EF4-FFF2-40B4-BE49-F238E27FC236}">
+                <a16:creationId xmlns:a16="http://schemas.microsoft.com/office/drawing/2014/main" id="{8630CD24-8F6E-FD3D-3EA1-BE90AAA46A4E}"/>
+              </a:ext>
+            </a:extLst>
+          </p:cNvPr>
+          <p:cNvSpPr/>
+          <p:nvPr/>
+        </p:nvSpPr>
+        <p:spPr>
+          <a:xfrm>
+            <a:off x="2539929" y="5588314"/>
+            <a:ext cx="1677084" cy="482479"/>
+          </a:xfrm>
+          <a:prstGeom prst="rect">
+            <a:avLst/>
+          </a:prstGeom>
+        </p:spPr>
+        <p:style>
+          <a:lnRef idx="2">
+            <a:schemeClr val="accent1">
+              <a:shade val="50000"/>
+            </a:schemeClr>
+          </a:lnRef>
+          <a:fillRef idx="1">
+            <a:schemeClr val="accent1"/>
+          </a:fillRef>
+          <a:effectRef idx="0">
+            <a:schemeClr val="accent1"/>
+          </a:effectRef>
+          <a:fontRef idx="minor">
+            <a:schemeClr val="lt1"/>
+          </a:fontRef>
+        </p:style>
+        <p:txBody>
+          <a:bodyPr rtlCol="0" anchor="ctr"/>
+          <a:lstStyle/>
+          <a:p>
+            <a:r>
+              <a:rPr lang="en-US" sz="1200" b="1" dirty="0"/>
+              <a:t>Result analyzer [</a:t>
+            </a:r>
+            <a:r>
+              <a:rPr lang="en-US" sz="1200" b="1" dirty="0" err="1"/>
+              <a:t>langchain</a:t>
+            </a:r>
+            <a:r>
+              <a:rPr lang="en-US" sz="1200" b="1" dirty="0"/>
+              <a:t> + prompt] </a:t>
+            </a:r>
+            <a:endParaRPr lang="en-SG" sz="1200" b="1" dirty="0"/>
+          </a:p>
+        </p:txBody>
+      </p:sp>
+      <p:cxnSp>
+        <p:nvCxnSpPr>
+          <p:cNvPr id="69" name="Connector: Elbow 68">
+            <a:extLst>
+              <a:ext uri="{FF2B5EF4-FFF2-40B4-BE49-F238E27FC236}">
+                <a16:creationId xmlns:a16="http://schemas.microsoft.com/office/drawing/2014/main" id="{160A32B5-DE4E-1A28-1812-B6B03B9FE53C}"/>
+              </a:ext>
+            </a:extLst>
+          </p:cNvPr>
+          <p:cNvCxnSpPr>
+            <a:cxnSpLocks/>
+          </p:cNvCxnSpPr>
+          <p:nvPr/>
+        </p:nvCxnSpPr>
+        <p:spPr>
+          <a:xfrm rot="16200000" flipV="1">
+            <a:off x="-173376" y="3086079"/>
+            <a:ext cx="3903870" cy="1550295"/>
+          </a:xfrm>
+          <a:prstGeom prst="bentConnector3">
+            <a:avLst>
+              <a:gd name="adj1" fmla="val 305"/>
+            </a:avLst>
+          </a:prstGeom>
+          <a:ln w="19050">
+            <a:solidFill>
+              <a:schemeClr val="accent6">
+                <a:lumMod val="75000"/>
+              </a:schemeClr>
+            </a:solidFill>
+            <a:tailEnd type="triangle"/>
+          </a:ln>
+        </p:spPr>
+        <p:style>
+          <a:lnRef idx="1">
+            <a:schemeClr val="accent1"/>
+          </a:lnRef>
+          <a:fillRef idx="0">
+            <a:schemeClr val="accent1"/>
+          </a:fillRef>
+          <a:effectRef idx="0">
+            <a:schemeClr val="accent1"/>
+          </a:effectRef>
+          <a:fontRef idx="minor">
+            <a:schemeClr val="tx1"/>
+          </a:fontRef>
+        </p:style>
+      </p:cxnSp>
+      <p:cxnSp>
+        <p:nvCxnSpPr>
+          <p:cNvPr id="72" name="Straight Arrow Connector 71">
+            <a:extLst>
+              <a:ext uri="{FF2B5EF4-FFF2-40B4-BE49-F238E27FC236}">
+                <a16:creationId xmlns:a16="http://schemas.microsoft.com/office/drawing/2014/main" id="{4E1124A4-8337-AC29-B4BE-E29E214FA3BC}"/>
+              </a:ext>
+            </a:extLst>
+          </p:cNvPr>
+          <p:cNvCxnSpPr>
+            <a:cxnSpLocks/>
+          </p:cNvCxnSpPr>
+          <p:nvPr/>
+        </p:nvCxnSpPr>
+        <p:spPr>
+          <a:xfrm>
+            <a:off x="3136408" y="4263981"/>
+            <a:ext cx="0" cy="1292063"/>
+          </a:xfrm>
+          <a:prstGeom prst="straightConnector1">
+            <a:avLst/>
+          </a:prstGeom>
+          <a:ln w="19050">
+            <a:prstDash val="sysDash"/>
+            <a:tailEnd type="triangle"/>
+          </a:ln>
+        </p:spPr>
+        <p:style>
+          <a:lnRef idx="1">
+            <a:schemeClr val="accent1"/>
+          </a:lnRef>
+          <a:fillRef idx="0">
+            <a:schemeClr val="accent1"/>
+          </a:fillRef>
+          <a:effectRef idx="0">
+            <a:schemeClr val="accent1"/>
+          </a:effectRef>
+          <a:fontRef idx="minor">
+            <a:schemeClr val="tx1"/>
+          </a:fontRef>
+        </p:style>
+      </p:cxnSp>
+      <p:cxnSp>
+        <p:nvCxnSpPr>
+          <p:cNvPr id="76" name="Straight Arrow Connector 75">
+            <a:extLst>
+              <a:ext uri="{FF2B5EF4-FFF2-40B4-BE49-F238E27FC236}">
+                <a16:creationId xmlns:a16="http://schemas.microsoft.com/office/drawing/2014/main" id="{AE9F04DD-E147-5682-21BB-1D59C70976D8}"/>
+              </a:ext>
+            </a:extLst>
+          </p:cNvPr>
+          <p:cNvCxnSpPr>
+            <a:cxnSpLocks/>
+          </p:cNvCxnSpPr>
+          <p:nvPr/>
+        </p:nvCxnSpPr>
+        <p:spPr>
+          <a:xfrm>
+            <a:off x="3378471" y="6057108"/>
+            <a:ext cx="0" cy="327066"/>
+          </a:xfrm>
+          <a:prstGeom prst="straightConnector1">
+            <a:avLst/>
+          </a:prstGeom>
+          <a:ln w="19050">
+            <a:prstDash val="sysDash"/>
+            <a:tailEnd type="triangle"/>
+          </a:ln>
+        </p:spPr>
+        <p:style>
+          <a:lnRef idx="1">
+            <a:schemeClr val="accent1"/>
+          </a:lnRef>
+          <a:fillRef idx="0">
+            <a:schemeClr val="accent1"/>
+          </a:fillRef>
+          <a:effectRef idx="0">
+            <a:schemeClr val="accent1"/>
+          </a:effectRef>
+          <a:fontRef idx="minor">
+            <a:schemeClr val="tx1"/>
+          </a:fontRef>
+        </p:style>
+      </p:cxnSp>
+      <p:pic>
+        <p:nvPicPr>
+          <p:cNvPr id="77" name="Picture 76">
+            <a:extLst>
+              <a:ext uri="{FF2B5EF4-FFF2-40B4-BE49-F238E27FC236}">
+                <a16:creationId xmlns:a16="http://schemas.microsoft.com/office/drawing/2014/main" id="{B8442164-E5E5-AC2B-8168-85544F336079}"/>
+              </a:ext>
+            </a:extLst>
+          </p:cNvPr>
+          <p:cNvPicPr>
+            <a:picLocks noChangeAspect="1"/>
+          </p:cNvPicPr>
+          <p:nvPr/>
+        </p:nvPicPr>
+        <p:blipFill>
+          <a:blip r:embed="rId2"/>
+          <a:stretch>
+            <a:fillRect/>
+          </a:stretch>
+        </p:blipFill>
+        <p:spPr>
+          <a:xfrm>
+            <a:off x="3310152" y="6365372"/>
+            <a:ext cx="324555" cy="372004"/>
+          </a:xfrm>
+          <a:prstGeom prst="rect">
+            <a:avLst/>
+          </a:prstGeom>
+        </p:spPr>
+      </p:pic>
+      <p:sp>
+        <p:nvSpPr>
+          <p:cNvPr id="78" name="TextBox 77">
+            <a:extLst>
+              <a:ext uri="{FF2B5EF4-FFF2-40B4-BE49-F238E27FC236}">
+                <a16:creationId xmlns:a16="http://schemas.microsoft.com/office/drawing/2014/main" id="{260CAE57-2C87-15FE-85AF-DB819CEBA9AE}"/>
+              </a:ext>
+            </a:extLst>
+          </p:cNvPr>
+          <p:cNvSpPr txBox="1"/>
+          <p:nvPr/>
+        </p:nvSpPr>
+        <p:spPr>
+          <a:xfrm>
+            <a:off x="3584018" y="6428263"/>
+            <a:ext cx="1229909" cy="246221"/>
+          </a:xfrm>
+          <a:prstGeom prst="rect">
+            <a:avLst/>
+          </a:prstGeom>
+          <a:noFill/>
+        </p:spPr>
+        <p:txBody>
+          <a:bodyPr wrap="square" rtlCol="0">
+            <a:spAutoFit/>
+          </a:bodyPr>
+          <a:lstStyle/>
+          <a:p>
+            <a:r>
+              <a:rPr lang="en-US" sz="1000" dirty="0"/>
+              <a:t>Possible Flag</a:t>
+            </a:r>
+            <a:endParaRPr lang="en-SG" sz="1000" dirty="0"/>
+          </a:p>
+        </p:txBody>
+      </p:sp>
+      <p:pic>
+        <p:nvPicPr>
+          <p:cNvPr id="79" name="Picture 78">
+            <a:extLst>
+              <a:ext uri="{FF2B5EF4-FFF2-40B4-BE49-F238E27FC236}">
+                <a16:creationId xmlns:a16="http://schemas.microsoft.com/office/drawing/2014/main" id="{EA1975AF-A717-D692-2681-FBC5CF00E60B}"/>
+              </a:ext>
+            </a:extLst>
+          </p:cNvPr>
+          <p:cNvPicPr>
+            <a:picLocks noChangeAspect="1"/>
+          </p:cNvPicPr>
+          <p:nvPr/>
+        </p:nvPicPr>
+        <p:blipFill>
+          <a:blip r:embed="rId2"/>
+          <a:stretch>
+            <a:fillRect/>
+          </a:stretch>
+        </p:blipFill>
+        <p:spPr>
+          <a:xfrm>
+            <a:off x="5191178" y="1808360"/>
+            <a:ext cx="324555" cy="372004"/>
+          </a:xfrm>
+          <a:prstGeom prst="rect">
+            <a:avLst/>
+          </a:prstGeom>
+        </p:spPr>
+      </p:pic>
+      <p:sp>
+        <p:nvSpPr>
+          <p:cNvPr id="80" name="TextBox 79">
+            <a:extLst>
+              <a:ext uri="{FF2B5EF4-FFF2-40B4-BE49-F238E27FC236}">
+                <a16:creationId xmlns:a16="http://schemas.microsoft.com/office/drawing/2014/main" id="{8D8534C0-0BF1-937B-D379-2440DB614414}"/>
+              </a:ext>
+            </a:extLst>
+          </p:cNvPr>
+          <p:cNvSpPr txBox="1"/>
+          <p:nvPr/>
+        </p:nvSpPr>
+        <p:spPr>
+          <a:xfrm>
+            <a:off x="4976208" y="1575035"/>
+            <a:ext cx="1229909" cy="246221"/>
+          </a:xfrm>
+          <a:prstGeom prst="rect">
+            <a:avLst/>
+          </a:prstGeom>
+          <a:noFill/>
+        </p:spPr>
+        <p:txBody>
+          <a:bodyPr wrap="square" rtlCol="0">
+            <a:spAutoFit/>
+          </a:bodyPr>
+          <a:lstStyle/>
+          <a:p>
+            <a:r>
+              <a:rPr lang="en-US" sz="1000" dirty="0"/>
+              <a:t>Question and file</a:t>
+            </a:r>
+            <a:endParaRPr lang="en-SG" sz="1000" dirty="0"/>
+          </a:p>
+        </p:txBody>
+      </p:sp>
+    </p:spTree>
+    <p:extLst>
+      <p:ext uri="{BB962C8B-B14F-4D97-AF65-F5344CB8AC3E}">
+        <p14:creationId xmlns:p14="http://schemas.microsoft.com/office/powerpoint/2010/main" val="3202790184"/>
+      </p:ext>
+    </p:extLst>
+  </p:cSld>
+  <p:clrMapOvr>
+    <a:masterClrMapping/>
+  </p:clrMapOvr>
+</p:sld>
+</file>
+
 <file path=ppt/theme/theme1.xml><?xml version="1.0" encoding="utf-8"?>
 <a:theme xmlns:a="http://schemas.openxmlformats.org/drawingml/2006/main" name="Office Theme">
   <a:themeElements>

</xml_diff>

<commit_message>
Added the prompt repo
</commit_message>
<xml_diff>
--- a/doc/designDoc.pptx
+++ b/doc/designDoc.pptx
@@ -263,7 +263,7 @@
           <a:p>
             <a:fld id="{CDC0ED0E-9E26-476D-92D2-B594C12CD538}" type="datetimeFigureOut">
               <a:rPr lang="en-SG" smtClean="0"/>
-              <a:t>15/8/2023</a:t>
+              <a:t>21/8/2023</a:t>
             </a:fld>
             <a:endParaRPr lang="en-SG"/>
           </a:p>
@@ -463,7 +463,7 @@
           <a:p>
             <a:fld id="{CDC0ED0E-9E26-476D-92D2-B594C12CD538}" type="datetimeFigureOut">
               <a:rPr lang="en-SG" smtClean="0"/>
-              <a:t>15/8/2023</a:t>
+              <a:t>21/8/2023</a:t>
             </a:fld>
             <a:endParaRPr lang="en-SG"/>
           </a:p>
@@ -673,7 +673,7 @@
           <a:p>
             <a:fld id="{CDC0ED0E-9E26-476D-92D2-B594C12CD538}" type="datetimeFigureOut">
               <a:rPr lang="en-SG" smtClean="0"/>
-              <a:t>15/8/2023</a:t>
+              <a:t>21/8/2023</a:t>
             </a:fld>
             <a:endParaRPr lang="en-SG"/>
           </a:p>
@@ -873,7 +873,7 @@
           <a:p>
             <a:fld id="{CDC0ED0E-9E26-476D-92D2-B594C12CD538}" type="datetimeFigureOut">
               <a:rPr lang="en-SG" smtClean="0"/>
-              <a:t>15/8/2023</a:t>
+              <a:t>21/8/2023</a:t>
             </a:fld>
             <a:endParaRPr lang="en-SG"/>
           </a:p>
@@ -1149,7 +1149,7 @@
           <a:p>
             <a:fld id="{CDC0ED0E-9E26-476D-92D2-B594C12CD538}" type="datetimeFigureOut">
               <a:rPr lang="en-SG" smtClean="0"/>
-              <a:t>15/8/2023</a:t>
+              <a:t>21/8/2023</a:t>
             </a:fld>
             <a:endParaRPr lang="en-SG"/>
           </a:p>
@@ -1417,7 +1417,7 @@
           <a:p>
             <a:fld id="{CDC0ED0E-9E26-476D-92D2-B594C12CD538}" type="datetimeFigureOut">
               <a:rPr lang="en-SG" smtClean="0"/>
-              <a:t>15/8/2023</a:t>
+              <a:t>21/8/2023</a:t>
             </a:fld>
             <a:endParaRPr lang="en-SG"/>
           </a:p>
@@ -1832,7 +1832,7 @@
           <a:p>
             <a:fld id="{CDC0ED0E-9E26-476D-92D2-B594C12CD538}" type="datetimeFigureOut">
               <a:rPr lang="en-SG" smtClean="0"/>
-              <a:t>15/8/2023</a:t>
+              <a:t>21/8/2023</a:t>
             </a:fld>
             <a:endParaRPr lang="en-SG"/>
           </a:p>
@@ -1974,7 +1974,7 @@
           <a:p>
             <a:fld id="{CDC0ED0E-9E26-476D-92D2-B594C12CD538}" type="datetimeFigureOut">
               <a:rPr lang="en-SG" smtClean="0"/>
-              <a:t>15/8/2023</a:t>
+              <a:t>21/8/2023</a:t>
             </a:fld>
             <a:endParaRPr lang="en-SG"/>
           </a:p>
@@ -2087,7 +2087,7 @@
           <a:p>
             <a:fld id="{CDC0ED0E-9E26-476D-92D2-B594C12CD538}" type="datetimeFigureOut">
               <a:rPr lang="en-SG" smtClean="0"/>
-              <a:t>15/8/2023</a:t>
+              <a:t>21/8/2023</a:t>
             </a:fld>
             <a:endParaRPr lang="en-SG"/>
           </a:p>
@@ -2400,7 +2400,7 @@
           <a:p>
             <a:fld id="{CDC0ED0E-9E26-476D-92D2-B594C12CD538}" type="datetimeFigureOut">
               <a:rPr lang="en-SG" smtClean="0"/>
-              <a:t>15/8/2023</a:t>
+              <a:t>21/8/2023</a:t>
             </a:fld>
             <a:endParaRPr lang="en-SG"/>
           </a:p>
@@ -2689,7 +2689,7 @@
           <a:p>
             <a:fld id="{CDC0ED0E-9E26-476D-92D2-B594C12CD538}" type="datetimeFigureOut">
               <a:rPr lang="en-SG" smtClean="0"/>
-              <a:t>15/8/2023</a:t>
+              <a:t>21/8/2023</a:t>
             </a:fld>
             <a:endParaRPr lang="en-SG"/>
           </a:p>
@@ -2932,7 +2932,7 @@
           <a:p>
             <a:fld id="{CDC0ED0E-9E26-476D-92D2-B594C12CD538}" type="datetimeFigureOut">
               <a:rPr lang="en-SG" smtClean="0"/>
-              <a:t>15/8/2023</a:t>
+              <a:t>21/8/2023</a:t>
             </a:fld>
             <a:endParaRPr lang="en-SG"/>
           </a:p>
@@ -8460,23 +8460,7 @@
                   <a:schemeClr val="bg1"/>
                 </a:solidFill>
               </a:rPr>
-              <a:t>AI Answer compare (correct / </a:t>
-            </a:r>
-            <a:r>
-              <a:rPr lang="en-US" sz="1100" b="1" dirty="0" err="1">
-                <a:solidFill>
-                  <a:schemeClr val="bg1"/>
-                </a:solidFill>
-              </a:rPr>
-              <a:t>totaol</a:t>
-            </a:r>
-            <a:r>
-              <a:rPr lang="en-US" sz="1100" b="1" dirty="0">
-                <a:solidFill>
-                  <a:schemeClr val="bg1"/>
-                </a:solidFill>
-              </a:rPr>
-              <a:t>) : 19 / 23 Correctness rate : 0.8260869565217391</a:t>
+              <a:t>AI Answer compare (correct / total) : 19 / 23 Correctness rate : 0.8260869565217391</a:t>
             </a:r>
             <a:endParaRPr lang="en-SG" sz="1100" b="1" dirty="0">
               <a:solidFill>

</xml_diff>

<commit_message>
update the design document, readme file and added the test MCQ question bank under markdown and json format.
</commit_message>
<xml_diff>
--- a/doc/designDoc.pptx
+++ b/doc/designDoc.pptx
@@ -3888,7 +3888,7 @@
         </p:blipFill>
         <p:spPr>
           <a:xfrm>
-            <a:off x="6435538" y="1652435"/>
+            <a:off x="6387025" y="1631194"/>
             <a:ext cx="493484" cy="501895"/>
           </a:xfrm>
           <a:prstGeom prst="rect">
@@ -3923,7 +3923,7 @@
         </p:blipFill>
         <p:spPr>
           <a:xfrm>
-            <a:off x="6504144" y="2444204"/>
+            <a:off x="6379683" y="2458367"/>
             <a:ext cx="469333" cy="495589"/>
           </a:xfrm>
           <a:prstGeom prst="rect">
@@ -4185,7 +4185,7 @@
         </p:nvSpPr>
         <p:spPr>
           <a:xfrm>
-            <a:off x="5381500" y="2215104"/>
+            <a:off x="5381500" y="2184199"/>
             <a:ext cx="1122644" cy="261610"/>
           </a:xfrm>
           <a:prstGeom prst="rect">
@@ -4235,8 +4235,8 @@
         </p:nvSpPr>
         <p:spPr>
           <a:xfrm>
-            <a:off x="6469174" y="2215104"/>
-            <a:ext cx="1402357" cy="261610"/>
+            <a:off x="6352497" y="2208051"/>
+            <a:ext cx="455312" cy="261610"/>
           </a:xfrm>
           <a:prstGeom prst="rect">
             <a:avLst/>
@@ -4258,16 +4258,8 @@
                   </a:schemeClr>
                 </a:solidFill>
               </a:rPr>
-              <a:t>URL ( without login )</a:t>
-            </a:r>
-            <a:endParaRPr lang="en-SG" sz="1100" b="1" dirty="0">
-              <a:solidFill>
-                <a:schemeClr val="tx1">
-                  <a:lumMod val="75000"/>
-                  <a:lumOff val="25000"/>
-                </a:schemeClr>
-              </a:solidFill>
-            </a:endParaRPr>
+              <a:t>URL </a:t>
+            </a:r>
           </a:p>
         </p:txBody>
       </p:sp>
@@ -5793,6 +5785,130 @@
                 </a:schemeClr>
               </a:solidFill>
             </a:endParaRPr>
+          </a:p>
+        </p:txBody>
+      </p:sp>
+      <p:pic>
+        <p:nvPicPr>
+          <p:cNvPr id="1026" name="Picture 2" descr="Json file - Free ui icons">
+            <a:extLst>
+              <a:ext uri="{FF2B5EF4-FFF2-40B4-BE49-F238E27FC236}">
+                <a16:creationId xmlns:a16="http://schemas.microsoft.com/office/drawing/2014/main" id="{16548107-C65D-7F47-4074-637C620A8AF7}"/>
+              </a:ext>
+            </a:extLst>
+          </p:cNvPr>
+          <p:cNvPicPr>
+            <a:picLocks noChangeAspect="1" noChangeArrowheads="1"/>
+          </p:cNvPicPr>
+          <p:nvPr/>
+        </p:nvPicPr>
+        <p:blipFill>
+          <a:blip r:embed="rId11">
+            <a:extLst>
+              <a:ext uri="{28A0092B-C50C-407E-A947-70E740481C1C}">
+                <a14:useLocalDpi xmlns:a14="http://schemas.microsoft.com/office/drawing/2010/main" val="0"/>
+              </a:ext>
+            </a:extLst>
+          </a:blip>
+          <a:srcRect/>
+          <a:stretch>
+            <a:fillRect/>
+          </a:stretch>
+        </p:blipFill>
+        <p:spPr bwMode="auto">
+          <a:xfrm>
+            <a:off x="7220426" y="2378782"/>
+            <a:ext cx="597516" cy="597516"/>
+          </a:xfrm>
+          <a:prstGeom prst="rect">
+            <a:avLst/>
+          </a:prstGeom>
+          <a:noFill/>
+          <a:extLst>
+            <a:ext uri="{909E8E84-426E-40DD-AFC4-6F175D3DCCD1}">
+              <a14:hiddenFill xmlns:a14="http://schemas.microsoft.com/office/drawing/2010/main">
+                <a:solidFill>
+                  <a:srgbClr val="FFFFFF"/>
+                </a:solidFill>
+              </a14:hiddenFill>
+            </a:ext>
+          </a:extLst>
+        </p:spPr>
+      </p:pic>
+      <p:sp>
+        <p:nvSpPr>
+          <p:cNvPr id="10" name="TextBox 9">
+            <a:extLst>
+              <a:ext uri="{FF2B5EF4-FFF2-40B4-BE49-F238E27FC236}">
+                <a16:creationId xmlns:a16="http://schemas.microsoft.com/office/drawing/2014/main" id="{86A6BDE8-5473-B638-3C53-540B1A435430}"/>
+              </a:ext>
+            </a:extLst>
+          </p:cNvPr>
+          <p:cNvSpPr txBox="1"/>
+          <p:nvPr/>
+        </p:nvSpPr>
+        <p:spPr>
+          <a:xfrm>
+            <a:off x="7195104" y="2198331"/>
+            <a:ext cx="1027171" cy="261610"/>
+          </a:xfrm>
+          <a:prstGeom prst="rect">
+            <a:avLst/>
+          </a:prstGeom>
+          <a:noFill/>
+        </p:spPr>
+        <p:txBody>
+          <a:bodyPr wrap="square">
+            <a:spAutoFit/>
+          </a:bodyPr>
+          <a:lstStyle/>
+          <a:p>
+            <a:r>
+              <a:rPr lang="en-US" sz="1100" b="1" dirty="0">
+                <a:solidFill>
+                  <a:schemeClr val="tx1">
+                    <a:lumMod val="75000"/>
+                    <a:lumOff val="25000"/>
+                  </a:schemeClr>
+                </a:solidFill>
+              </a:rPr>
+              <a:t>Json format  </a:t>
+            </a:r>
+          </a:p>
+        </p:txBody>
+      </p:sp>
+      <p:sp>
+        <p:nvSpPr>
+          <p:cNvPr id="12" name="TextBox 11">
+            <a:extLst>
+              <a:ext uri="{FF2B5EF4-FFF2-40B4-BE49-F238E27FC236}">
+                <a16:creationId xmlns:a16="http://schemas.microsoft.com/office/drawing/2014/main" id="{982D6406-DCFB-B1A7-5C8C-A4F0C032512C}"/>
+              </a:ext>
+            </a:extLst>
+          </p:cNvPr>
+          <p:cNvSpPr txBox="1"/>
+          <p:nvPr/>
+        </p:nvSpPr>
+        <p:spPr>
+          <a:xfrm>
+            <a:off x="6580153" y="2194379"/>
+            <a:ext cx="707037" cy="400110"/>
+          </a:xfrm>
+          <a:prstGeom prst="rect">
+            <a:avLst/>
+          </a:prstGeom>
+          <a:noFill/>
+        </p:spPr>
+        <p:txBody>
+          <a:bodyPr wrap="square" rtlCol="0">
+            <a:spAutoFit/>
+          </a:bodyPr>
+          <a:lstStyle/>
+          <a:p>
+            <a:r>
+              <a:rPr lang="en-SG" sz="1000" dirty="0"/>
+              <a:t>( Without login)</a:t>
+            </a:r>
           </a:p>
         </p:txBody>
       </p:sp>
@@ -7960,57 +8076,14 @@
         </p:blipFill>
         <p:spPr>
           <a:xfrm>
-            <a:off x="7073697" y="803829"/>
-            <a:ext cx="2847543" cy="2674964"/>
+            <a:off x="7235885" y="904454"/>
+            <a:ext cx="1833590" cy="1722463"/>
           </a:xfrm>
           <a:prstGeom prst="rect">
             <a:avLst/>
           </a:prstGeom>
         </p:spPr>
       </p:pic>
-      <p:cxnSp>
-        <p:nvCxnSpPr>
-          <p:cNvPr id="11" name="Straight Arrow Connector 10">
-            <a:extLst>
-              <a:ext uri="{FF2B5EF4-FFF2-40B4-BE49-F238E27FC236}">
-                <a16:creationId xmlns:a16="http://schemas.microsoft.com/office/drawing/2014/main" id="{3712FD27-2EAF-255E-3760-0BFE84F8F448}"/>
-              </a:ext>
-            </a:extLst>
-          </p:cNvPr>
-          <p:cNvCxnSpPr>
-            <a:cxnSpLocks/>
-            <a:stCxn id="5" idx="2"/>
-            <a:endCxn id="18" idx="1"/>
-          </p:cNvCxnSpPr>
-          <p:nvPr/>
-        </p:nvCxnSpPr>
-        <p:spPr>
-          <a:xfrm>
-            <a:off x="2328692" y="3485117"/>
-            <a:ext cx="2356238" cy="533221"/>
-          </a:xfrm>
-          <a:prstGeom prst="straightConnector1">
-            <a:avLst/>
-          </a:prstGeom>
-          <a:ln w="19050">
-            <a:tailEnd type="triangle"/>
-          </a:ln>
-        </p:spPr>
-        <p:style>
-          <a:lnRef idx="1">
-            <a:schemeClr val="accent1"/>
-          </a:lnRef>
-          <a:fillRef idx="0">
-            <a:schemeClr val="accent1"/>
-          </a:fillRef>
-          <a:effectRef idx="0">
-            <a:schemeClr val="accent1"/>
-          </a:effectRef>
-          <a:fontRef idx="minor">
-            <a:schemeClr val="tx1"/>
-          </a:fontRef>
-        </p:style>
-      </p:cxnSp>
       <p:cxnSp>
         <p:nvCxnSpPr>
           <p:cNvPr id="12" name="Straight Arrow Connector 11">
@@ -8031,49 +8104,6 @@
           <a:xfrm flipH="1">
             <a:off x="5390465" y="3485117"/>
             <a:ext cx="459" cy="291981"/>
-          </a:xfrm>
-          <a:prstGeom prst="straightConnector1">
-            <a:avLst/>
-          </a:prstGeom>
-          <a:ln w="19050">
-            <a:tailEnd type="triangle"/>
-          </a:ln>
-        </p:spPr>
-        <p:style>
-          <a:lnRef idx="1">
-            <a:schemeClr val="accent1"/>
-          </a:lnRef>
-          <a:fillRef idx="0">
-            <a:schemeClr val="accent1"/>
-          </a:fillRef>
-          <a:effectRef idx="0">
-            <a:schemeClr val="accent1"/>
-          </a:effectRef>
-          <a:fontRef idx="minor">
-            <a:schemeClr val="tx1"/>
-          </a:fontRef>
-        </p:style>
-      </p:cxnSp>
-      <p:cxnSp>
-        <p:nvCxnSpPr>
-          <p:cNvPr id="15" name="Straight Arrow Connector 14">
-            <a:extLst>
-              <a:ext uri="{FF2B5EF4-FFF2-40B4-BE49-F238E27FC236}">
-                <a16:creationId xmlns:a16="http://schemas.microsoft.com/office/drawing/2014/main" id="{D62D8ABA-D21A-7633-54D0-B18872B0CAEB}"/>
-              </a:ext>
-            </a:extLst>
-          </p:cNvPr>
-          <p:cNvCxnSpPr>
-            <a:cxnSpLocks/>
-            <a:stCxn id="9" idx="2"/>
-            <a:endCxn id="18" idx="3"/>
-          </p:cNvCxnSpPr>
-          <p:nvPr/>
-        </p:nvCxnSpPr>
-        <p:spPr>
-          <a:xfrm flipH="1">
-            <a:off x="6096000" y="3478793"/>
-            <a:ext cx="2401469" cy="539545"/>
           </a:xfrm>
           <a:prstGeom prst="straightConnector1">
             <a:avLst/>
@@ -8517,6 +8547,293 @@
                 </a:schemeClr>
               </a:solidFill>
             </a:endParaRPr>
+          </a:p>
+        </p:txBody>
+      </p:sp>
+      <p:pic>
+        <p:nvPicPr>
+          <p:cNvPr id="6" name="Picture 5">
+            <a:extLst>
+              <a:ext uri="{FF2B5EF4-FFF2-40B4-BE49-F238E27FC236}">
+                <a16:creationId xmlns:a16="http://schemas.microsoft.com/office/drawing/2014/main" id="{C9BFE198-9058-F5D9-1E6C-49CB41FF6136}"/>
+              </a:ext>
+            </a:extLst>
+          </p:cNvPr>
+          <p:cNvPicPr>
+            <a:picLocks noChangeAspect="1"/>
+          </p:cNvPicPr>
+          <p:nvPr/>
+        </p:nvPicPr>
+        <p:blipFill rotWithShape="1">
+          <a:blip r:embed="rId5"/>
+          <a:srcRect b="31394"/>
+          <a:stretch/>
+        </p:blipFill>
+        <p:spPr>
+          <a:xfrm>
+            <a:off x="9140525" y="904454"/>
+            <a:ext cx="2300093" cy="1133655"/>
+          </a:xfrm>
+          <a:prstGeom prst="rect">
+            <a:avLst/>
+          </a:prstGeom>
+        </p:spPr>
+      </p:pic>
+      <p:pic>
+        <p:nvPicPr>
+          <p:cNvPr id="10" name="Picture 9">
+            <a:extLst>
+              <a:ext uri="{FF2B5EF4-FFF2-40B4-BE49-F238E27FC236}">
+                <a16:creationId xmlns:a16="http://schemas.microsoft.com/office/drawing/2014/main" id="{714C7E34-894D-16C3-3695-5D45771DBFC2}"/>
+              </a:ext>
+            </a:extLst>
+          </p:cNvPr>
+          <p:cNvPicPr>
+            <a:picLocks noChangeAspect="1"/>
+          </p:cNvPicPr>
+          <p:nvPr/>
+        </p:nvPicPr>
+        <p:blipFill>
+          <a:blip r:embed="rId6"/>
+          <a:stretch>
+            <a:fillRect/>
+          </a:stretch>
+        </p:blipFill>
+        <p:spPr>
+          <a:xfrm>
+            <a:off x="9167141" y="2157770"/>
+            <a:ext cx="2278527" cy="1234657"/>
+          </a:xfrm>
+          <a:prstGeom prst="rect">
+            <a:avLst/>
+          </a:prstGeom>
+          <a:ln w="6350">
+            <a:solidFill>
+              <a:schemeClr val="tx1"/>
+            </a:solidFill>
+          </a:ln>
+        </p:spPr>
+      </p:pic>
+      <p:sp>
+        <p:nvSpPr>
+          <p:cNvPr id="14" name="Rectangle 13">
+            <a:extLst>
+              <a:ext uri="{FF2B5EF4-FFF2-40B4-BE49-F238E27FC236}">
+                <a16:creationId xmlns:a16="http://schemas.microsoft.com/office/drawing/2014/main" id="{30CA1785-31CC-B8C8-56C0-BA1E01C4E5D9}"/>
+              </a:ext>
+            </a:extLst>
+          </p:cNvPr>
+          <p:cNvSpPr/>
+          <p:nvPr/>
+        </p:nvSpPr>
+        <p:spPr>
+          <a:xfrm>
+            <a:off x="7138219" y="830424"/>
+            <a:ext cx="4426939" cy="2711753"/>
+          </a:xfrm>
+          <a:prstGeom prst="rect">
+            <a:avLst/>
+          </a:prstGeom>
+          <a:noFill/>
+          <a:ln w="9525" cap="flat" cmpd="sng" algn="ctr">
+            <a:solidFill>
+              <a:schemeClr val="dk1"/>
+            </a:solidFill>
+            <a:prstDash val="solid"/>
+            <a:round/>
+            <a:headEnd type="none" w="med" len="med"/>
+            <a:tailEnd type="none" w="med" len="med"/>
+          </a:ln>
+        </p:spPr>
+        <p:style>
+          <a:lnRef idx="0">
+            <a:scrgbClr r="0" g="0" b="0"/>
+          </a:lnRef>
+          <a:fillRef idx="0">
+            <a:scrgbClr r="0" g="0" b="0"/>
+          </a:fillRef>
+          <a:effectRef idx="0">
+            <a:scrgbClr r="0" g="0" b="0"/>
+          </a:effectRef>
+          <a:fontRef idx="minor">
+            <a:schemeClr val="dk1"/>
+          </a:fontRef>
+        </p:style>
+        <p:txBody>
+          <a:bodyPr rtlCol="0" anchor="ctr"/>
+          <a:lstStyle/>
+          <a:p>
+            <a:pPr algn="ctr"/>
+            <a:endParaRPr lang="en-SG" dirty="0"/>
+          </a:p>
+        </p:txBody>
+      </p:sp>
+      <p:cxnSp>
+        <p:nvCxnSpPr>
+          <p:cNvPr id="19" name="Connector: Elbow 18">
+            <a:extLst>
+              <a:ext uri="{FF2B5EF4-FFF2-40B4-BE49-F238E27FC236}">
+                <a16:creationId xmlns:a16="http://schemas.microsoft.com/office/drawing/2014/main" id="{3D5BA2B6-2B97-7426-ED6C-A2D678A2D937}"/>
+              </a:ext>
+            </a:extLst>
+          </p:cNvPr>
+          <p:cNvCxnSpPr>
+            <a:stCxn id="5" idx="2"/>
+            <a:endCxn id="18" idx="1"/>
+          </p:cNvCxnSpPr>
+          <p:nvPr/>
+        </p:nvCxnSpPr>
+        <p:spPr>
+          <a:xfrm rot="16200000" flipH="1">
+            <a:off x="3240201" y="2573608"/>
+            <a:ext cx="533221" cy="2356238"/>
+          </a:xfrm>
+          <a:prstGeom prst="bentConnector2">
+            <a:avLst/>
+          </a:prstGeom>
+          <a:ln w="19050">
+            <a:tailEnd type="triangle"/>
+          </a:ln>
+        </p:spPr>
+        <p:style>
+          <a:lnRef idx="1">
+            <a:schemeClr val="accent1"/>
+          </a:lnRef>
+          <a:fillRef idx="0">
+            <a:schemeClr val="accent1"/>
+          </a:fillRef>
+          <a:effectRef idx="0">
+            <a:schemeClr val="accent1"/>
+          </a:effectRef>
+          <a:fontRef idx="minor">
+            <a:schemeClr val="tx1"/>
+          </a:fontRef>
+        </p:style>
+      </p:cxnSp>
+      <p:cxnSp>
+        <p:nvCxnSpPr>
+          <p:cNvPr id="20" name="Connector: Elbow 19">
+            <a:extLst>
+              <a:ext uri="{FF2B5EF4-FFF2-40B4-BE49-F238E27FC236}">
+                <a16:creationId xmlns:a16="http://schemas.microsoft.com/office/drawing/2014/main" id="{92E51328-0637-79DD-AABA-7E7974C29CBC}"/>
+              </a:ext>
+            </a:extLst>
+          </p:cNvPr>
+          <p:cNvCxnSpPr>
+            <a:cxnSpLocks/>
+            <a:stCxn id="14" idx="2"/>
+            <a:endCxn id="18" idx="3"/>
+          </p:cNvCxnSpPr>
+          <p:nvPr/>
+        </p:nvCxnSpPr>
+        <p:spPr>
+          <a:xfrm rot="5400000">
+            <a:off x="7485765" y="2152413"/>
+            <a:ext cx="476161" cy="3255689"/>
+          </a:xfrm>
+          <a:prstGeom prst="bentConnector2">
+            <a:avLst/>
+          </a:prstGeom>
+          <a:ln w="19050">
+            <a:tailEnd type="triangle"/>
+          </a:ln>
+        </p:spPr>
+        <p:style>
+          <a:lnRef idx="1">
+            <a:schemeClr val="accent1"/>
+          </a:lnRef>
+          <a:fillRef idx="0">
+            <a:schemeClr val="accent1"/>
+          </a:fillRef>
+          <a:effectRef idx="0">
+            <a:schemeClr val="accent1"/>
+          </a:effectRef>
+          <a:fontRef idx="minor">
+            <a:schemeClr val="tx1"/>
+          </a:fontRef>
+        </p:style>
+      </p:cxnSp>
+      <p:sp>
+        <p:nvSpPr>
+          <p:cNvPr id="27" name="TextBox 26">
+            <a:extLst>
+              <a:ext uri="{FF2B5EF4-FFF2-40B4-BE49-F238E27FC236}">
+                <a16:creationId xmlns:a16="http://schemas.microsoft.com/office/drawing/2014/main" id="{A05261C9-E991-754B-49D7-B80630EB2288}"/>
+              </a:ext>
+            </a:extLst>
+          </p:cNvPr>
+          <p:cNvSpPr txBox="1"/>
+          <p:nvPr/>
+        </p:nvSpPr>
+        <p:spPr>
+          <a:xfrm>
+            <a:off x="7195104" y="2198331"/>
+            <a:ext cx="1027171" cy="261610"/>
+          </a:xfrm>
+          <a:prstGeom prst="rect">
+            <a:avLst/>
+          </a:prstGeom>
+          <a:noFill/>
+        </p:spPr>
+        <p:txBody>
+          <a:bodyPr wrap="square">
+            <a:spAutoFit/>
+          </a:bodyPr>
+          <a:lstStyle/>
+          <a:p>
+            <a:r>
+              <a:rPr lang="en-US" sz="1100" b="1" dirty="0">
+                <a:solidFill>
+                  <a:schemeClr val="tx1">
+                    <a:lumMod val="75000"/>
+                    <a:lumOff val="25000"/>
+                  </a:schemeClr>
+                </a:solidFill>
+              </a:rPr>
+              <a:t>Json format  </a:t>
+            </a:r>
+          </a:p>
+        </p:txBody>
+      </p:sp>
+      <p:sp>
+        <p:nvSpPr>
+          <p:cNvPr id="28" name="TextBox 27">
+            <a:extLst>
+              <a:ext uri="{FF2B5EF4-FFF2-40B4-BE49-F238E27FC236}">
+                <a16:creationId xmlns:a16="http://schemas.microsoft.com/office/drawing/2014/main" id="{C8633CDE-98FD-D5F6-6824-28D97F0F1E0B}"/>
+              </a:ext>
+            </a:extLst>
+          </p:cNvPr>
+          <p:cNvSpPr txBox="1"/>
+          <p:nvPr/>
+        </p:nvSpPr>
+        <p:spPr>
+          <a:xfrm>
+            <a:off x="7233408" y="2758525"/>
+            <a:ext cx="1441511" cy="430887"/>
+          </a:xfrm>
+          <a:prstGeom prst="rect">
+            <a:avLst/>
+          </a:prstGeom>
+          <a:noFill/>
+        </p:spPr>
+        <p:txBody>
+          <a:bodyPr wrap="square">
+            <a:spAutoFit/>
+          </a:bodyPr>
+          <a:lstStyle/>
+          <a:p>
+            <a:r>
+              <a:rPr lang="en-US" sz="1100" b="1" dirty="0">
+                <a:solidFill>
+                  <a:schemeClr val="tx1">
+                    <a:lumMod val="75000"/>
+                    <a:lumOff val="25000"/>
+                  </a:schemeClr>
+                </a:solidFill>
+              </a:rPr>
+              <a:t>Txt, CSV, markdown or Json</a:t>
+            </a:r>
           </a:p>
         </p:txBody>
       </p:sp>

</xml_diff>

<commit_message>
update the design document and the logo.
</commit_message>
<xml_diff>
--- a/doc/designDoc.pptx
+++ b/doc/designDoc.pptx
@@ -6,8 +6,9 @@
   </p:sldMasterIdLst>
   <p:sldIdLst>
     <p:sldId id="256" r:id="rId2"/>
-    <p:sldId id="257" r:id="rId3"/>
-    <p:sldId id="258" r:id="rId4"/>
+    <p:sldId id="259" r:id="rId3"/>
+    <p:sldId id="257" r:id="rId4"/>
+    <p:sldId id="258" r:id="rId5"/>
   </p:sldIdLst>
   <p:sldSz cx="12192000" cy="6858000"/>
   <p:notesSz cx="6858000" cy="9144000"/>
@@ -5942,6 +5943,456 @@
           <a:chExt cx="0" cy="0"/>
         </a:xfrm>
       </p:grpSpPr>
+      <p:pic>
+        <p:nvPicPr>
+          <p:cNvPr id="9" name="Picture 8">
+            <a:extLst>
+              <a:ext uri="{FF2B5EF4-FFF2-40B4-BE49-F238E27FC236}">
+                <a16:creationId xmlns:a16="http://schemas.microsoft.com/office/drawing/2014/main" id="{147DE913-8C89-76B8-D954-664AD139BE9E}"/>
+              </a:ext>
+            </a:extLst>
+          </p:cNvPr>
+          <p:cNvPicPr>
+            <a:picLocks noChangeAspect="1"/>
+          </p:cNvPicPr>
+          <p:nvPr/>
+        </p:nvPicPr>
+        <p:blipFill>
+          <a:blip r:embed="rId2"/>
+          <a:stretch>
+            <a:fillRect/>
+          </a:stretch>
+        </p:blipFill>
+        <p:spPr>
+          <a:xfrm>
+            <a:off x="3326213" y="1691157"/>
+            <a:ext cx="1431139" cy="1448382"/>
+          </a:xfrm>
+          <a:prstGeom prst="rect">
+            <a:avLst/>
+          </a:prstGeom>
+          <a:ln w="3175">
+            <a:solidFill>
+              <a:schemeClr val="tx1"/>
+            </a:solidFill>
+          </a:ln>
+        </p:spPr>
+      </p:pic>
+      <p:pic>
+        <p:nvPicPr>
+          <p:cNvPr id="11" name="Picture 10">
+            <a:extLst>
+              <a:ext uri="{FF2B5EF4-FFF2-40B4-BE49-F238E27FC236}">
+                <a16:creationId xmlns:a16="http://schemas.microsoft.com/office/drawing/2014/main" id="{FE97D440-E913-FC4C-9C5C-E596CA82E834}"/>
+              </a:ext>
+            </a:extLst>
+          </p:cNvPr>
+          <p:cNvPicPr>
+            <a:picLocks noChangeAspect="1"/>
+          </p:cNvPicPr>
+          <p:nvPr/>
+        </p:nvPicPr>
+        <p:blipFill>
+          <a:blip r:embed="rId3"/>
+          <a:stretch>
+            <a:fillRect/>
+          </a:stretch>
+        </p:blipFill>
+        <p:spPr>
+          <a:xfrm>
+            <a:off x="3679887" y="1691157"/>
+            <a:ext cx="706762" cy="687557"/>
+          </a:xfrm>
+          <a:prstGeom prst="rect">
+            <a:avLst/>
+          </a:prstGeom>
+        </p:spPr>
+      </p:pic>
+      <p:pic>
+        <p:nvPicPr>
+          <p:cNvPr id="5" name="Picture 4">
+            <a:extLst>
+              <a:ext uri="{FF2B5EF4-FFF2-40B4-BE49-F238E27FC236}">
+                <a16:creationId xmlns:a16="http://schemas.microsoft.com/office/drawing/2014/main" id="{145F52E5-B33C-AF6B-E4A3-F305F5BF21C7}"/>
+              </a:ext>
+            </a:extLst>
+          </p:cNvPr>
+          <p:cNvPicPr>
+            <a:picLocks noChangeAspect="1"/>
+          </p:cNvPicPr>
+          <p:nvPr/>
+        </p:nvPicPr>
+        <p:blipFill>
+          <a:blip r:embed="rId4"/>
+          <a:stretch>
+            <a:fillRect/>
+          </a:stretch>
+        </p:blipFill>
+        <p:spPr>
+          <a:xfrm>
+            <a:off x="1337155" y="1637977"/>
+            <a:ext cx="1411433" cy="1448382"/>
+          </a:xfrm>
+          <a:prstGeom prst="rect">
+            <a:avLst/>
+          </a:prstGeom>
+          <a:ln w="9525">
+            <a:solidFill>
+              <a:schemeClr val="tx1"/>
+            </a:solidFill>
+          </a:ln>
+        </p:spPr>
+      </p:pic>
+      <p:pic>
+        <p:nvPicPr>
+          <p:cNvPr id="7" name="Picture 6">
+            <a:extLst>
+              <a:ext uri="{FF2B5EF4-FFF2-40B4-BE49-F238E27FC236}">
+                <a16:creationId xmlns:a16="http://schemas.microsoft.com/office/drawing/2014/main" id="{86B4B6D6-999F-5907-DEA3-8857AA5CC28F}"/>
+              </a:ext>
+            </a:extLst>
+          </p:cNvPr>
+          <p:cNvPicPr>
+            <a:picLocks noChangeAspect="1"/>
+          </p:cNvPicPr>
+          <p:nvPr/>
+        </p:nvPicPr>
+        <p:blipFill rotWithShape="1">
+          <a:blip r:embed="rId5"/>
+          <a:srcRect l="76289"/>
+          <a:stretch/>
+        </p:blipFill>
+        <p:spPr>
+          <a:xfrm>
+            <a:off x="5425843" y="1691157"/>
+            <a:ext cx="917873" cy="1134644"/>
+          </a:xfrm>
+          <a:prstGeom prst="rect">
+            <a:avLst/>
+          </a:prstGeom>
+          <a:ln w="9525">
+            <a:solidFill>
+              <a:schemeClr val="tx1"/>
+            </a:solidFill>
+          </a:ln>
+        </p:spPr>
+      </p:pic>
+      <p:pic>
+        <p:nvPicPr>
+          <p:cNvPr id="12" name="Picture 11">
+            <a:extLst>
+              <a:ext uri="{FF2B5EF4-FFF2-40B4-BE49-F238E27FC236}">
+                <a16:creationId xmlns:a16="http://schemas.microsoft.com/office/drawing/2014/main" id="{2199E26E-03A4-047B-E22D-EE52AA3DD599}"/>
+              </a:ext>
+            </a:extLst>
+          </p:cNvPr>
+          <p:cNvPicPr>
+            <a:picLocks noChangeAspect="1"/>
+          </p:cNvPicPr>
+          <p:nvPr/>
+        </p:nvPicPr>
+        <p:blipFill rotWithShape="1">
+          <a:blip r:embed="rId5"/>
+          <a:srcRect l="50086" r="23420"/>
+          <a:stretch/>
+        </p:blipFill>
+        <p:spPr>
+          <a:xfrm>
+            <a:off x="5765406" y="2114014"/>
+            <a:ext cx="1025611" cy="1134644"/>
+          </a:xfrm>
+          <a:prstGeom prst="rect">
+            <a:avLst/>
+          </a:prstGeom>
+          <a:ln w="9525">
+            <a:solidFill>
+              <a:schemeClr val="tx1"/>
+            </a:solidFill>
+          </a:ln>
+        </p:spPr>
+      </p:pic>
+      <p:pic>
+        <p:nvPicPr>
+          <p:cNvPr id="13" name="Picture 12">
+            <a:extLst>
+              <a:ext uri="{FF2B5EF4-FFF2-40B4-BE49-F238E27FC236}">
+                <a16:creationId xmlns:a16="http://schemas.microsoft.com/office/drawing/2014/main" id="{E0C5A370-2A94-7B15-5C63-EE1A317A15EC}"/>
+              </a:ext>
+            </a:extLst>
+          </p:cNvPr>
+          <p:cNvPicPr>
+            <a:picLocks noChangeAspect="1"/>
+          </p:cNvPicPr>
+          <p:nvPr/>
+        </p:nvPicPr>
+        <p:blipFill rotWithShape="1">
+          <a:blip r:embed="rId5"/>
+          <a:srcRect r="74783"/>
+          <a:stretch/>
+        </p:blipFill>
+        <p:spPr>
+          <a:xfrm>
+            <a:off x="6426595" y="1783594"/>
+            <a:ext cx="976184" cy="1134644"/>
+          </a:xfrm>
+          <a:prstGeom prst="rect">
+            <a:avLst/>
+          </a:prstGeom>
+          <a:ln w="9525">
+            <a:solidFill>
+              <a:schemeClr val="tx1"/>
+            </a:solidFill>
+          </a:ln>
+        </p:spPr>
+      </p:pic>
+      <p:sp>
+        <p:nvSpPr>
+          <p:cNvPr id="14" name="TextBox 13">
+            <a:extLst>
+              <a:ext uri="{FF2B5EF4-FFF2-40B4-BE49-F238E27FC236}">
+                <a16:creationId xmlns:a16="http://schemas.microsoft.com/office/drawing/2014/main" id="{14802D00-3005-C54B-A828-F4CF315C02CF}"/>
+              </a:ext>
+            </a:extLst>
+          </p:cNvPr>
+          <p:cNvSpPr txBox="1"/>
+          <p:nvPr/>
+        </p:nvSpPr>
+        <p:spPr>
+          <a:xfrm>
+            <a:off x="1337155" y="1349690"/>
+            <a:ext cx="1721825" cy="276999"/>
+          </a:xfrm>
+          <a:prstGeom prst="rect">
+            <a:avLst/>
+          </a:prstGeom>
+          <a:noFill/>
+        </p:spPr>
+        <p:txBody>
+          <a:bodyPr wrap="square">
+            <a:spAutoFit/>
+          </a:bodyPr>
+          <a:lstStyle/>
+          <a:p>
+            <a:r>
+              <a:rPr lang="en-SG" sz="1200" b="1" dirty="0">
+                <a:solidFill>
+                  <a:schemeClr val="tx1">
+                    <a:lumMod val="75000"/>
+                    <a:lumOff val="25000"/>
+                  </a:schemeClr>
+                </a:solidFill>
+              </a:rPr>
+              <a:t>Exam MCQ </a:t>
+            </a:r>
+          </a:p>
+        </p:txBody>
+      </p:sp>
+      <p:sp>
+        <p:nvSpPr>
+          <p:cNvPr id="15" name="TextBox 14">
+            <a:extLst>
+              <a:ext uri="{FF2B5EF4-FFF2-40B4-BE49-F238E27FC236}">
+                <a16:creationId xmlns:a16="http://schemas.microsoft.com/office/drawing/2014/main" id="{E43F5B02-404A-EAFF-BB97-AE5480EFF3B5}"/>
+              </a:ext>
+            </a:extLst>
+          </p:cNvPr>
+          <p:cNvSpPr txBox="1"/>
+          <p:nvPr/>
+        </p:nvSpPr>
+        <p:spPr>
+          <a:xfrm>
+            <a:off x="3326213" y="1349689"/>
+            <a:ext cx="1172635" cy="276999"/>
+          </a:xfrm>
+          <a:prstGeom prst="rect">
+            <a:avLst/>
+          </a:prstGeom>
+          <a:noFill/>
+        </p:spPr>
+        <p:txBody>
+          <a:bodyPr wrap="square">
+            <a:spAutoFit/>
+          </a:bodyPr>
+          <a:lstStyle/>
+          <a:p>
+            <a:r>
+              <a:rPr lang="en-SG" sz="1200" b="1" dirty="0">
+                <a:solidFill>
+                  <a:schemeClr val="tx1">
+                    <a:lumMod val="75000"/>
+                    <a:lumOff val="25000"/>
+                  </a:schemeClr>
+                </a:solidFill>
+              </a:rPr>
+              <a:t>MCG-GPT-BOT</a:t>
+            </a:r>
+          </a:p>
+        </p:txBody>
+      </p:sp>
+      <p:sp>
+        <p:nvSpPr>
+          <p:cNvPr id="16" name="TextBox 15">
+            <a:extLst>
+              <a:ext uri="{FF2B5EF4-FFF2-40B4-BE49-F238E27FC236}">
+                <a16:creationId xmlns:a16="http://schemas.microsoft.com/office/drawing/2014/main" id="{088770A3-C80B-EF9F-1C2C-CD02F338A735}"/>
+              </a:ext>
+            </a:extLst>
+          </p:cNvPr>
+          <p:cNvSpPr txBox="1"/>
+          <p:nvPr/>
+        </p:nvSpPr>
+        <p:spPr>
+          <a:xfrm>
+            <a:off x="5298461" y="1341385"/>
+            <a:ext cx="1172635" cy="276999"/>
+          </a:xfrm>
+          <a:prstGeom prst="rect">
+            <a:avLst/>
+          </a:prstGeom>
+          <a:noFill/>
+        </p:spPr>
+        <p:txBody>
+          <a:bodyPr wrap="square">
+            <a:spAutoFit/>
+          </a:bodyPr>
+          <a:lstStyle/>
+          <a:p>
+            <a:r>
+              <a:rPr lang="en-SG" sz="1200" b="1" dirty="0">
+                <a:solidFill>
+                  <a:schemeClr val="tx1">
+                    <a:lumMod val="75000"/>
+                    <a:lumOff val="25000"/>
+                  </a:schemeClr>
+                </a:solidFill>
+              </a:rPr>
+              <a:t>Answers </a:t>
+            </a:r>
+          </a:p>
+        </p:txBody>
+      </p:sp>
+      <p:sp>
+        <p:nvSpPr>
+          <p:cNvPr id="17" name="Arrow: Right 16">
+            <a:extLst>
+              <a:ext uri="{FF2B5EF4-FFF2-40B4-BE49-F238E27FC236}">
+                <a16:creationId xmlns:a16="http://schemas.microsoft.com/office/drawing/2014/main" id="{06FA2210-0581-AD40-D9A6-78EC16887258}"/>
+              </a:ext>
+            </a:extLst>
+          </p:cNvPr>
+          <p:cNvSpPr/>
+          <p:nvPr/>
+        </p:nvSpPr>
+        <p:spPr>
+          <a:xfrm>
+            <a:off x="2807096" y="2258479"/>
+            <a:ext cx="494746" cy="276999"/>
+          </a:xfrm>
+          <a:prstGeom prst="rightArrow">
+            <a:avLst/>
+          </a:prstGeom>
+        </p:spPr>
+        <p:style>
+          <a:lnRef idx="2">
+            <a:schemeClr val="accent1">
+              <a:shade val="15000"/>
+            </a:schemeClr>
+          </a:lnRef>
+          <a:fillRef idx="1">
+            <a:schemeClr val="accent1"/>
+          </a:fillRef>
+          <a:effectRef idx="0">
+            <a:schemeClr val="accent1"/>
+          </a:effectRef>
+          <a:fontRef idx="minor">
+            <a:schemeClr val="lt1"/>
+          </a:fontRef>
+        </p:style>
+        <p:txBody>
+          <a:bodyPr rtlCol="0" anchor="ctr"/>
+          <a:lstStyle/>
+          <a:p>
+            <a:pPr algn="ctr"/>
+            <a:endParaRPr lang="en-SG"/>
+          </a:p>
+        </p:txBody>
+      </p:sp>
+      <p:sp>
+        <p:nvSpPr>
+          <p:cNvPr id="18" name="Arrow: Right 17">
+            <a:extLst>
+              <a:ext uri="{FF2B5EF4-FFF2-40B4-BE49-F238E27FC236}">
+                <a16:creationId xmlns:a16="http://schemas.microsoft.com/office/drawing/2014/main" id="{2209FC53-53CB-3626-36C1-03FAA26622F8}"/>
+              </a:ext>
+            </a:extLst>
+          </p:cNvPr>
+          <p:cNvSpPr/>
+          <p:nvPr/>
+        </p:nvSpPr>
+        <p:spPr>
+          <a:xfrm>
+            <a:off x="4863653" y="2212416"/>
+            <a:ext cx="494746" cy="276999"/>
+          </a:xfrm>
+          <a:prstGeom prst="rightArrow">
+            <a:avLst/>
+          </a:prstGeom>
+        </p:spPr>
+        <p:style>
+          <a:lnRef idx="2">
+            <a:schemeClr val="accent1">
+              <a:shade val="15000"/>
+            </a:schemeClr>
+          </a:lnRef>
+          <a:fillRef idx="1">
+            <a:schemeClr val="accent1"/>
+          </a:fillRef>
+          <a:effectRef idx="0">
+            <a:schemeClr val="accent1"/>
+          </a:effectRef>
+          <a:fontRef idx="minor">
+            <a:schemeClr val="lt1"/>
+          </a:fontRef>
+        </p:style>
+        <p:txBody>
+          <a:bodyPr rtlCol="0" anchor="ctr"/>
+          <a:lstStyle/>
+          <a:p>
+            <a:pPr algn="ctr"/>
+            <a:endParaRPr lang="en-SG"/>
+          </a:p>
+        </p:txBody>
+      </p:sp>
+    </p:spTree>
+    <p:extLst>
+      <p:ext uri="{BB962C8B-B14F-4D97-AF65-F5344CB8AC3E}">
+        <p14:creationId xmlns:p14="http://schemas.microsoft.com/office/powerpoint/2010/main" val="1590825854"/>
+      </p:ext>
+    </p:extLst>
+  </p:cSld>
+  <p:clrMapOvr>
+    <a:masterClrMapping/>
+  </p:clrMapOvr>
+</p:sld>
+</file>
+
+<file path=ppt/slides/slide3.xml><?xml version="1.0" encoding="utf-8"?>
+<p:sld xmlns:a="http://schemas.openxmlformats.org/drawingml/2006/main" xmlns:r="http://schemas.openxmlformats.org/officeDocument/2006/relationships" xmlns:p="http://schemas.openxmlformats.org/presentationml/2006/main">
+  <p:cSld>
+    <p:spTree>
+      <p:nvGrpSpPr>
+        <p:cNvPr id="1" name=""/>
+        <p:cNvGrpSpPr/>
+        <p:nvPr/>
+      </p:nvGrpSpPr>
+      <p:grpSpPr>
+        <a:xfrm>
+          <a:off x="0" y="0"/>
+          <a:ext cx="0" cy="0"/>
+          <a:chOff x="0" y="0"/>
+          <a:chExt cx="0" cy="0"/>
+        </a:xfrm>
+      </p:grpSpPr>
       <p:sp>
         <p:nvSpPr>
           <p:cNvPr id="63" name="Rectangle 62">
@@ -7967,7 +8418,7 @@
 </p:sld>
 </file>
 
-<file path=ppt/slides/slide3.xml><?xml version="1.0" encoding="utf-8"?>
+<file path=ppt/slides/slide4.xml><?xml version="1.0" encoding="utf-8"?>
 <p:sld xmlns:a="http://schemas.openxmlformats.org/drawingml/2006/main" xmlns:r="http://schemas.openxmlformats.org/officeDocument/2006/relationships" xmlns:p="http://schemas.openxmlformats.org/presentationml/2006/main">
   <p:cSld>
     <p:spTree>

</xml_diff>

<commit_message>
update the design document and the usage manual.
</commit_message>
<xml_diff>
--- a/doc/designDoc.pptx
+++ b/doc/designDoc.pptx
@@ -264,7 +264,7 @@
           <a:p>
             <a:fld id="{CDC0ED0E-9E26-476D-92D2-B594C12CD538}" type="datetimeFigureOut">
               <a:rPr lang="en-SG" smtClean="0"/>
-              <a:t>9/10/2023</a:t>
+              <a:t>23/4/2024</a:t>
             </a:fld>
             <a:endParaRPr lang="en-SG"/>
           </a:p>
@@ -464,7 +464,7 @@
           <a:p>
             <a:fld id="{CDC0ED0E-9E26-476D-92D2-B594C12CD538}" type="datetimeFigureOut">
               <a:rPr lang="en-SG" smtClean="0"/>
-              <a:t>9/10/2023</a:t>
+              <a:t>23/4/2024</a:t>
             </a:fld>
             <a:endParaRPr lang="en-SG"/>
           </a:p>
@@ -674,7 +674,7 @@
           <a:p>
             <a:fld id="{CDC0ED0E-9E26-476D-92D2-B594C12CD538}" type="datetimeFigureOut">
               <a:rPr lang="en-SG" smtClean="0"/>
-              <a:t>9/10/2023</a:t>
+              <a:t>23/4/2024</a:t>
             </a:fld>
             <a:endParaRPr lang="en-SG"/>
           </a:p>
@@ -874,7 +874,7 @@
           <a:p>
             <a:fld id="{CDC0ED0E-9E26-476D-92D2-B594C12CD538}" type="datetimeFigureOut">
               <a:rPr lang="en-SG" smtClean="0"/>
-              <a:t>9/10/2023</a:t>
+              <a:t>23/4/2024</a:t>
             </a:fld>
             <a:endParaRPr lang="en-SG"/>
           </a:p>
@@ -1150,7 +1150,7 @@
           <a:p>
             <a:fld id="{CDC0ED0E-9E26-476D-92D2-B594C12CD538}" type="datetimeFigureOut">
               <a:rPr lang="en-SG" smtClean="0"/>
-              <a:t>9/10/2023</a:t>
+              <a:t>23/4/2024</a:t>
             </a:fld>
             <a:endParaRPr lang="en-SG"/>
           </a:p>
@@ -1418,7 +1418,7 @@
           <a:p>
             <a:fld id="{CDC0ED0E-9E26-476D-92D2-B594C12CD538}" type="datetimeFigureOut">
               <a:rPr lang="en-SG" smtClean="0"/>
-              <a:t>9/10/2023</a:t>
+              <a:t>23/4/2024</a:t>
             </a:fld>
             <a:endParaRPr lang="en-SG"/>
           </a:p>
@@ -1833,7 +1833,7 @@
           <a:p>
             <a:fld id="{CDC0ED0E-9E26-476D-92D2-B594C12CD538}" type="datetimeFigureOut">
               <a:rPr lang="en-SG" smtClean="0"/>
-              <a:t>9/10/2023</a:t>
+              <a:t>23/4/2024</a:t>
             </a:fld>
             <a:endParaRPr lang="en-SG"/>
           </a:p>
@@ -1975,7 +1975,7 @@
           <a:p>
             <a:fld id="{CDC0ED0E-9E26-476D-92D2-B594C12CD538}" type="datetimeFigureOut">
               <a:rPr lang="en-SG" smtClean="0"/>
-              <a:t>9/10/2023</a:t>
+              <a:t>23/4/2024</a:t>
             </a:fld>
             <a:endParaRPr lang="en-SG"/>
           </a:p>
@@ -2088,7 +2088,7 @@
           <a:p>
             <a:fld id="{CDC0ED0E-9E26-476D-92D2-B594C12CD538}" type="datetimeFigureOut">
               <a:rPr lang="en-SG" smtClean="0"/>
-              <a:t>9/10/2023</a:t>
+              <a:t>23/4/2024</a:t>
             </a:fld>
             <a:endParaRPr lang="en-SG"/>
           </a:p>
@@ -2401,7 +2401,7 @@
           <a:p>
             <a:fld id="{CDC0ED0E-9E26-476D-92D2-B594C12CD538}" type="datetimeFigureOut">
               <a:rPr lang="en-SG" smtClean="0"/>
-              <a:t>9/10/2023</a:t>
+              <a:t>23/4/2024</a:t>
             </a:fld>
             <a:endParaRPr lang="en-SG"/>
           </a:p>
@@ -2690,7 +2690,7 @@
           <a:p>
             <a:fld id="{CDC0ED0E-9E26-476D-92D2-B594C12CD538}" type="datetimeFigureOut">
               <a:rPr lang="en-SG" smtClean="0"/>
-              <a:t>9/10/2023</a:t>
+              <a:t>23/4/2024</a:t>
             </a:fld>
             <a:endParaRPr lang="en-SG"/>
           </a:p>
@@ -2933,7 +2933,7 @@
           <a:p>
             <a:fld id="{CDC0ED0E-9E26-476D-92D2-B594C12CD538}" type="datetimeFigureOut">
               <a:rPr lang="en-SG" smtClean="0"/>
-              <a:t>9/10/2023</a:t>
+              <a:t>23/4/2024</a:t>
             </a:fld>
             <a:endParaRPr lang="en-SG"/>
           </a:p>
@@ -6136,6 +6136,57 @@
           <a:chExt cx="0" cy="0"/>
         </a:xfrm>
       </p:grpSpPr>
+      <p:sp>
+        <p:nvSpPr>
+          <p:cNvPr id="2" name="Rectangle 1">
+            <a:extLst>
+              <a:ext uri="{FF2B5EF4-FFF2-40B4-BE49-F238E27FC236}">
+                <a16:creationId xmlns:a16="http://schemas.microsoft.com/office/drawing/2014/main" id="{72FB17BB-5171-0ED5-905F-B107F197A2B2}"/>
+              </a:ext>
+            </a:extLst>
+          </p:cNvPr>
+          <p:cNvSpPr/>
+          <p:nvPr/>
+        </p:nvSpPr>
+        <p:spPr>
+          <a:xfrm>
+            <a:off x="1125415" y="1310607"/>
+            <a:ext cx="6179737" cy="1945059"/>
+          </a:xfrm>
+          <a:prstGeom prst="rect">
+            <a:avLst/>
+          </a:prstGeom>
+          <a:solidFill>
+            <a:schemeClr val="accent5">
+              <a:lumMod val="50000"/>
+            </a:schemeClr>
+          </a:solidFill>
+        </p:spPr>
+        <p:style>
+          <a:lnRef idx="2">
+            <a:schemeClr val="accent1">
+              <a:shade val="15000"/>
+            </a:schemeClr>
+          </a:lnRef>
+          <a:fillRef idx="1">
+            <a:schemeClr val="accent1"/>
+          </a:fillRef>
+          <a:effectRef idx="0">
+            <a:schemeClr val="accent1"/>
+          </a:effectRef>
+          <a:fontRef idx="minor">
+            <a:schemeClr val="lt1"/>
+          </a:fontRef>
+        </p:style>
+        <p:txBody>
+          <a:bodyPr rtlCol="0" anchor="ctr"/>
+          <a:lstStyle/>
+          <a:p>
+            <a:pPr algn="ctr"/>
+            <a:endParaRPr lang="en-SG" dirty="0"/>
+          </a:p>
+        </p:txBody>
+      </p:sp>
       <p:pic>
         <p:nvPicPr>
           <p:cNvPr id="9" name="Picture 8">
@@ -6158,7 +6209,7 @@
         </p:blipFill>
         <p:spPr>
           <a:xfrm>
-            <a:off x="3326213" y="1691157"/>
+            <a:off x="3398792" y="1691157"/>
             <a:ext cx="1431139" cy="1448382"/>
           </a:xfrm>
           <a:prstGeom prst="rect">
@@ -6193,7 +6244,7 @@
         </p:blipFill>
         <p:spPr>
           <a:xfrm>
-            <a:off x="3679887" y="1691157"/>
+            <a:off x="3747181" y="1707695"/>
             <a:ext cx="706762" cy="687557"/>
           </a:xfrm>
           <a:prstGeom prst="rect">
@@ -6291,7 +6342,7 @@
         </p:blipFill>
         <p:spPr>
           <a:xfrm>
-            <a:off x="5765406" y="2114014"/>
+            <a:off x="5765406" y="1968156"/>
             <a:ext cx="1025611" cy="1134644"/>
           </a:xfrm>
           <a:prstGeom prst="rect">
@@ -6325,7 +6376,7 @@
         </p:blipFill>
         <p:spPr>
           <a:xfrm>
-            <a:off x="6426595" y="1783594"/>
+            <a:off x="6195187" y="1794846"/>
             <a:ext cx="976184" cy="1134644"/>
           </a:xfrm>
           <a:prstGeom prst="rect">
@@ -6352,8 +6403,8 @@
         </p:nvSpPr>
         <p:spPr>
           <a:xfrm>
-            <a:off x="1337155" y="1349690"/>
-            <a:ext cx="1721825" cy="276999"/>
+            <a:off x="1292452" y="1318911"/>
+            <a:ext cx="1721825" cy="307777"/>
           </a:xfrm>
           <a:prstGeom prst="rect">
             <a:avLst/>
@@ -6367,15 +6418,12 @@
           <a:lstStyle/>
           <a:p>
             <a:r>
-              <a:rPr lang="en-SG" sz="1200" b="1" dirty="0">
+              <a:rPr lang="en-SG" sz="1400" b="1" dirty="0">
                 <a:solidFill>
-                  <a:schemeClr val="tx1">
-                    <a:lumMod val="75000"/>
-                    <a:lumOff val="25000"/>
-                  </a:schemeClr>
+                  <a:schemeClr val="bg1"/>
                 </a:solidFill>
               </a:rPr>
-              <a:t>Exam MCQ </a:t>
+              <a:t>Security Exam MCQ </a:t>
             </a:r>
           </a:p>
         </p:txBody>
@@ -6394,8 +6442,8 @@
         </p:nvSpPr>
         <p:spPr>
           <a:xfrm>
-            <a:off x="3326213" y="1349689"/>
-            <a:ext cx="1172635" cy="276999"/>
+            <a:off x="3345125" y="1310607"/>
+            <a:ext cx="1571162" cy="307777"/>
           </a:xfrm>
           <a:prstGeom prst="rect">
             <a:avLst/>
@@ -6409,12 +6457,9 @@
           <a:lstStyle/>
           <a:p>
             <a:r>
-              <a:rPr lang="en-SG" sz="1200" b="1" dirty="0">
+              <a:rPr lang="en-SG" sz="1400" b="1" dirty="0">
                 <a:solidFill>
-                  <a:schemeClr val="tx1">
-                    <a:lumMod val="75000"/>
-                    <a:lumOff val="25000"/>
-                  </a:schemeClr>
+                  <a:schemeClr val="bg1"/>
                 </a:solidFill>
               </a:rPr>
               <a:t>MCG-GPT-BOT</a:t>
@@ -6437,7 +6482,7 @@
         <p:spPr>
           <a:xfrm>
             <a:off x="5298461" y="1341385"/>
-            <a:ext cx="1172635" cy="276999"/>
+            <a:ext cx="1837536" cy="307777"/>
           </a:xfrm>
           <a:prstGeom prst="rect">
             <a:avLst/>
@@ -6451,15 +6496,20 @@
           <a:lstStyle/>
           <a:p>
             <a:r>
+              <a:rPr lang="en-SG" sz="1400" b="1" dirty="0">
+                <a:solidFill>
+                  <a:schemeClr val="bg1"/>
+                </a:solidFill>
+              </a:rPr>
+              <a:t>Answers + Correct %</a:t>
+            </a:r>
+            <a:r>
               <a:rPr lang="en-SG" sz="1200" b="1" dirty="0">
                 <a:solidFill>
-                  <a:schemeClr val="tx1">
-                    <a:lumMod val="75000"/>
-                    <a:lumOff val="25000"/>
-                  </a:schemeClr>
+                  <a:schemeClr val="bg1"/>
                 </a:solidFill>
               </a:rPr>
-              <a:t>Answers </a:t>
+              <a:t> </a:t>
             </a:r>
           </a:p>
         </p:txBody>
@@ -6478,12 +6528,15 @@
         </p:nvSpPr>
         <p:spPr>
           <a:xfrm>
-            <a:off x="2807096" y="2258479"/>
+            <a:off x="2823597" y="2212415"/>
             <a:ext cx="494746" cy="276999"/>
           </a:xfrm>
           <a:prstGeom prst="rightArrow">
             <a:avLst/>
           </a:prstGeom>
+          <a:solidFill>
+            <a:schemeClr val="bg1"/>
+          </a:solidFill>
         </p:spPr>
         <p:style>
           <a:lnRef idx="2">
@@ -6524,12 +6577,15 @@
         </p:nvSpPr>
         <p:spPr>
           <a:xfrm>
-            <a:off x="4863653" y="2212416"/>
+            <a:off x="4881217" y="2212415"/>
             <a:ext cx="494746" cy="276999"/>
           </a:xfrm>
           <a:prstGeom prst="rightArrow">
             <a:avLst/>
           </a:prstGeom>
+          <a:solidFill>
+            <a:schemeClr val="bg1"/>
+          </a:solidFill>
         </p:spPr>
         <p:style>
           <a:lnRef idx="2">

</xml_diff>

<commit_message>
update the web design and the read me file.
</commit_message>
<xml_diff>
--- a/doc/designDoc.pptx
+++ b/doc/designDoc.pptx
@@ -265,7 +265,7 @@
           <a:p>
             <a:fld id="{CDC0ED0E-9E26-476D-92D2-B594C12CD538}" type="datetimeFigureOut">
               <a:rPr lang="en-SG" smtClean="0"/>
-              <a:t>25/4/2024</a:t>
+              <a:t>27/4/2024</a:t>
             </a:fld>
             <a:endParaRPr lang="en-SG"/>
           </a:p>
@@ -465,7 +465,7 @@
           <a:p>
             <a:fld id="{CDC0ED0E-9E26-476D-92D2-B594C12CD538}" type="datetimeFigureOut">
               <a:rPr lang="en-SG" smtClean="0"/>
-              <a:t>25/4/2024</a:t>
+              <a:t>27/4/2024</a:t>
             </a:fld>
             <a:endParaRPr lang="en-SG"/>
           </a:p>
@@ -675,7 +675,7 @@
           <a:p>
             <a:fld id="{CDC0ED0E-9E26-476D-92D2-B594C12CD538}" type="datetimeFigureOut">
               <a:rPr lang="en-SG" smtClean="0"/>
-              <a:t>25/4/2024</a:t>
+              <a:t>27/4/2024</a:t>
             </a:fld>
             <a:endParaRPr lang="en-SG"/>
           </a:p>
@@ -875,7 +875,7 @@
           <a:p>
             <a:fld id="{CDC0ED0E-9E26-476D-92D2-B594C12CD538}" type="datetimeFigureOut">
               <a:rPr lang="en-SG" smtClean="0"/>
-              <a:t>25/4/2024</a:t>
+              <a:t>27/4/2024</a:t>
             </a:fld>
             <a:endParaRPr lang="en-SG"/>
           </a:p>
@@ -1151,7 +1151,7 @@
           <a:p>
             <a:fld id="{CDC0ED0E-9E26-476D-92D2-B594C12CD538}" type="datetimeFigureOut">
               <a:rPr lang="en-SG" smtClean="0"/>
-              <a:t>25/4/2024</a:t>
+              <a:t>27/4/2024</a:t>
             </a:fld>
             <a:endParaRPr lang="en-SG"/>
           </a:p>
@@ -1419,7 +1419,7 @@
           <a:p>
             <a:fld id="{CDC0ED0E-9E26-476D-92D2-B594C12CD538}" type="datetimeFigureOut">
               <a:rPr lang="en-SG" smtClean="0"/>
-              <a:t>25/4/2024</a:t>
+              <a:t>27/4/2024</a:t>
             </a:fld>
             <a:endParaRPr lang="en-SG"/>
           </a:p>
@@ -1834,7 +1834,7 @@
           <a:p>
             <a:fld id="{CDC0ED0E-9E26-476D-92D2-B594C12CD538}" type="datetimeFigureOut">
               <a:rPr lang="en-SG" smtClean="0"/>
-              <a:t>25/4/2024</a:t>
+              <a:t>27/4/2024</a:t>
             </a:fld>
             <a:endParaRPr lang="en-SG"/>
           </a:p>
@@ -1976,7 +1976,7 @@
           <a:p>
             <a:fld id="{CDC0ED0E-9E26-476D-92D2-B594C12CD538}" type="datetimeFigureOut">
               <a:rPr lang="en-SG" smtClean="0"/>
-              <a:t>25/4/2024</a:t>
+              <a:t>27/4/2024</a:t>
             </a:fld>
             <a:endParaRPr lang="en-SG"/>
           </a:p>
@@ -2089,7 +2089,7 @@
           <a:p>
             <a:fld id="{CDC0ED0E-9E26-476D-92D2-B594C12CD538}" type="datetimeFigureOut">
               <a:rPr lang="en-SG" smtClean="0"/>
-              <a:t>25/4/2024</a:t>
+              <a:t>27/4/2024</a:t>
             </a:fld>
             <a:endParaRPr lang="en-SG"/>
           </a:p>
@@ -2402,7 +2402,7 @@
           <a:p>
             <a:fld id="{CDC0ED0E-9E26-476D-92D2-B594C12CD538}" type="datetimeFigureOut">
               <a:rPr lang="en-SG" smtClean="0"/>
-              <a:t>25/4/2024</a:t>
+              <a:t>27/4/2024</a:t>
             </a:fld>
             <a:endParaRPr lang="en-SG"/>
           </a:p>
@@ -2691,7 +2691,7 @@
           <a:p>
             <a:fld id="{CDC0ED0E-9E26-476D-92D2-B594C12CD538}" type="datetimeFigureOut">
               <a:rPr lang="en-SG" smtClean="0"/>
-              <a:t>25/4/2024</a:t>
+              <a:t>27/4/2024</a:t>
             </a:fld>
             <a:endParaRPr lang="en-SG"/>
           </a:p>
@@ -2934,7 +2934,7 @@
           <a:p>
             <a:fld id="{CDC0ED0E-9E26-476D-92D2-B594C12CD538}" type="datetimeFigureOut">
               <a:rPr lang="en-SG" smtClean="0"/>
-              <a:t>25/4/2024</a:t>
+              <a:t>27/4/2024</a:t>
             </a:fld>
             <a:endParaRPr lang="en-SG"/>
           </a:p>
@@ -5446,10 +5446,3401 @@
           <a:chExt cx="0" cy="0"/>
         </a:xfrm>
       </p:grpSpPr>
+      <p:sp>
+        <p:nvSpPr>
+          <p:cNvPr id="4" name="Rectangle 3">
+            <a:extLst>
+              <a:ext uri="{FF2B5EF4-FFF2-40B4-BE49-F238E27FC236}">
+                <a16:creationId xmlns:a16="http://schemas.microsoft.com/office/drawing/2014/main" id="{FAFF11FF-5AA3-27EF-54EB-61813BE0A74C}"/>
+              </a:ext>
+            </a:extLst>
+          </p:cNvPr>
+          <p:cNvSpPr/>
+          <p:nvPr/>
+        </p:nvSpPr>
+        <p:spPr>
+          <a:xfrm>
+            <a:off x="4747692" y="938999"/>
+            <a:ext cx="1411068" cy="271996"/>
+          </a:xfrm>
+          <a:prstGeom prst="rect">
+            <a:avLst/>
+          </a:prstGeom>
+        </p:spPr>
+        <p:style>
+          <a:lnRef idx="2">
+            <a:schemeClr val="accent1">
+              <a:shade val="50000"/>
+            </a:schemeClr>
+          </a:lnRef>
+          <a:fillRef idx="1">
+            <a:schemeClr val="accent1"/>
+          </a:fillRef>
+          <a:effectRef idx="0">
+            <a:schemeClr val="accent1"/>
+          </a:effectRef>
+          <a:fontRef idx="minor">
+            <a:schemeClr val="lt1"/>
+          </a:fontRef>
+        </p:style>
+        <p:txBody>
+          <a:bodyPr rtlCol="0" anchor="ctr"/>
+          <a:lstStyle/>
+          <a:p>
+            <a:r>
+              <a:rPr lang="en-US" sz="1200" b="1" dirty="0"/>
+              <a:t>MCQ-GPT Bot start </a:t>
+            </a:r>
+            <a:endParaRPr lang="en-SG" sz="1200" b="1" dirty="0"/>
+          </a:p>
+        </p:txBody>
+      </p:sp>
+      <p:cxnSp>
+        <p:nvCxnSpPr>
+          <p:cNvPr id="5" name="Straight Arrow Connector 4">
+            <a:extLst>
+              <a:ext uri="{FF2B5EF4-FFF2-40B4-BE49-F238E27FC236}">
+                <a16:creationId xmlns:a16="http://schemas.microsoft.com/office/drawing/2014/main" id="{A79484A5-B1CC-D6D4-941E-E2C54FD2B1B2}"/>
+              </a:ext>
+            </a:extLst>
+          </p:cNvPr>
+          <p:cNvCxnSpPr>
+            <a:cxnSpLocks/>
+          </p:cNvCxnSpPr>
+          <p:nvPr/>
+        </p:nvCxnSpPr>
+        <p:spPr>
+          <a:xfrm>
+            <a:off x="5035028" y="1238264"/>
+            <a:ext cx="0" cy="303620"/>
+          </a:xfrm>
+          <a:prstGeom prst="straightConnector1">
+            <a:avLst/>
+          </a:prstGeom>
+          <a:ln w="19050">
+            <a:prstDash val="sysDash"/>
+            <a:tailEnd type="triangle"/>
+          </a:ln>
+        </p:spPr>
+        <p:style>
+          <a:lnRef idx="1">
+            <a:schemeClr val="accent1"/>
+          </a:lnRef>
+          <a:fillRef idx="0">
+            <a:schemeClr val="accent1"/>
+          </a:fillRef>
+          <a:effectRef idx="0">
+            <a:schemeClr val="accent1"/>
+          </a:effectRef>
+          <a:fontRef idx="minor">
+            <a:schemeClr val="tx1"/>
+          </a:fontRef>
+        </p:style>
+      </p:cxnSp>
+      <p:sp>
+        <p:nvSpPr>
+          <p:cNvPr id="6" name="Rectangle 5">
+            <a:extLst>
+              <a:ext uri="{FF2B5EF4-FFF2-40B4-BE49-F238E27FC236}">
+                <a16:creationId xmlns:a16="http://schemas.microsoft.com/office/drawing/2014/main" id="{C5344DDC-0597-01CF-DE60-3AE5C24E2211}"/>
+              </a:ext>
+            </a:extLst>
+          </p:cNvPr>
+          <p:cNvSpPr/>
+          <p:nvPr/>
+        </p:nvSpPr>
+        <p:spPr>
+          <a:xfrm>
+            <a:off x="5674987" y="1531050"/>
+            <a:ext cx="1288112" cy="250671"/>
+          </a:xfrm>
+          <a:prstGeom prst="rect">
+            <a:avLst/>
+          </a:prstGeom>
+        </p:spPr>
+        <p:style>
+          <a:lnRef idx="2">
+            <a:schemeClr val="accent1">
+              <a:shade val="50000"/>
+            </a:schemeClr>
+          </a:lnRef>
+          <a:fillRef idx="1">
+            <a:schemeClr val="accent1"/>
+          </a:fillRef>
+          <a:effectRef idx="0">
+            <a:schemeClr val="accent1"/>
+          </a:effectRef>
+          <a:fontRef idx="minor">
+            <a:schemeClr val="lt1"/>
+          </a:fontRef>
+        </p:style>
+        <p:txBody>
+          <a:bodyPr rtlCol="0" anchor="ctr"/>
+          <a:lstStyle/>
+          <a:p>
+            <a:r>
+              <a:rPr lang="en-US" sz="1200" b="1" dirty="0"/>
+              <a:t>Config file loader</a:t>
+            </a:r>
+            <a:endParaRPr lang="en-SG" sz="1200" b="1" dirty="0"/>
+          </a:p>
+        </p:txBody>
+      </p:sp>
+      <p:pic>
+        <p:nvPicPr>
+          <p:cNvPr id="7" name="Picture 6">
+            <a:extLst>
+              <a:ext uri="{FF2B5EF4-FFF2-40B4-BE49-F238E27FC236}">
+                <a16:creationId xmlns:a16="http://schemas.microsoft.com/office/drawing/2014/main" id="{10A7A53C-01F8-D528-A0CE-E46981718051}"/>
+              </a:ext>
+            </a:extLst>
+          </p:cNvPr>
+          <p:cNvPicPr>
+            <a:picLocks noChangeAspect="1"/>
+          </p:cNvPicPr>
+          <p:nvPr/>
+        </p:nvPicPr>
+        <p:blipFill>
+          <a:blip r:embed="rId2"/>
+          <a:stretch>
+            <a:fillRect/>
+          </a:stretch>
+        </p:blipFill>
+        <p:spPr>
+          <a:xfrm>
+            <a:off x="6536433" y="953327"/>
+            <a:ext cx="324555" cy="372004"/>
+          </a:xfrm>
+          <a:prstGeom prst="rect">
+            <a:avLst/>
+          </a:prstGeom>
+        </p:spPr>
+      </p:pic>
+      <p:sp>
+        <p:nvSpPr>
+          <p:cNvPr id="9" name="TextBox 8">
+            <a:extLst>
+              <a:ext uri="{FF2B5EF4-FFF2-40B4-BE49-F238E27FC236}">
+                <a16:creationId xmlns:a16="http://schemas.microsoft.com/office/drawing/2014/main" id="{661F3FAD-F639-FF83-6881-6D5362C1DB52}"/>
+              </a:ext>
+            </a:extLst>
+          </p:cNvPr>
+          <p:cNvSpPr txBox="1"/>
+          <p:nvPr/>
+        </p:nvSpPr>
+        <p:spPr>
+          <a:xfrm>
+            <a:off x="5942730" y="684899"/>
+            <a:ext cx="1629607" cy="246221"/>
+          </a:xfrm>
+          <a:prstGeom prst="rect">
+            <a:avLst/>
+          </a:prstGeom>
+          <a:noFill/>
+        </p:spPr>
+        <p:txBody>
+          <a:bodyPr wrap="square" rtlCol="0">
+            <a:spAutoFit/>
+          </a:bodyPr>
+          <a:lstStyle/>
+          <a:p>
+            <a:r>
+              <a:rPr lang="en-US" sz="1000" dirty="0"/>
+              <a:t>Program system config file</a:t>
+            </a:r>
+            <a:endParaRPr lang="en-SG" sz="1000" dirty="0"/>
+          </a:p>
+        </p:txBody>
+      </p:sp>
+      <p:cxnSp>
+        <p:nvCxnSpPr>
+          <p:cNvPr id="2" name="Straight Arrow Connector 1">
+            <a:extLst>
+              <a:ext uri="{FF2B5EF4-FFF2-40B4-BE49-F238E27FC236}">
+                <a16:creationId xmlns:a16="http://schemas.microsoft.com/office/drawing/2014/main" id="{16546F25-A019-B50C-EA4B-8216CAF69CF3}"/>
+              </a:ext>
+            </a:extLst>
+          </p:cNvPr>
+          <p:cNvCxnSpPr>
+            <a:cxnSpLocks/>
+          </p:cNvCxnSpPr>
+          <p:nvPr/>
+        </p:nvCxnSpPr>
+        <p:spPr>
+          <a:xfrm flipH="1">
+            <a:off x="5413730" y="1650201"/>
+            <a:ext cx="261257" cy="0"/>
+          </a:xfrm>
+          <a:prstGeom prst="straightConnector1">
+            <a:avLst/>
+          </a:prstGeom>
+          <a:ln w="19050">
+            <a:prstDash val="sysDash"/>
+            <a:tailEnd type="triangle"/>
+          </a:ln>
+        </p:spPr>
+        <p:style>
+          <a:lnRef idx="1">
+            <a:schemeClr val="accent1"/>
+          </a:lnRef>
+          <a:fillRef idx="0">
+            <a:schemeClr val="accent1"/>
+          </a:fillRef>
+          <a:effectRef idx="0">
+            <a:schemeClr val="accent1"/>
+          </a:effectRef>
+          <a:fontRef idx="minor">
+            <a:schemeClr val="tx1"/>
+          </a:fontRef>
+        </p:style>
+      </p:cxnSp>
+      <p:sp>
+        <p:nvSpPr>
+          <p:cNvPr id="3" name="Rectangle 2">
+            <a:extLst>
+              <a:ext uri="{FF2B5EF4-FFF2-40B4-BE49-F238E27FC236}">
+                <a16:creationId xmlns:a16="http://schemas.microsoft.com/office/drawing/2014/main" id="{95FB41B5-50B9-2F32-1752-AEB0D103E81B}"/>
+              </a:ext>
+            </a:extLst>
+          </p:cNvPr>
+          <p:cNvSpPr/>
+          <p:nvPr/>
+        </p:nvSpPr>
+        <p:spPr>
+          <a:xfrm>
+            <a:off x="4776958" y="2142878"/>
+            <a:ext cx="1411070" cy="296206"/>
+          </a:xfrm>
+          <a:prstGeom prst="rect">
+            <a:avLst/>
+          </a:prstGeom>
+        </p:spPr>
+        <p:style>
+          <a:lnRef idx="2">
+            <a:schemeClr val="accent1">
+              <a:shade val="50000"/>
+            </a:schemeClr>
+          </a:lnRef>
+          <a:fillRef idx="1">
+            <a:schemeClr val="accent1"/>
+          </a:fillRef>
+          <a:effectRef idx="0">
+            <a:schemeClr val="accent1"/>
+          </a:effectRef>
+          <a:fontRef idx="minor">
+            <a:schemeClr val="lt1"/>
+          </a:fontRef>
+        </p:style>
+        <p:txBody>
+          <a:bodyPr rtlCol="0" anchor="ctr"/>
+          <a:lstStyle/>
+          <a:p>
+            <a:r>
+              <a:rPr lang="en-US" sz="1200" b="1" dirty="0"/>
+              <a:t>MCQ source parser </a:t>
+            </a:r>
+            <a:endParaRPr lang="en-SG" sz="1200" b="1" dirty="0"/>
+          </a:p>
+        </p:txBody>
+      </p:sp>
+      <p:cxnSp>
+        <p:nvCxnSpPr>
+          <p:cNvPr id="32" name="Straight Arrow Connector 31">
+            <a:extLst>
+              <a:ext uri="{FF2B5EF4-FFF2-40B4-BE49-F238E27FC236}">
+                <a16:creationId xmlns:a16="http://schemas.microsoft.com/office/drawing/2014/main" id="{EA0BC1FA-38C7-9F58-78FA-02C6C1B5EF1B}"/>
+              </a:ext>
+            </a:extLst>
+          </p:cNvPr>
+          <p:cNvCxnSpPr>
+            <a:cxnSpLocks/>
+          </p:cNvCxnSpPr>
+          <p:nvPr/>
+        </p:nvCxnSpPr>
+        <p:spPr>
+          <a:xfrm>
+            <a:off x="4631133" y="1799175"/>
+            <a:ext cx="0" cy="1600355"/>
+          </a:xfrm>
+          <a:prstGeom prst="straightConnector1">
+            <a:avLst/>
+          </a:prstGeom>
+          <a:ln w="19050">
+            <a:prstDash val="sysDash"/>
+            <a:tailEnd type="triangle"/>
+          </a:ln>
+        </p:spPr>
+        <p:style>
+          <a:lnRef idx="1">
+            <a:schemeClr val="accent1"/>
+          </a:lnRef>
+          <a:fillRef idx="0">
+            <a:schemeClr val="accent1"/>
+          </a:fillRef>
+          <a:effectRef idx="0">
+            <a:schemeClr val="accent1"/>
+          </a:effectRef>
+          <a:fontRef idx="minor">
+            <a:schemeClr val="tx1"/>
+          </a:fontRef>
+        </p:style>
+      </p:cxnSp>
+      <p:sp>
+        <p:nvSpPr>
+          <p:cNvPr id="36" name="Arrow: Left 35">
+            <a:extLst>
+              <a:ext uri="{FF2B5EF4-FFF2-40B4-BE49-F238E27FC236}">
+                <a16:creationId xmlns:a16="http://schemas.microsoft.com/office/drawing/2014/main" id="{81F71DEA-23CC-3DD7-4D6E-5A6922E5E9EE}"/>
+              </a:ext>
+            </a:extLst>
+          </p:cNvPr>
+          <p:cNvSpPr/>
+          <p:nvPr/>
+        </p:nvSpPr>
+        <p:spPr>
+          <a:xfrm>
+            <a:off x="6188028" y="2207802"/>
+            <a:ext cx="1364376" cy="139337"/>
+          </a:xfrm>
+          <a:prstGeom prst="leftArrow">
+            <a:avLst/>
+          </a:prstGeom>
+        </p:spPr>
+        <p:style>
+          <a:lnRef idx="2">
+            <a:schemeClr val="accent1">
+              <a:shade val="15000"/>
+            </a:schemeClr>
+          </a:lnRef>
+          <a:fillRef idx="1">
+            <a:schemeClr val="accent1"/>
+          </a:fillRef>
+          <a:effectRef idx="0">
+            <a:schemeClr val="accent1"/>
+          </a:effectRef>
+          <a:fontRef idx="minor">
+            <a:schemeClr val="lt1"/>
+          </a:fontRef>
+        </p:style>
+        <p:txBody>
+          <a:bodyPr rtlCol="0" anchor="ctr"/>
+          <a:lstStyle/>
+          <a:p>
+            <a:pPr algn="ctr"/>
+            <a:endParaRPr lang="en-SG"/>
+          </a:p>
+        </p:txBody>
+      </p:sp>
+      <p:pic>
+        <p:nvPicPr>
+          <p:cNvPr id="41" name="Picture 40">
+            <a:extLst>
+              <a:ext uri="{FF2B5EF4-FFF2-40B4-BE49-F238E27FC236}">
+                <a16:creationId xmlns:a16="http://schemas.microsoft.com/office/drawing/2014/main" id="{1870F8A1-4D54-AAF0-2435-64BB8B2AF08E}"/>
+              </a:ext>
+            </a:extLst>
+          </p:cNvPr>
+          <p:cNvPicPr>
+            <a:picLocks noChangeAspect="1"/>
+          </p:cNvPicPr>
+          <p:nvPr/>
+        </p:nvPicPr>
+        <p:blipFill>
+          <a:blip r:embed="rId3"/>
+          <a:stretch>
+            <a:fillRect/>
+          </a:stretch>
+        </p:blipFill>
+        <p:spPr>
+          <a:xfrm>
+            <a:off x="3386237" y="1414795"/>
+            <a:ext cx="483274" cy="494013"/>
+          </a:xfrm>
+          <a:prstGeom prst="rect">
+            <a:avLst/>
+          </a:prstGeom>
+        </p:spPr>
+      </p:pic>
+      <p:sp>
+        <p:nvSpPr>
+          <p:cNvPr id="42" name="TextBox 41">
+            <a:extLst>
+              <a:ext uri="{FF2B5EF4-FFF2-40B4-BE49-F238E27FC236}">
+                <a16:creationId xmlns:a16="http://schemas.microsoft.com/office/drawing/2014/main" id="{0118B95D-C9E9-A96B-696A-D6EE1A19FEB7}"/>
+              </a:ext>
+            </a:extLst>
+          </p:cNvPr>
+          <p:cNvSpPr txBox="1"/>
+          <p:nvPr/>
+        </p:nvSpPr>
+        <p:spPr>
+          <a:xfrm>
+            <a:off x="3297384" y="1184361"/>
+            <a:ext cx="910357" cy="268469"/>
+          </a:xfrm>
+          <a:prstGeom prst="rect">
+            <a:avLst/>
+          </a:prstGeom>
+          <a:noFill/>
+        </p:spPr>
+        <p:txBody>
+          <a:bodyPr wrap="square">
+            <a:spAutoFit/>
+          </a:bodyPr>
+          <a:lstStyle/>
+          <a:p>
+            <a:r>
+              <a:rPr lang="en-US" sz="1100" b="1" dirty="0">
+                <a:solidFill>
+                  <a:schemeClr val="tx1">
+                    <a:lumMod val="75000"/>
+                    <a:lumOff val="25000"/>
+                  </a:schemeClr>
+                </a:solidFill>
+              </a:rPr>
+              <a:t>OpenAI</a:t>
+            </a:r>
+            <a:endParaRPr lang="en-SG" sz="1100" b="1" dirty="0">
+              <a:solidFill>
+                <a:schemeClr val="tx1">
+                  <a:lumMod val="75000"/>
+                  <a:lumOff val="25000"/>
+                </a:schemeClr>
+              </a:solidFill>
+            </a:endParaRPr>
+          </a:p>
+        </p:txBody>
+      </p:sp>
+      <p:sp>
+        <p:nvSpPr>
+          <p:cNvPr id="49" name="Rectangle 48">
+            <a:extLst>
+              <a:ext uri="{FF2B5EF4-FFF2-40B4-BE49-F238E27FC236}">
+                <a16:creationId xmlns:a16="http://schemas.microsoft.com/office/drawing/2014/main" id="{B6923272-2913-20CE-27D0-B258D6855585}"/>
+              </a:ext>
+            </a:extLst>
+          </p:cNvPr>
+          <p:cNvSpPr/>
+          <p:nvPr/>
+        </p:nvSpPr>
+        <p:spPr>
+          <a:xfrm>
+            <a:off x="4299803" y="3425696"/>
+            <a:ext cx="1518781" cy="296206"/>
+          </a:xfrm>
+          <a:prstGeom prst="rect">
+            <a:avLst/>
+          </a:prstGeom>
+        </p:spPr>
+        <p:style>
+          <a:lnRef idx="2">
+            <a:schemeClr val="accent1">
+              <a:shade val="50000"/>
+            </a:schemeClr>
+          </a:lnRef>
+          <a:fillRef idx="1">
+            <a:schemeClr val="accent1"/>
+          </a:fillRef>
+          <a:effectRef idx="0">
+            <a:schemeClr val="accent1"/>
+          </a:effectRef>
+          <a:fontRef idx="minor">
+            <a:schemeClr val="lt1"/>
+          </a:fontRef>
+        </p:style>
+        <p:txBody>
+          <a:bodyPr rtlCol="0" anchor="ctr"/>
+          <a:lstStyle/>
+          <a:p>
+            <a:r>
+              <a:rPr lang="en-US" sz="1200" b="1" dirty="0"/>
+              <a:t>Question categorizer   </a:t>
+            </a:r>
+            <a:endParaRPr lang="en-SG" sz="1200" b="1" dirty="0"/>
+          </a:p>
+        </p:txBody>
+      </p:sp>
+      <p:sp>
+        <p:nvSpPr>
+          <p:cNvPr id="57" name="TextBox 56">
+            <a:extLst>
+              <a:ext uri="{FF2B5EF4-FFF2-40B4-BE49-F238E27FC236}">
+                <a16:creationId xmlns:a16="http://schemas.microsoft.com/office/drawing/2014/main" id="{9A14D4B9-BBAC-2E95-0BA1-E127B540769B}"/>
+              </a:ext>
+            </a:extLst>
+          </p:cNvPr>
+          <p:cNvSpPr txBox="1"/>
+          <p:nvPr/>
+        </p:nvSpPr>
+        <p:spPr>
+          <a:xfrm>
+            <a:off x="3985289" y="4752211"/>
+            <a:ext cx="1049739" cy="400110"/>
+          </a:xfrm>
+          <a:prstGeom prst="rect">
+            <a:avLst/>
+          </a:prstGeom>
+          <a:noFill/>
+        </p:spPr>
+        <p:txBody>
+          <a:bodyPr wrap="square" rtlCol="0">
+            <a:spAutoFit/>
+          </a:bodyPr>
+          <a:lstStyle/>
+          <a:p>
+            <a:r>
+              <a:rPr lang="en-US" sz="1000" dirty="0"/>
+              <a:t>Standard MCQ result file.</a:t>
+            </a:r>
+            <a:endParaRPr lang="en-SG" sz="1000" dirty="0"/>
+          </a:p>
+        </p:txBody>
+      </p:sp>
+      <p:cxnSp>
+        <p:nvCxnSpPr>
+          <p:cNvPr id="84" name="Straight Arrow Connector 83">
+            <a:extLst>
+              <a:ext uri="{FF2B5EF4-FFF2-40B4-BE49-F238E27FC236}">
+                <a16:creationId xmlns:a16="http://schemas.microsoft.com/office/drawing/2014/main" id="{3902F617-F716-4BB3-B07E-001F12D7C9C2}"/>
+              </a:ext>
+            </a:extLst>
+          </p:cNvPr>
+          <p:cNvCxnSpPr>
+            <a:cxnSpLocks/>
+            <a:stCxn id="53" idx="1"/>
+            <a:endCxn id="41" idx="3"/>
+          </p:cNvCxnSpPr>
+          <p:nvPr/>
+        </p:nvCxnSpPr>
+        <p:spPr>
+          <a:xfrm flipH="1" flipV="1">
+            <a:off x="3869511" y="1661802"/>
+            <a:ext cx="473859" cy="1"/>
+          </a:xfrm>
+          <a:prstGeom prst="straightConnector1">
+            <a:avLst/>
+          </a:prstGeom>
+          <a:ln w="19050">
+            <a:solidFill>
+              <a:schemeClr val="accent6">
+                <a:lumMod val="75000"/>
+              </a:schemeClr>
+            </a:solidFill>
+            <a:headEnd type="triangle"/>
+            <a:tailEnd type="triangle"/>
+          </a:ln>
+        </p:spPr>
+        <p:style>
+          <a:lnRef idx="1">
+            <a:schemeClr val="accent1"/>
+          </a:lnRef>
+          <a:fillRef idx="0">
+            <a:schemeClr val="accent1"/>
+          </a:fillRef>
+          <a:effectRef idx="0">
+            <a:schemeClr val="accent1"/>
+          </a:effectRef>
+          <a:fontRef idx="minor">
+            <a:schemeClr val="tx1"/>
+          </a:fontRef>
+        </p:style>
+      </p:cxnSp>
+      <p:cxnSp>
+        <p:nvCxnSpPr>
+          <p:cNvPr id="89" name="Straight Arrow Connector 88">
+            <a:extLst>
+              <a:ext uri="{FF2B5EF4-FFF2-40B4-BE49-F238E27FC236}">
+                <a16:creationId xmlns:a16="http://schemas.microsoft.com/office/drawing/2014/main" id="{15DEC972-6B4C-9EF4-318E-32207AC548E6}"/>
+              </a:ext>
+            </a:extLst>
+          </p:cNvPr>
+          <p:cNvCxnSpPr>
+            <a:cxnSpLocks/>
+          </p:cNvCxnSpPr>
+          <p:nvPr/>
+        </p:nvCxnSpPr>
+        <p:spPr>
+          <a:xfrm>
+            <a:off x="4631133" y="3767349"/>
+            <a:ext cx="0" cy="326530"/>
+          </a:xfrm>
+          <a:prstGeom prst="straightConnector1">
+            <a:avLst/>
+          </a:prstGeom>
+          <a:ln w="19050">
+            <a:prstDash val="sysDash"/>
+            <a:tailEnd type="triangle"/>
+          </a:ln>
+        </p:spPr>
+        <p:style>
+          <a:lnRef idx="1">
+            <a:schemeClr val="accent1"/>
+          </a:lnRef>
+          <a:fillRef idx="0">
+            <a:schemeClr val="accent1"/>
+          </a:fillRef>
+          <a:effectRef idx="0">
+            <a:schemeClr val="accent1"/>
+          </a:effectRef>
+          <a:fontRef idx="minor">
+            <a:schemeClr val="tx1"/>
+          </a:fontRef>
+        </p:style>
+      </p:cxnSp>
+      <p:sp>
+        <p:nvSpPr>
+          <p:cNvPr id="92" name="Rectangle 91">
+            <a:extLst>
+              <a:ext uri="{FF2B5EF4-FFF2-40B4-BE49-F238E27FC236}">
+                <a16:creationId xmlns:a16="http://schemas.microsoft.com/office/drawing/2014/main" id="{CA99C8DF-840A-8294-B21C-8B3DEDACB212}"/>
+              </a:ext>
+            </a:extLst>
+          </p:cNvPr>
+          <p:cNvSpPr/>
+          <p:nvPr/>
+        </p:nvSpPr>
+        <p:spPr>
+          <a:xfrm>
+            <a:off x="4295765" y="4111721"/>
+            <a:ext cx="1503155" cy="326616"/>
+          </a:xfrm>
+          <a:prstGeom prst="rect">
+            <a:avLst/>
+          </a:prstGeom>
+        </p:spPr>
+        <p:style>
+          <a:lnRef idx="2">
+            <a:schemeClr val="accent1">
+              <a:shade val="50000"/>
+            </a:schemeClr>
+          </a:lnRef>
+          <a:fillRef idx="1">
+            <a:schemeClr val="accent1"/>
+          </a:fillRef>
+          <a:effectRef idx="0">
+            <a:schemeClr val="accent1"/>
+          </a:effectRef>
+          <a:fontRef idx="minor">
+            <a:schemeClr val="lt1"/>
+          </a:fontRef>
+        </p:style>
+        <p:txBody>
+          <a:bodyPr rtlCol="0" anchor="ctr"/>
+          <a:lstStyle/>
+          <a:p>
+            <a:r>
+              <a:rPr lang="en-US" sz="1200" b="1" dirty="0"/>
+              <a:t>Question Solver</a:t>
+            </a:r>
+            <a:endParaRPr lang="en-SG" sz="1200" b="1" dirty="0"/>
+          </a:p>
+        </p:txBody>
+      </p:sp>
+      <p:pic>
+        <p:nvPicPr>
+          <p:cNvPr id="95" name="Picture 94">
+            <a:extLst>
+              <a:ext uri="{FF2B5EF4-FFF2-40B4-BE49-F238E27FC236}">
+                <a16:creationId xmlns:a16="http://schemas.microsoft.com/office/drawing/2014/main" id="{46EE22DF-3B60-1255-3E80-5F5215F808DA}"/>
+              </a:ext>
+            </a:extLst>
+          </p:cNvPr>
+          <p:cNvPicPr>
+            <a:picLocks noChangeAspect="1"/>
+          </p:cNvPicPr>
+          <p:nvPr/>
+        </p:nvPicPr>
+        <p:blipFill>
+          <a:blip r:embed="rId2"/>
+          <a:stretch>
+            <a:fillRect/>
+          </a:stretch>
+        </p:blipFill>
+        <p:spPr>
+          <a:xfrm>
+            <a:off x="6184649" y="3387250"/>
+            <a:ext cx="324555" cy="372004"/>
+          </a:xfrm>
+          <a:prstGeom prst="rect">
+            <a:avLst/>
+          </a:prstGeom>
+        </p:spPr>
+      </p:pic>
+      <p:cxnSp>
+        <p:nvCxnSpPr>
+          <p:cNvPr id="98" name="Straight Arrow Connector 97">
+            <a:extLst>
+              <a:ext uri="{FF2B5EF4-FFF2-40B4-BE49-F238E27FC236}">
+                <a16:creationId xmlns:a16="http://schemas.microsoft.com/office/drawing/2014/main" id="{E8C0840E-779E-8411-4B5B-09BAC5F80EA9}"/>
+              </a:ext>
+            </a:extLst>
+          </p:cNvPr>
+          <p:cNvCxnSpPr>
+            <a:cxnSpLocks/>
+          </p:cNvCxnSpPr>
+          <p:nvPr/>
+        </p:nvCxnSpPr>
+        <p:spPr>
+          <a:xfrm>
+            <a:off x="5326586" y="2437769"/>
+            <a:ext cx="0" cy="987927"/>
+          </a:xfrm>
+          <a:prstGeom prst="straightConnector1">
+            <a:avLst/>
+          </a:prstGeom>
+          <a:ln>
+            <a:solidFill>
+              <a:schemeClr val="tx1"/>
+            </a:solidFill>
+            <a:tailEnd type="triangle"/>
+          </a:ln>
+        </p:spPr>
+        <p:style>
+          <a:lnRef idx="1">
+            <a:schemeClr val="accent1"/>
+          </a:lnRef>
+          <a:fillRef idx="0">
+            <a:schemeClr val="accent1"/>
+          </a:fillRef>
+          <a:effectRef idx="0">
+            <a:schemeClr val="accent1"/>
+          </a:effectRef>
+          <a:fontRef idx="minor">
+            <a:schemeClr val="tx1"/>
+          </a:fontRef>
+        </p:style>
+      </p:cxnSp>
+      <p:sp>
+        <p:nvSpPr>
+          <p:cNvPr id="102" name="TextBox 101">
+            <a:extLst>
+              <a:ext uri="{FF2B5EF4-FFF2-40B4-BE49-F238E27FC236}">
+                <a16:creationId xmlns:a16="http://schemas.microsoft.com/office/drawing/2014/main" id="{7A612350-E7DF-0F57-3C1C-11EA2566040E}"/>
+              </a:ext>
+            </a:extLst>
+          </p:cNvPr>
+          <p:cNvSpPr txBox="1"/>
+          <p:nvPr/>
+        </p:nvSpPr>
+        <p:spPr>
+          <a:xfrm>
+            <a:off x="6426842" y="3257636"/>
+            <a:ext cx="1009692" cy="553998"/>
+          </a:xfrm>
+          <a:prstGeom prst="rect">
+            <a:avLst/>
+          </a:prstGeom>
+          <a:noFill/>
+        </p:spPr>
+        <p:txBody>
+          <a:bodyPr wrap="square" rtlCol="0">
+            <a:spAutoFit/>
+          </a:bodyPr>
+          <a:lstStyle/>
+          <a:p>
+            <a:r>
+              <a:rPr lang="en-US" sz="1000" dirty="0"/>
+              <a:t>Question scenario prompt .</a:t>
+            </a:r>
+            <a:endParaRPr lang="en-SG" sz="1000" dirty="0"/>
+          </a:p>
+        </p:txBody>
+      </p:sp>
+      <p:sp>
+        <p:nvSpPr>
+          <p:cNvPr id="105" name="TextBox 104">
+            <a:extLst>
+              <a:ext uri="{FF2B5EF4-FFF2-40B4-BE49-F238E27FC236}">
+                <a16:creationId xmlns:a16="http://schemas.microsoft.com/office/drawing/2014/main" id="{2430709C-D9F5-6B28-41BB-FB5F3EC63CF4}"/>
+              </a:ext>
+            </a:extLst>
+          </p:cNvPr>
+          <p:cNvSpPr txBox="1"/>
+          <p:nvPr/>
+        </p:nvSpPr>
+        <p:spPr>
+          <a:xfrm>
+            <a:off x="6329809" y="1820167"/>
+            <a:ext cx="1062358" cy="430887"/>
+          </a:xfrm>
+          <a:prstGeom prst="rect">
+            <a:avLst/>
+          </a:prstGeom>
+          <a:noFill/>
+        </p:spPr>
+        <p:txBody>
+          <a:bodyPr wrap="square">
+            <a:spAutoFit/>
+          </a:bodyPr>
+          <a:lstStyle/>
+          <a:p>
+            <a:r>
+              <a:rPr lang="en-US" sz="1050" b="1" dirty="0">
+                <a:solidFill>
+                  <a:schemeClr val="tx1">
+                    <a:lumMod val="75000"/>
+                    <a:lumOff val="25000"/>
+                  </a:schemeClr>
+                </a:solidFill>
+              </a:rPr>
+              <a:t>Batch loading all MCQ source </a:t>
+            </a:r>
+            <a:endParaRPr lang="en-SG" sz="1050" b="1" dirty="0">
+              <a:solidFill>
+                <a:schemeClr val="tx1">
+                  <a:lumMod val="75000"/>
+                  <a:lumOff val="25000"/>
+                </a:schemeClr>
+              </a:solidFill>
+            </a:endParaRPr>
+          </a:p>
+        </p:txBody>
+      </p:sp>
+      <p:cxnSp>
+        <p:nvCxnSpPr>
+          <p:cNvPr id="20" name="Straight Arrow Connector 19">
+            <a:extLst>
+              <a:ext uri="{FF2B5EF4-FFF2-40B4-BE49-F238E27FC236}">
+                <a16:creationId xmlns:a16="http://schemas.microsoft.com/office/drawing/2014/main" id="{3CE728EC-0FCA-B686-C480-BEE3F552D808}"/>
+              </a:ext>
+            </a:extLst>
+          </p:cNvPr>
+          <p:cNvCxnSpPr>
+            <a:cxnSpLocks/>
+          </p:cNvCxnSpPr>
+          <p:nvPr/>
+        </p:nvCxnSpPr>
+        <p:spPr>
+          <a:xfrm>
+            <a:off x="1254182" y="883009"/>
+            <a:ext cx="415353" cy="0"/>
+          </a:xfrm>
+          <a:prstGeom prst="straightConnector1">
+            <a:avLst/>
+          </a:prstGeom>
+          <a:ln w="19050">
+            <a:prstDash val="sysDash"/>
+            <a:tailEnd type="triangle"/>
+          </a:ln>
+        </p:spPr>
+        <p:style>
+          <a:lnRef idx="1">
+            <a:schemeClr val="accent1"/>
+          </a:lnRef>
+          <a:fillRef idx="0">
+            <a:schemeClr val="accent1"/>
+          </a:fillRef>
+          <a:effectRef idx="0">
+            <a:schemeClr val="accent1"/>
+          </a:effectRef>
+          <a:fontRef idx="minor">
+            <a:schemeClr val="tx1"/>
+          </a:fontRef>
+        </p:style>
+      </p:cxnSp>
+      <p:sp>
+        <p:nvSpPr>
+          <p:cNvPr id="34" name="TextBox 33">
+            <a:extLst>
+              <a:ext uri="{FF2B5EF4-FFF2-40B4-BE49-F238E27FC236}">
+                <a16:creationId xmlns:a16="http://schemas.microsoft.com/office/drawing/2014/main" id="{E02ACAAB-63A5-9DAB-C90B-7FF80A53F175}"/>
+              </a:ext>
+            </a:extLst>
+          </p:cNvPr>
+          <p:cNvSpPr txBox="1"/>
+          <p:nvPr/>
+        </p:nvSpPr>
+        <p:spPr>
+          <a:xfrm>
+            <a:off x="1656922" y="753474"/>
+            <a:ext cx="1365772" cy="430887"/>
+          </a:xfrm>
+          <a:prstGeom prst="rect">
+            <a:avLst/>
+          </a:prstGeom>
+          <a:noFill/>
+        </p:spPr>
+        <p:txBody>
+          <a:bodyPr wrap="square">
+            <a:spAutoFit/>
+          </a:bodyPr>
+          <a:lstStyle/>
+          <a:p>
+            <a:r>
+              <a:rPr lang="en-US" sz="1100" b="1" dirty="0">
+                <a:solidFill>
+                  <a:schemeClr val="tx1">
+                    <a:lumMod val="75000"/>
+                    <a:lumOff val="25000"/>
+                  </a:schemeClr>
+                </a:solidFill>
+              </a:rPr>
+              <a:t>Program control or function call flow</a:t>
+            </a:r>
+            <a:endParaRPr lang="en-SG" sz="1100" b="1" dirty="0">
+              <a:solidFill>
+                <a:schemeClr val="tx1">
+                  <a:lumMod val="75000"/>
+                  <a:lumOff val="25000"/>
+                </a:schemeClr>
+              </a:solidFill>
+            </a:endParaRPr>
+          </a:p>
+        </p:txBody>
+      </p:sp>
+      <p:cxnSp>
+        <p:nvCxnSpPr>
+          <p:cNvPr id="35" name="Straight Arrow Connector 34">
+            <a:extLst>
+              <a:ext uri="{FF2B5EF4-FFF2-40B4-BE49-F238E27FC236}">
+                <a16:creationId xmlns:a16="http://schemas.microsoft.com/office/drawing/2014/main" id="{52D9A140-EE7E-C661-2675-D2DAA7E34A64}"/>
+              </a:ext>
+            </a:extLst>
+          </p:cNvPr>
+          <p:cNvCxnSpPr>
+            <a:cxnSpLocks/>
+          </p:cNvCxnSpPr>
+          <p:nvPr/>
+        </p:nvCxnSpPr>
+        <p:spPr>
+          <a:xfrm>
+            <a:off x="1240412" y="1434734"/>
+            <a:ext cx="371774" cy="0"/>
+          </a:xfrm>
+          <a:prstGeom prst="straightConnector1">
+            <a:avLst/>
+          </a:prstGeom>
+          <a:ln w="19050">
+            <a:solidFill>
+              <a:schemeClr val="accent6">
+                <a:lumMod val="75000"/>
+              </a:schemeClr>
+            </a:solidFill>
+            <a:headEnd type="triangle"/>
+            <a:tailEnd type="triangle"/>
+          </a:ln>
+        </p:spPr>
+        <p:style>
+          <a:lnRef idx="1">
+            <a:schemeClr val="accent1"/>
+          </a:lnRef>
+          <a:fillRef idx="0">
+            <a:schemeClr val="accent1"/>
+          </a:fillRef>
+          <a:effectRef idx="0">
+            <a:schemeClr val="accent1"/>
+          </a:effectRef>
+          <a:fontRef idx="minor">
+            <a:schemeClr val="tx1"/>
+          </a:fontRef>
+        </p:style>
+      </p:cxnSp>
+      <p:cxnSp>
+        <p:nvCxnSpPr>
+          <p:cNvPr id="40" name="Straight Arrow Connector 39">
+            <a:extLst>
+              <a:ext uri="{FF2B5EF4-FFF2-40B4-BE49-F238E27FC236}">
+                <a16:creationId xmlns:a16="http://schemas.microsoft.com/office/drawing/2014/main" id="{0F5D5E78-5996-B8CB-F51A-8F59CF856985}"/>
+              </a:ext>
+            </a:extLst>
+          </p:cNvPr>
+          <p:cNvCxnSpPr>
+            <a:cxnSpLocks/>
+          </p:cNvCxnSpPr>
+          <p:nvPr/>
+        </p:nvCxnSpPr>
+        <p:spPr>
+          <a:xfrm flipH="1">
+            <a:off x="1230469" y="1808488"/>
+            <a:ext cx="339538" cy="0"/>
+          </a:xfrm>
+          <a:prstGeom prst="straightConnector1">
+            <a:avLst/>
+          </a:prstGeom>
+          <a:ln>
+            <a:solidFill>
+              <a:schemeClr val="tx1"/>
+            </a:solidFill>
+            <a:tailEnd type="triangle"/>
+          </a:ln>
+        </p:spPr>
+        <p:style>
+          <a:lnRef idx="1">
+            <a:schemeClr val="accent1"/>
+          </a:lnRef>
+          <a:fillRef idx="0">
+            <a:schemeClr val="accent1"/>
+          </a:fillRef>
+          <a:effectRef idx="0">
+            <a:schemeClr val="accent1"/>
+          </a:effectRef>
+          <a:fontRef idx="minor">
+            <a:schemeClr val="tx1"/>
+          </a:fontRef>
+        </p:style>
+      </p:cxnSp>
+      <p:sp>
+        <p:nvSpPr>
+          <p:cNvPr id="46" name="Arrow: Left 45">
+            <a:extLst>
+              <a:ext uri="{FF2B5EF4-FFF2-40B4-BE49-F238E27FC236}">
+                <a16:creationId xmlns:a16="http://schemas.microsoft.com/office/drawing/2014/main" id="{428FCABD-5C43-3250-AA8E-CF18B3EEB222}"/>
+              </a:ext>
+            </a:extLst>
+          </p:cNvPr>
+          <p:cNvSpPr/>
+          <p:nvPr/>
+        </p:nvSpPr>
+        <p:spPr>
+          <a:xfrm>
+            <a:off x="1245844" y="1906232"/>
+            <a:ext cx="371774" cy="85375"/>
+          </a:xfrm>
+          <a:prstGeom prst="leftArrow">
+            <a:avLst/>
+          </a:prstGeom>
+        </p:spPr>
+        <p:style>
+          <a:lnRef idx="2">
+            <a:schemeClr val="accent1">
+              <a:shade val="15000"/>
+            </a:schemeClr>
+          </a:lnRef>
+          <a:fillRef idx="1">
+            <a:schemeClr val="accent1"/>
+          </a:fillRef>
+          <a:effectRef idx="0">
+            <a:schemeClr val="accent1"/>
+          </a:effectRef>
+          <a:fontRef idx="minor">
+            <a:schemeClr val="lt1"/>
+          </a:fontRef>
+        </p:style>
+        <p:txBody>
+          <a:bodyPr rtlCol="0" anchor="ctr"/>
+          <a:lstStyle/>
+          <a:p>
+            <a:pPr algn="ctr"/>
+            <a:endParaRPr lang="en-SG"/>
+          </a:p>
+        </p:txBody>
+      </p:sp>
+      <p:sp>
+        <p:nvSpPr>
+          <p:cNvPr id="50" name="TextBox 49">
+            <a:extLst>
+              <a:ext uri="{FF2B5EF4-FFF2-40B4-BE49-F238E27FC236}">
+                <a16:creationId xmlns:a16="http://schemas.microsoft.com/office/drawing/2014/main" id="{A409C2F2-B2F8-E595-C532-05201681678A}"/>
+              </a:ext>
+            </a:extLst>
+          </p:cNvPr>
+          <p:cNvSpPr txBox="1"/>
+          <p:nvPr/>
+        </p:nvSpPr>
+        <p:spPr>
+          <a:xfrm>
+            <a:off x="1682432" y="1219290"/>
+            <a:ext cx="1779393" cy="430887"/>
+          </a:xfrm>
+          <a:prstGeom prst="rect">
+            <a:avLst/>
+          </a:prstGeom>
+          <a:noFill/>
+        </p:spPr>
+        <p:txBody>
+          <a:bodyPr wrap="square">
+            <a:spAutoFit/>
+          </a:bodyPr>
+          <a:lstStyle/>
+          <a:p>
+            <a:r>
+              <a:rPr lang="en-US" sz="1100" b="1" dirty="0">
+                <a:solidFill>
+                  <a:schemeClr val="tx1">
+                    <a:lumMod val="75000"/>
+                    <a:lumOff val="25000"/>
+                  </a:schemeClr>
+                </a:solidFill>
+              </a:rPr>
+              <a:t>Communication </a:t>
+            </a:r>
+          </a:p>
+          <a:p>
+            <a:r>
+              <a:rPr lang="en-US" sz="1100" b="1" dirty="0">
+                <a:solidFill>
+                  <a:schemeClr val="tx1">
+                    <a:lumMod val="75000"/>
+                    <a:lumOff val="25000"/>
+                  </a:schemeClr>
+                </a:solidFill>
+              </a:rPr>
+              <a:t>with Open AI</a:t>
+            </a:r>
+            <a:endParaRPr lang="en-SG" sz="1100" b="1" dirty="0">
+              <a:solidFill>
+                <a:schemeClr val="tx1">
+                  <a:lumMod val="75000"/>
+                  <a:lumOff val="25000"/>
+                </a:schemeClr>
+              </a:solidFill>
+            </a:endParaRPr>
+          </a:p>
+        </p:txBody>
+      </p:sp>
+      <p:sp>
+        <p:nvSpPr>
+          <p:cNvPr id="51" name="TextBox 50">
+            <a:extLst>
+              <a:ext uri="{FF2B5EF4-FFF2-40B4-BE49-F238E27FC236}">
+                <a16:creationId xmlns:a16="http://schemas.microsoft.com/office/drawing/2014/main" id="{4FDDFA0C-D92F-D35A-F7F2-F8299D67F8E6}"/>
+              </a:ext>
+            </a:extLst>
+          </p:cNvPr>
+          <p:cNvSpPr txBox="1"/>
+          <p:nvPr/>
+        </p:nvSpPr>
+        <p:spPr>
+          <a:xfrm>
+            <a:off x="1658149" y="1715676"/>
+            <a:ext cx="1422648" cy="261610"/>
+          </a:xfrm>
+          <a:prstGeom prst="rect">
+            <a:avLst/>
+          </a:prstGeom>
+          <a:noFill/>
+        </p:spPr>
+        <p:txBody>
+          <a:bodyPr wrap="square">
+            <a:spAutoFit/>
+          </a:bodyPr>
+          <a:lstStyle/>
+          <a:p>
+            <a:r>
+              <a:rPr lang="en-US" sz="1100" b="1" dirty="0">
+                <a:solidFill>
+                  <a:schemeClr val="tx1">
+                    <a:lumMod val="75000"/>
+                    <a:lumOff val="25000"/>
+                  </a:schemeClr>
+                </a:solidFill>
+              </a:rPr>
+              <a:t>Data flow or file I/O</a:t>
+            </a:r>
+            <a:endParaRPr lang="en-SG" sz="1100" b="1" dirty="0">
+              <a:solidFill>
+                <a:schemeClr val="tx1">
+                  <a:lumMod val="75000"/>
+                  <a:lumOff val="25000"/>
+                </a:schemeClr>
+              </a:solidFill>
+            </a:endParaRPr>
+          </a:p>
+        </p:txBody>
+      </p:sp>
+      <p:cxnSp>
+        <p:nvCxnSpPr>
+          <p:cNvPr id="55" name="Connector: Elbow 54">
+            <a:extLst>
+              <a:ext uri="{FF2B5EF4-FFF2-40B4-BE49-F238E27FC236}">
+                <a16:creationId xmlns:a16="http://schemas.microsoft.com/office/drawing/2014/main" id="{918194BF-3402-2543-D226-798227C072F7}"/>
+              </a:ext>
+            </a:extLst>
+          </p:cNvPr>
+          <p:cNvCxnSpPr>
+            <a:cxnSpLocks/>
+          </p:cNvCxnSpPr>
+          <p:nvPr/>
+        </p:nvCxnSpPr>
+        <p:spPr>
+          <a:xfrm rot="10800000">
+            <a:off x="6199398" y="2437770"/>
+            <a:ext cx="3426547" cy="1581133"/>
+          </a:xfrm>
+          <a:prstGeom prst="bentConnector3">
+            <a:avLst>
+              <a:gd name="adj1" fmla="val 66422"/>
+            </a:avLst>
+          </a:prstGeom>
+          <a:ln w="19050">
+            <a:tailEnd type="triangle"/>
+          </a:ln>
+        </p:spPr>
+        <p:style>
+          <a:lnRef idx="1">
+            <a:schemeClr val="accent1"/>
+          </a:lnRef>
+          <a:fillRef idx="0">
+            <a:schemeClr val="accent1"/>
+          </a:fillRef>
+          <a:effectRef idx="0">
+            <a:schemeClr val="accent1"/>
+          </a:effectRef>
+          <a:fontRef idx="minor">
+            <a:schemeClr val="tx1"/>
+          </a:fontRef>
+        </p:style>
+      </p:cxnSp>
+      <p:cxnSp>
+        <p:nvCxnSpPr>
+          <p:cNvPr id="16" name="Straight Arrow Connector 15">
+            <a:extLst>
+              <a:ext uri="{FF2B5EF4-FFF2-40B4-BE49-F238E27FC236}">
+                <a16:creationId xmlns:a16="http://schemas.microsoft.com/office/drawing/2014/main" id="{493FB662-A3A3-108D-C068-0F329347E919}"/>
+              </a:ext>
+            </a:extLst>
+          </p:cNvPr>
+          <p:cNvCxnSpPr>
+            <a:cxnSpLocks/>
+          </p:cNvCxnSpPr>
+          <p:nvPr/>
+        </p:nvCxnSpPr>
+        <p:spPr>
+          <a:xfrm>
+            <a:off x="6675538" y="1304504"/>
+            <a:ext cx="0" cy="222769"/>
+          </a:xfrm>
+          <a:prstGeom prst="straightConnector1">
+            <a:avLst/>
+          </a:prstGeom>
+          <a:ln>
+            <a:solidFill>
+              <a:schemeClr val="tx1"/>
+            </a:solidFill>
+            <a:tailEnd type="triangle"/>
+          </a:ln>
+        </p:spPr>
+        <p:style>
+          <a:lnRef idx="1">
+            <a:schemeClr val="accent1"/>
+          </a:lnRef>
+          <a:fillRef idx="0">
+            <a:schemeClr val="accent1"/>
+          </a:fillRef>
+          <a:effectRef idx="0">
+            <a:schemeClr val="accent1"/>
+          </a:effectRef>
+          <a:fontRef idx="minor">
+            <a:schemeClr val="tx1"/>
+          </a:fontRef>
+        </p:style>
+      </p:cxnSp>
+      <p:pic>
+        <p:nvPicPr>
+          <p:cNvPr id="53" name="Picture 52">
+            <a:extLst>
+              <a:ext uri="{FF2B5EF4-FFF2-40B4-BE49-F238E27FC236}">
+                <a16:creationId xmlns:a16="http://schemas.microsoft.com/office/drawing/2014/main" id="{E4438534-3B55-1D19-1208-0268FBB14432}"/>
+              </a:ext>
+            </a:extLst>
+          </p:cNvPr>
+          <p:cNvPicPr>
+            <a:picLocks noChangeAspect="1"/>
+          </p:cNvPicPr>
+          <p:nvPr/>
+        </p:nvPicPr>
+        <p:blipFill>
+          <a:blip r:embed="rId4"/>
+          <a:stretch>
+            <a:fillRect/>
+          </a:stretch>
+        </p:blipFill>
+        <p:spPr>
+          <a:xfrm>
+            <a:off x="4343370" y="1541884"/>
+            <a:ext cx="1100124" cy="239837"/>
+          </a:xfrm>
+          <a:prstGeom prst="rect">
+            <a:avLst/>
+          </a:prstGeom>
+          <a:ln w="12700">
+            <a:solidFill>
+              <a:schemeClr val="tx1"/>
+            </a:solidFill>
+          </a:ln>
+        </p:spPr>
+      </p:pic>
+      <p:cxnSp>
+        <p:nvCxnSpPr>
+          <p:cNvPr id="66" name="Straight Arrow Connector 65">
+            <a:extLst>
+              <a:ext uri="{FF2B5EF4-FFF2-40B4-BE49-F238E27FC236}">
+                <a16:creationId xmlns:a16="http://schemas.microsoft.com/office/drawing/2014/main" id="{CFC837B5-9057-DC50-2AAE-C8071088C842}"/>
+              </a:ext>
+            </a:extLst>
+          </p:cNvPr>
+          <p:cNvCxnSpPr>
+            <a:cxnSpLocks/>
+          </p:cNvCxnSpPr>
+          <p:nvPr/>
+        </p:nvCxnSpPr>
+        <p:spPr>
+          <a:xfrm>
+            <a:off x="5818585" y="1238264"/>
+            <a:ext cx="0" cy="303620"/>
+          </a:xfrm>
+          <a:prstGeom prst="straightConnector1">
+            <a:avLst/>
+          </a:prstGeom>
+          <a:ln w="19050">
+            <a:prstDash val="sysDash"/>
+            <a:tailEnd type="triangle"/>
+          </a:ln>
+        </p:spPr>
+        <p:style>
+          <a:lnRef idx="1">
+            <a:schemeClr val="accent1"/>
+          </a:lnRef>
+          <a:fillRef idx="0">
+            <a:schemeClr val="accent1"/>
+          </a:fillRef>
+          <a:effectRef idx="0">
+            <a:schemeClr val="accent1"/>
+          </a:effectRef>
+          <a:fontRef idx="minor">
+            <a:schemeClr val="tx1"/>
+          </a:fontRef>
+        </p:style>
+      </p:cxnSp>
+      <p:cxnSp>
+        <p:nvCxnSpPr>
+          <p:cNvPr id="68" name="Straight Arrow Connector 67">
+            <a:extLst>
+              <a:ext uri="{FF2B5EF4-FFF2-40B4-BE49-F238E27FC236}">
+                <a16:creationId xmlns:a16="http://schemas.microsoft.com/office/drawing/2014/main" id="{7A478098-4FD1-9952-568E-B43AB0E942BC}"/>
+              </a:ext>
+            </a:extLst>
+          </p:cNvPr>
+          <p:cNvCxnSpPr>
+            <a:cxnSpLocks/>
+          </p:cNvCxnSpPr>
+          <p:nvPr/>
+        </p:nvCxnSpPr>
+        <p:spPr>
+          <a:xfrm>
+            <a:off x="5047343" y="1825476"/>
+            <a:ext cx="0" cy="303620"/>
+          </a:xfrm>
+          <a:prstGeom prst="straightConnector1">
+            <a:avLst/>
+          </a:prstGeom>
+          <a:ln w="19050">
+            <a:prstDash val="sysDash"/>
+            <a:tailEnd type="triangle"/>
+          </a:ln>
+        </p:spPr>
+        <p:style>
+          <a:lnRef idx="1">
+            <a:schemeClr val="accent1"/>
+          </a:lnRef>
+          <a:fillRef idx="0">
+            <a:schemeClr val="accent1"/>
+          </a:fillRef>
+          <a:effectRef idx="0">
+            <a:schemeClr val="accent1"/>
+          </a:effectRef>
+          <a:fontRef idx="minor">
+            <a:schemeClr val="tx1"/>
+          </a:fontRef>
+        </p:style>
+      </p:cxnSp>
+      <p:sp>
+        <p:nvSpPr>
+          <p:cNvPr id="72" name="Rectangle 71">
+            <a:extLst>
+              <a:ext uri="{FF2B5EF4-FFF2-40B4-BE49-F238E27FC236}">
+                <a16:creationId xmlns:a16="http://schemas.microsoft.com/office/drawing/2014/main" id="{EB74B99F-F0A2-9390-7F7E-C9565EB25F63}"/>
+              </a:ext>
+            </a:extLst>
+          </p:cNvPr>
+          <p:cNvSpPr/>
+          <p:nvPr/>
+        </p:nvSpPr>
+        <p:spPr>
+          <a:xfrm>
+            <a:off x="7572337" y="1546650"/>
+            <a:ext cx="2712349" cy="2134450"/>
+          </a:xfrm>
+          <a:prstGeom prst="rect">
+            <a:avLst/>
+          </a:prstGeom>
+          <a:solidFill>
+            <a:schemeClr val="accent6">
+              <a:lumMod val="20000"/>
+              <a:lumOff val="80000"/>
+            </a:schemeClr>
+          </a:solidFill>
+          <a:ln>
+            <a:prstDash val="sysDash"/>
+          </a:ln>
+        </p:spPr>
+        <p:style>
+          <a:lnRef idx="2">
+            <a:schemeClr val="accent1">
+              <a:shade val="15000"/>
+            </a:schemeClr>
+          </a:lnRef>
+          <a:fillRef idx="1">
+            <a:schemeClr val="accent1"/>
+          </a:fillRef>
+          <a:effectRef idx="0">
+            <a:schemeClr val="accent1"/>
+          </a:effectRef>
+          <a:fontRef idx="minor">
+            <a:schemeClr val="lt1"/>
+          </a:fontRef>
+        </p:style>
+        <p:txBody>
+          <a:bodyPr rtlCol="0" anchor="ctr"/>
+          <a:lstStyle/>
+          <a:p>
+            <a:pPr algn="ctr"/>
+            <a:endParaRPr lang="en-SG" dirty="0"/>
+          </a:p>
+        </p:txBody>
+      </p:sp>
+      <p:pic>
+        <p:nvPicPr>
+          <p:cNvPr id="73" name="Picture 72">
+            <a:extLst>
+              <a:ext uri="{FF2B5EF4-FFF2-40B4-BE49-F238E27FC236}">
+                <a16:creationId xmlns:a16="http://schemas.microsoft.com/office/drawing/2014/main" id="{A1AFA705-4381-D813-AF12-6B21B2024D1F}"/>
+              </a:ext>
+            </a:extLst>
+          </p:cNvPr>
+          <p:cNvPicPr>
+            <a:picLocks noChangeAspect="1"/>
+          </p:cNvPicPr>
+          <p:nvPr/>
+        </p:nvPicPr>
+        <p:blipFill>
+          <a:blip r:embed="rId5"/>
+          <a:stretch>
+            <a:fillRect/>
+          </a:stretch>
+        </p:blipFill>
+        <p:spPr>
+          <a:xfrm>
+            <a:off x="7864203" y="1906355"/>
+            <a:ext cx="336995" cy="389344"/>
+          </a:xfrm>
+          <a:prstGeom prst="rect">
+            <a:avLst/>
+          </a:prstGeom>
+          <a:ln w="3175">
+            <a:solidFill>
+              <a:schemeClr val="tx1"/>
+            </a:solidFill>
+          </a:ln>
+        </p:spPr>
+      </p:pic>
+      <p:pic>
+        <p:nvPicPr>
+          <p:cNvPr id="74" name="Picture 73">
+            <a:extLst>
+              <a:ext uri="{FF2B5EF4-FFF2-40B4-BE49-F238E27FC236}">
+                <a16:creationId xmlns:a16="http://schemas.microsoft.com/office/drawing/2014/main" id="{C8452BFA-D8A2-3BD8-78EC-441A33CC0ABD}"/>
+              </a:ext>
+            </a:extLst>
+          </p:cNvPr>
+          <p:cNvPicPr>
+            <a:picLocks noChangeAspect="1"/>
+          </p:cNvPicPr>
+          <p:nvPr/>
+        </p:nvPicPr>
+        <p:blipFill>
+          <a:blip r:embed="rId6"/>
+          <a:stretch>
+            <a:fillRect/>
+          </a:stretch>
+        </p:blipFill>
+        <p:spPr>
+          <a:xfrm>
+            <a:off x="7848672" y="2602177"/>
+            <a:ext cx="377556" cy="431493"/>
+          </a:xfrm>
+          <a:prstGeom prst="rect">
+            <a:avLst/>
+          </a:prstGeom>
+        </p:spPr>
+      </p:pic>
+      <p:pic>
+        <p:nvPicPr>
+          <p:cNvPr id="75" name="Picture 74">
+            <a:extLst>
+              <a:ext uri="{FF2B5EF4-FFF2-40B4-BE49-F238E27FC236}">
+                <a16:creationId xmlns:a16="http://schemas.microsoft.com/office/drawing/2014/main" id="{FC0E6430-709F-3C79-6912-D08B5B07B389}"/>
+              </a:ext>
+            </a:extLst>
+          </p:cNvPr>
+          <p:cNvPicPr>
+            <a:picLocks noChangeAspect="1"/>
+          </p:cNvPicPr>
+          <p:nvPr/>
+        </p:nvPicPr>
+        <p:blipFill>
+          <a:blip r:embed="rId7"/>
+          <a:stretch>
+            <a:fillRect/>
+          </a:stretch>
+        </p:blipFill>
+        <p:spPr>
+          <a:xfrm>
+            <a:off x="8629868" y="1885115"/>
+            <a:ext cx="420784" cy="427956"/>
+          </a:xfrm>
+          <a:prstGeom prst="rect">
+            <a:avLst/>
+          </a:prstGeom>
+          <a:ln w="3175">
+            <a:solidFill>
+              <a:schemeClr val="tx1"/>
+            </a:solidFill>
+          </a:ln>
+        </p:spPr>
+      </p:pic>
+      <p:pic>
+        <p:nvPicPr>
+          <p:cNvPr id="76" name="Picture 75">
+            <a:extLst>
+              <a:ext uri="{FF2B5EF4-FFF2-40B4-BE49-F238E27FC236}">
+                <a16:creationId xmlns:a16="http://schemas.microsoft.com/office/drawing/2014/main" id="{68F9F871-8C8F-2B28-FB79-8D820A9877D3}"/>
+              </a:ext>
+            </a:extLst>
+          </p:cNvPr>
+          <p:cNvPicPr>
+            <a:picLocks noChangeAspect="1"/>
+          </p:cNvPicPr>
+          <p:nvPr/>
+        </p:nvPicPr>
+        <p:blipFill>
+          <a:blip r:embed="rId8"/>
+          <a:stretch>
+            <a:fillRect/>
+          </a:stretch>
+        </p:blipFill>
+        <p:spPr>
+          <a:xfrm>
+            <a:off x="8613571" y="2599353"/>
+            <a:ext cx="392422" cy="414375"/>
+          </a:xfrm>
+          <a:prstGeom prst="rect">
+            <a:avLst/>
+          </a:prstGeom>
+        </p:spPr>
+      </p:pic>
+      <p:pic>
+        <p:nvPicPr>
+          <p:cNvPr id="77" name="Picture 76">
+            <a:extLst>
+              <a:ext uri="{FF2B5EF4-FFF2-40B4-BE49-F238E27FC236}">
+                <a16:creationId xmlns:a16="http://schemas.microsoft.com/office/drawing/2014/main" id="{76D1270C-C42C-A2F3-0CC4-3F87D5437ED8}"/>
+              </a:ext>
+            </a:extLst>
+          </p:cNvPr>
+          <p:cNvPicPr>
+            <a:picLocks noChangeAspect="1"/>
+          </p:cNvPicPr>
+          <p:nvPr/>
+        </p:nvPicPr>
+        <p:blipFill>
+          <a:blip r:embed="rId9"/>
+          <a:stretch>
+            <a:fillRect/>
+          </a:stretch>
+        </p:blipFill>
+        <p:spPr>
+          <a:xfrm>
+            <a:off x="7760961" y="3367372"/>
+            <a:ext cx="602386" cy="238306"/>
+          </a:xfrm>
+          <a:prstGeom prst="rect">
+            <a:avLst/>
+          </a:prstGeom>
+        </p:spPr>
+      </p:pic>
+      <p:pic>
+        <p:nvPicPr>
+          <p:cNvPr id="78" name="Picture 77">
+            <a:extLst>
+              <a:ext uri="{FF2B5EF4-FFF2-40B4-BE49-F238E27FC236}">
+                <a16:creationId xmlns:a16="http://schemas.microsoft.com/office/drawing/2014/main" id="{49966C68-63EC-828E-1730-6C38FA69A325}"/>
+              </a:ext>
+            </a:extLst>
+          </p:cNvPr>
+          <p:cNvPicPr>
+            <a:picLocks noChangeAspect="1"/>
+          </p:cNvPicPr>
+          <p:nvPr/>
+        </p:nvPicPr>
+        <p:blipFill>
+          <a:blip r:embed="rId10"/>
+          <a:stretch>
+            <a:fillRect/>
+          </a:stretch>
+        </p:blipFill>
+        <p:spPr>
+          <a:xfrm>
+            <a:off x="8441026" y="3318887"/>
+            <a:ext cx="368991" cy="297243"/>
+          </a:xfrm>
+          <a:prstGeom prst="rect">
+            <a:avLst/>
+          </a:prstGeom>
+        </p:spPr>
+      </p:pic>
+      <p:pic>
+        <p:nvPicPr>
+          <p:cNvPr id="79" name="Picture 78">
+            <a:extLst>
+              <a:ext uri="{FF2B5EF4-FFF2-40B4-BE49-F238E27FC236}">
+                <a16:creationId xmlns:a16="http://schemas.microsoft.com/office/drawing/2014/main" id="{077A0CF5-F4A9-2D24-33CA-D9A3CD651960}"/>
+              </a:ext>
+            </a:extLst>
+          </p:cNvPr>
+          <p:cNvPicPr>
+            <a:picLocks noChangeAspect="1"/>
+          </p:cNvPicPr>
+          <p:nvPr/>
+        </p:nvPicPr>
+        <p:blipFill>
+          <a:blip r:embed="rId11"/>
+          <a:stretch>
+            <a:fillRect/>
+          </a:stretch>
+        </p:blipFill>
+        <p:spPr>
+          <a:xfrm>
+            <a:off x="9505968" y="1989298"/>
+            <a:ext cx="519772" cy="330507"/>
+          </a:xfrm>
+          <a:prstGeom prst="rect">
+            <a:avLst/>
+          </a:prstGeom>
+        </p:spPr>
+      </p:pic>
+      <p:sp>
+        <p:nvSpPr>
+          <p:cNvPr id="80" name="TextBox 79">
+            <a:extLst>
+              <a:ext uri="{FF2B5EF4-FFF2-40B4-BE49-F238E27FC236}">
+                <a16:creationId xmlns:a16="http://schemas.microsoft.com/office/drawing/2014/main" id="{299B673F-F614-3323-CD47-4BC0D7CDA8D6}"/>
+              </a:ext>
+            </a:extLst>
+          </p:cNvPr>
+          <p:cNvSpPr txBox="1"/>
+          <p:nvPr/>
+        </p:nvSpPr>
+        <p:spPr>
+          <a:xfrm>
+            <a:off x="7572337" y="1615679"/>
+            <a:ext cx="910357" cy="268469"/>
+          </a:xfrm>
+          <a:prstGeom prst="rect">
+            <a:avLst/>
+          </a:prstGeom>
+          <a:noFill/>
+        </p:spPr>
+        <p:txBody>
+          <a:bodyPr wrap="square">
+            <a:spAutoFit/>
+          </a:bodyPr>
+          <a:lstStyle/>
+          <a:p>
+            <a:r>
+              <a:rPr lang="en-US" sz="1100" b="1" dirty="0">
+                <a:solidFill>
+                  <a:schemeClr val="tx1">
+                    <a:lumMod val="75000"/>
+                    <a:lumOff val="25000"/>
+                  </a:schemeClr>
+                </a:solidFill>
+              </a:rPr>
+              <a:t>PDF format </a:t>
+            </a:r>
+            <a:endParaRPr lang="en-SG" sz="1100" b="1" dirty="0">
+              <a:solidFill>
+                <a:schemeClr val="tx1">
+                  <a:lumMod val="75000"/>
+                  <a:lumOff val="25000"/>
+                </a:schemeClr>
+              </a:solidFill>
+            </a:endParaRPr>
+          </a:p>
+        </p:txBody>
+      </p:sp>
+      <p:sp>
+        <p:nvSpPr>
+          <p:cNvPr id="81" name="TextBox 80">
+            <a:extLst>
+              <a:ext uri="{FF2B5EF4-FFF2-40B4-BE49-F238E27FC236}">
+                <a16:creationId xmlns:a16="http://schemas.microsoft.com/office/drawing/2014/main" id="{DD8E391E-D4B9-0B9E-124E-E1604802D5AD}"/>
+              </a:ext>
+            </a:extLst>
+          </p:cNvPr>
+          <p:cNvSpPr txBox="1"/>
+          <p:nvPr/>
+        </p:nvSpPr>
+        <p:spPr>
+          <a:xfrm>
+            <a:off x="8507521" y="1612225"/>
+            <a:ext cx="910357" cy="268469"/>
+          </a:xfrm>
+          <a:prstGeom prst="rect">
+            <a:avLst/>
+          </a:prstGeom>
+          <a:noFill/>
+        </p:spPr>
+        <p:txBody>
+          <a:bodyPr wrap="square">
+            <a:spAutoFit/>
+          </a:bodyPr>
+          <a:lstStyle/>
+          <a:p>
+            <a:r>
+              <a:rPr lang="en-US" sz="1100" b="1" dirty="0">
+                <a:solidFill>
+                  <a:schemeClr val="tx1">
+                    <a:lumMod val="75000"/>
+                    <a:lumOff val="25000"/>
+                  </a:schemeClr>
+                </a:solidFill>
+              </a:rPr>
+              <a:t>Text format </a:t>
+            </a:r>
+            <a:endParaRPr lang="en-SG" sz="1100" b="1" dirty="0">
+              <a:solidFill>
+                <a:schemeClr val="tx1">
+                  <a:lumMod val="75000"/>
+                  <a:lumOff val="25000"/>
+                </a:schemeClr>
+              </a:solidFill>
+            </a:endParaRPr>
+          </a:p>
+        </p:txBody>
+      </p:sp>
+      <p:sp>
+        <p:nvSpPr>
+          <p:cNvPr id="82" name="TextBox 81">
+            <a:extLst>
+              <a:ext uri="{FF2B5EF4-FFF2-40B4-BE49-F238E27FC236}">
+                <a16:creationId xmlns:a16="http://schemas.microsoft.com/office/drawing/2014/main" id="{E00EE022-EC59-6E55-7112-F867665713D1}"/>
+              </a:ext>
+            </a:extLst>
+          </p:cNvPr>
+          <p:cNvSpPr txBox="1"/>
+          <p:nvPr/>
+        </p:nvSpPr>
+        <p:spPr>
+          <a:xfrm>
+            <a:off x="9457781" y="1591432"/>
+            <a:ext cx="910357" cy="430887"/>
+          </a:xfrm>
+          <a:prstGeom prst="rect">
+            <a:avLst/>
+          </a:prstGeom>
+          <a:noFill/>
+        </p:spPr>
+        <p:txBody>
+          <a:bodyPr wrap="square">
+            <a:spAutoFit/>
+          </a:bodyPr>
+          <a:lstStyle/>
+          <a:p>
+            <a:r>
+              <a:rPr lang="en-US" sz="1100" b="1" dirty="0">
+                <a:solidFill>
+                  <a:schemeClr val="tx1">
+                    <a:lumMod val="75000"/>
+                    <a:lumOff val="25000"/>
+                  </a:schemeClr>
+                </a:solidFill>
+              </a:rPr>
+              <a:t>Markdown format </a:t>
+            </a:r>
+            <a:endParaRPr lang="en-SG" sz="1100" b="1" dirty="0">
+              <a:solidFill>
+                <a:schemeClr val="tx1">
+                  <a:lumMod val="75000"/>
+                  <a:lumOff val="25000"/>
+                </a:schemeClr>
+              </a:solidFill>
+            </a:endParaRPr>
+          </a:p>
+        </p:txBody>
+      </p:sp>
+      <p:sp>
+        <p:nvSpPr>
+          <p:cNvPr id="83" name="TextBox 82">
+            <a:extLst>
+              <a:ext uri="{FF2B5EF4-FFF2-40B4-BE49-F238E27FC236}">
+                <a16:creationId xmlns:a16="http://schemas.microsoft.com/office/drawing/2014/main" id="{DBD4CF23-1031-E88B-6986-327B24919F7E}"/>
+              </a:ext>
+            </a:extLst>
+          </p:cNvPr>
+          <p:cNvSpPr txBox="1"/>
+          <p:nvPr/>
+        </p:nvSpPr>
+        <p:spPr>
+          <a:xfrm>
+            <a:off x="7580937" y="2318133"/>
+            <a:ext cx="1122644" cy="261610"/>
+          </a:xfrm>
+          <a:prstGeom prst="rect">
+            <a:avLst/>
+          </a:prstGeom>
+          <a:noFill/>
+        </p:spPr>
+        <p:txBody>
+          <a:bodyPr wrap="square">
+            <a:spAutoFit/>
+          </a:bodyPr>
+          <a:lstStyle/>
+          <a:p>
+            <a:r>
+              <a:rPr lang="en-US" sz="1100" b="1" dirty="0">
+                <a:solidFill>
+                  <a:schemeClr val="tx1">
+                    <a:lumMod val="75000"/>
+                    <a:lumOff val="25000"/>
+                  </a:schemeClr>
+                </a:solidFill>
+              </a:rPr>
+              <a:t>HTML format </a:t>
+            </a:r>
+            <a:endParaRPr lang="en-SG" sz="1100" b="1" dirty="0">
+              <a:solidFill>
+                <a:schemeClr val="tx1">
+                  <a:lumMod val="75000"/>
+                  <a:lumOff val="25000"/>
+                </a:schemeClr>
+              </a:solidFill>
+            </a:endParaRPr>
+          </a:p>
+        </p:txBody>
+      </p:sp>
+      <p:sp>
+        <p:nvSpPr>
+          <p:cNvPr id="85" name="TextBox 84">
+            <a:extLst>
+              <a:ext uri="{FF2B5EF4-FFF2-40B4-BE49-F238E27FC236}">
+                <a16:creationId xmlns:a16="http://schemas.microsoft.com/office/drawing/2014/main" id="{D0EF323B-5A9C-7B52-D5F5-A292B04D629F}"/>
+              </a:ext>
+            </a:extLst>
+          </p:cNvPr>
+          <p:cNvSpPr txBox="1"/>
+          <p:nvPr/>
+        </p:nvSpPr>
+        <p:spPr>
+          <a:xfrm>
+            <a:off x="8550285" y="2343285"/>
+            <a:ext cx="455312" cy="261610"/>
+          </a:xfrm>
+          <a:prstGeom prst="rect">
+            <a:avLst/>
+          </a:prstGeom>
+          <a:noFill/>
+        </p:spPr>
+        <p:txBody>
+          <a:bodyPr wrap="square">
+            <a:spAutoFit/>
+          </a:bodyPr>
+          <a:lstStyle/>
+          <a:p>
+            <a:r>
+              <a:rPr lang="en-US" sz="1100" b="1" dirty="0">
+                <a:solidFill>
+                  <a:schemeClr val="tx1">
+                    <a:lumMod val="75000"/>
+                    <a:lumOff val="25000"/>
+                  </a:schemeClr>
+                </a:solidFill>
+              </a:rPr>
+              <a:t>URL </a:t>
+            </a:r>
+          </a:p>
+        </p:txBody>
+      </p:sp>
+      <p:sp>
+        <p:nvSpPr>
+          <p:cNvPr id="86" name="TextBox 85">
+            <a:extLst>
+              <a:ext uri="{FF2B5EF4-FFF2-40B4-BE49-F238E27FC236}">
+                <a16:creationId xmlns:a16="http://schemas.microsoft.com/office/drawing/2014/main" id="{CA0AD7F6-606E-0869-DB23-2CB544DE1D2A}"/>
+              </a:ext>
+            </a:extLst>
+          </p:cNvPr>
+          <p:cNvSpPr txBox="1"/>
+          <p:nvPr/>
+        </p:nvSpPr>
+        <p:spPr>
+          <a:xfrm>
+            <a:off x="7609165" y="3071780"/>
+            <a:ext cx="1727342" cy="261610"/>
+          </a:xfrm>
+          <a:prstGeom prst="rect">
+            <a:avLst/>
+          </a:prstGeom>
+          <a:noFill/>
+        </p:spPr>
+        <p:txBody>
+          <a:bodyPr wrap="square">
+            <a:spAutoFit/>
+          </a:bodyPr>
+          <a:lstStyle/>
+          <a:p>
+            <a:r>
+              <a:rPr lang="en-US" sz="1100" b="1" dirty="0">
+                <a:solidFill>
+                  <a:schemeClr val="tx1">
+                    <a:lumMod val="75000"/>
+                    <a:lumOff val="25000"/>
+                  </a:schemeClr>
+                </a:solidFill>
+              </a:rPr>
+              <a:t>CTF-D URL + login cookie</a:t>
+            </a:r>
+            <a:endParaRPr lang="en-SG" sz="1100" b="1" dirty="0">
+              <a:solidFill>
+                <a:schemeClr val="tx1">
+                  <a:lumMod val="75000"/>
+                  <a:lumOff val="25000"/>
+                </a:schemeClr>
+              </a:solidFill>
+            </a:endParaRPr>
+          </a:p>
+        </p:txBody>
+      </p:sp>
+      <p:sp>
+        <p:nvSpPr>
+          <p:cNvPr id="87" name="TextBox 86">
+            <a:extLst>
+              <a:ext uri="{FF2B5EF4-FFF2-40B4-BE49-F238E27FC236}">
+                <a16:creationId xmlns:a16="http://schemas.microsoft.com/office/drawing/2014/main" id="{1056ACF3-3FCE-07A6-40A2-960B4C2A6AF0}"/>
+              </a:ext>
+            </a:extLst>
+          </p:cNvPr>
+          <p:cNvSpPr txBox="1"/>
+          <p:nvPr/>
+        </p:nvSpPr>
+        <p:spPr>
+          <a:xfrm>
+            <a:off x="7624344" y="1280724"/>
+            <a:ext cx="2646932" cy="276999"/>
+          </a:xfrm>
+          <a:prstGeom prst="rect">
+            <a:avLst/>
+          </a:prstGeom>
+          <a:noFill/>
+        </p:spPr>
+        <p:txBody>
+          <a:bodyPr wrap="square">
+            <a:spAutoFit/>
+          </a:bodyPr>
+          <a:lstStyle/>
+          <a:p>
+            <a:r>
+              <a:rPr lang="en-US" sz="1200" b="1" dirty="0">
+                <a:solidFill>
+                  <a:schemeClr val="tx1">
+                    <a:lumMod val="75000"/>
+                    <a:lumOff val="25000"/>
+                  </a:schemeClr>
+                </a:solidFill>
+              </a:rPr>
+              <a:t>Security Multi-choice question source</a:t>
+            </a:r>
+            <a:endParaRPr lang="en-SG" sz="1200" b="1" dirty="0">
+              <a:solidFill>
+                <a:schemeClr val="tx1">
+                  <a:lumMod val="75000"/>
+                  <a:lumOff val="25000"/>
+                </a:schemeClr>
+              </a:solidFill>
+            </a:endParaRPr>
+          </a:p>
+        </p:txBody>
+      </p:sp>
+      <p:pic>
+        <p:nvPicPr>
+          <p:cNvPr id="88" name="Picture 2" descr="Json file - Free ui icons">
+            <a:extLst>
+              <a:ext uri="{FF2B5EF4-FFF2-40B4-BE49-F238E27FC236}">
+                <a16:creationId xmlns:a16="http://schemas.microsoft.com/office/drawing/2014/main" id="{C03762B4-6BE0-839C-8985-46678162230E}"/>
+              </a:ext>
+            </a:extLst>
+          </p:cNvPr>
+          <p:cNvPicPr>
+            <a:picLocks noChangeAspect="1" noChangeArrowheads="1"/>
+          </p:cNvPicPr>
+          <p:nvPr/>
+        </p:nvPicPr>
+        <p:blipFill>
+          <a:blip r:embed="rId12">
+            <a:extLst>
+              <a:ext uri="{28A0092B-C50C-407E-A947-70E740481C1C}">
+                <a14:useLocalDpi xmlns:a14="http://schemas.microsoft.com/office/drawing/2010/main" val="0"/>
+              </a:ext>
+            </a:extLst>
+          </a:blip>
+          <a:srcRect/>
+          <a:stretch>
+            <a:fillRect/>
+          </a:stretch>
+        </p:blipFill>
+        <p:spPr bwMode="auto">
+          <a:xfrm>
+            <a:off x="9464565" y="2544331"/>
+            <a:ext cx="455312" cy="455312"/>
+          </a:xfrm>
+          <a:prstGeom prst="rect">
+            <a:avLst/>
+          </a:prstGeom>
+          <a:noFill/>
+          <a:extLst>
+            <a:ext uri="{909E8E84-426E-40DD-AFC4-6F175D3DCCD1}">
+              <a14:hiddenFill xmlns:a14="http://schemas.microsoft.com/office/drawing/2010/main">
+                <a:solidFill>
+                  <a:srgbClr val="FFFFFF"/>
+                </a:solidFill>
+              </a14:hiddenFill>
+            </a:ext>
+          </a:extLst>
+        </p:spPr>
+      </p:pic>
+      <p:sp>
+        <p:nvSpPr>
+          <p:cNvPr id="90" name="TextBox 89">
+            <a:extLst>
+              <a:ext uri="{FF2B5EF4-FFF2-40B4-BE49-F238E27FC236}">
+                <a16:creationId xmlns:a16="http://schemas.microsoft.com/office/drawing/2014/main" id="{ABAB0266-EA14-7741-9929-9EE86F3DFA0F}"/>
+              </a:ext>
+            </a:extLst>
+          </p:cNvPr>
+          <p:cNvSpPr txBox="1"/>
+          <p:nvPr/>
+        </p:nvSpPr>
+        <p:spPr>
+          <a:xfrm>
+            <a:off x="9467176" y="2340170"/>
+            <a:ext cx="1027171" cy="261610"/>
+          </a:xfrm>
+          <a:prstGeom prst="rect">
+            <a:avLst/>
+          </a:prstGeom>
+          <a:noFill/>
+        </p:spPr>
+        <p:txBody>
+          <a:bodyPr wrap="square">
+            <a:spAutoFit/>
+          </a:bodyPr>
+          <a:lstStyle/>
+          <a:p>
+            <a:r>
+              <a:rPr lang="en-US" sz="1100" b="1" dirty="0">
+                <a:solidFill>
+                  <a:schemeClr val="tx1">
+                    <a:lumMod val="75000"/>
+                    <a:lumOff val="25000"/>
+                  </a:schemeClr>
+                </a:solidFill>
+              </a:rPr>
+              <a:t>Json format  </a:t>
+            </a:r>
+          </a:p>
+        </p:txBody>
+      </p:sp>
+      <p:sp>
+        <p:nvSpPr>
+          <p:cNvPr id="91" name="TextBox 90">
+            <a:extLst>
+              <a:ext uri="{FF2B5EF4-FFF2-40B4-BE49-F238E27FC236}">
+                <a16:creationId xmlns:a16="http://schemas.microsoft.com/office/drawing/2014/main" id="{4F62F30F-753F-1BCA-50C6-7DFFD580AE9F}"/>
+              </a:ext>
+            </a:extLst>
+          </p:cNvPr>
+          <p:cNvSpPr txBox="1"/>
+          <p:nvPr/>
+        </p:nvSpPr>
+        <p:spPr>
+          <a:xfrm>
+            <a:off x="8850657" y="2329356"/>
+            <a:ext cx="707037" cy="400110"/>
+          </a:xfrm>
+          <a:prstGeom prst="rect">
+            <a:avLst/>
+          </a:prstGeom>
+          <a:noFill/>
+        </p:spPr>
+        <p:txBody>
+          <a:bodyPr wrap="square" rtlCol="0">
+            <a:spAutoFit/>
+          </a:bodyPr>
+          <a:lstStyle/>
+          <a:p>
+            <a:r>
+              <a:rPr lang="en-SG" sz="1000" dirty="0"/>
+              <a:t>( Without login)</a:t>
+            </a:r>
+          </a:p>
+        </p:txBody>
+      </p:sp>
+      <p:pic>
+        <p:nvPicPr>
+          <p:cNvPr id="93" name="Picture 92">
+            <a:extLst>
+              <a:ext uri="{FF2B5EF4-FFF2-40B4-BE49-F238E27FC236}">
+                <a16:creationId xmlns:a16="http://schemas.microsoft.com/office/drawing/2014/main" id="{BF4C88A8-A15C-2342-311A-5285CFAAAAC3}"/>
+              </a:ext>
+            </a:extLst>
+          </p:cNvPr>
+          <p:cNvPicPr>
+            <a:picLocks noChangeAspect="1"/>
+          </p:cNvPicPr>
+          <p:nvPr/>
+        </p:nvPicPr>
+        <p:blipFill>
+          <a:blip r:embed="rId13"/>
+          <a:stretch>
+            <a:fillRect/>
+          </a:stretch>
+        </p:blipFill>
+        <p:spPr>
+          <a:xfrm>
+            <a:off x="9544694" y="3335356"/>
+            <a:ext cx="346012" cy="270322"/>
+          </a:xfrm>
+          <a:prstGeom prst="rect">
+            <a:avLst/>
+          </a:prstGeom>
+        </p:spPr>
+      </p:pic>
+      <p:sp>
+        <p:nvSpPr>
+          <p:cNvPr id="94" name="TextBox 93">
+            <a:extLst>
+              <a:ext uri="{FF2B5EF4-FFF2-40B4-BE49-F238E27FC236}">
+                <a16:creationId xmlns:a16="http://schemas.microsoft.com/office/drawing/2014/main" id="{AF46911D-300A-080C-4766-B0CEA55CCDAA}"/>
+              </a:ext>
+            </a:extLst>
+          </p:cNvPr>
+          <p:cNvSpPr txBox="1"/>
+          <p:nvPr/>
+        </p:nvSpPr>
+        <p:spPr>
+          <a:xfrm>
+            <a:off x="9277448" y="3057277"/>
+            <a:ext cx="1027171" cy="261610"/>
+          </a:xfrm>
+          <a:prstGeom prst="rect">
+            <a:avLst/>
+          </a:prstGeom>
+          <a:noFill/>
+        </p:spPr>
+        <p:txBody>
+          <a:bodyPr wrap="square">
+            <a:spAutoFit/>
+          </a:bodyPr>
+          <a:lstStyle/>
+          <a:p>
+            <a:r>
+              <a:rPr lang="en-US" sz="1100" b="1" dirty="0">
+                <a:solidFill>
+                  <a:schemeClr val="tx1">
+                    <a:lumMod val="75000"/>
+                    <a:lumOff val="25000"/>
+                  </a:schemeClr>
+                </a:solidFill>
+              </a:rPr>
+              <a:t>Image format  </a:t>
+            </a:r>
+          </a:p>
+        </p:txBody>
+      </p:sp>
+      <p:pic>
+        <p:nvPicPr>
+          <p:cNvPr id="39" name="Picture 38">
+            <a:extLst>
+              <a:ext uri="{FF2B5EF4-FFF2-40B4-BE49-F238E27FC236}">
+                <a16:creationId xmlns:a16="http://schemas.microsoft.com/office/drawing/2014/main" id="{83D5C2CA-072D-40E0-2FF7-ADD280251058}"/>
+              </a:ext>
+            </a:extLst>
+          </p:cNvPr>
+          <p:cNvPicPr>
+            <a:picLocks noChangeAspect="1"/>
+          </p:cNvPicPr>
+          <p:nvPr/>
+        </p:nvPicPr>
+        <p:blipFill>
+          <a:blip r:embed="rId14"/>
+          <a:stretch>
+            <a:fillRect/>
+          </a:stretch>
+        </p:blipFill>
+        <p:spPr>
+          <a:xfrm>
+            <a:off x="9376001" y="3826127"/>
+            <a:ext cx="910358" cy="535504"/>
+          </a:xfrm>
+          <a:prstGeom prst="rect">
+            <a:avLst/>
+          </a:prstGeom>
+          <a:ln w="12700">
+            <a:solidFill>
+              <a:schemeClr val="tx1"/>
+            </a:solidFill>
+          </a:ln>
+        </p:spPr>
+      </p:pic>
+      <p:cxnSp>
+        <p:nvCxnSpPr>
+          <p:cNvPr id="107" name="Straight Arrow Connector 106">
+            <a:extLst>
+              <a:ext uri="{FF2B5EF4-FFF2-40B4-BE49-F238E27FC236}">
+                <a16:creationId xmlns:a16="http://schemas.microsoft.com/office/drawing/2014/main" id="{C4FCE785-F79A-3D4A-B215-7ADAEF869C94}"/>
+              </a:ext>
+            </a:extLst>
+          </p:cNvPr>
+          <p:cNvCxnSpPr>
+            <a:cxnSpLocks/>
+            <a:stCxn id="93" idx="2"/>
+          </p:cNvCxnSpPr>
+          <p:nvPr/>
+        </p:nvCxnSpPr>
+        <p:spPr>
+          <a:xfrm flipH="1">
+            <a:off x="9717699" y="3605678"/>
+            <a:ext cx="1" cy="209351"/>
+          </a:xfrm>
+          <a:prstGeom prst="straightConnector1">
+            <a:avLst/>
+          </a:prstGeom>
+          <a:ln>
+            <a:solidFill>
+              <a:schemeClr val="tx1"/>
+            </a:solidFill>
+            <a:tailEnd type="triangle"/>
+          </a:ln>
+        </p:spPr>
+        <p:style>
+          <a:lnRef idx="1">
+            <a:schemeClr val="accent1"/>
+          </a:lnRef>
+          <a:fillRef idx="0">
+            <a:schemeClr val="accent1"/>
+          </a:fillRef>
+          <a:effectRef idx="0">
+            <a:schemeClr val="accent1"/>
+          </a:effectRef>
+          <a:fontRef idx="minor">
+            <a:schemeClr val="tx1"/>
+          </a:fontRef>
+        </p:style>
+      </p:cxnSp>
+      <p:pic>
+        <p:nvPicPr>
+          <p:cNvPr id="100" name="Picture 99">
+            <a:extLst>
+              <a:ext uri="{FF2B5EF4-FFF2-40B4-BE49-F238E27FC236}">
+                <a16:creationId xmlns:a16="http://schemas.microsoft.com/office/drawing/2014/main" id="{268C05BA-9F60-AB80-0983-D3073A639C56}"/>
+              </a:ext>
+            </a:extLst>
+          </p:cNvPr>
+          <p:cNvPicPr>
+            <a:picLocks noChangeAspect="1"/>
+          </p:cNvPicPr>
+          <p:nvPr/>
+        </p:nvPicPr>
+        <p:blipFill>
+          <a:blip r:embed="rId15"/>
+          <a:stretch>
+            <a:fillRect/>
+          </a:stretch>
+        </p:blipFill>
+        <p:spPr>
+          <a:xfrm>
+            <a:off x="5158119" y="2658852"/>
+            <a:ext cx="396531" cy="517485"/>
+          </a:xfrm>
+          <a:prstGeom prst="rect">
+            <a:avLst/>
+          </a:prstGeom>
+          <a:ln w="12700">
+            <a:solidFill>
+              <a:schemeClr val="tx1"/>
+            </a:solidFill>
+          </a:ln>
+        </p:spPr>
+      </p:pic>
+      <p:sp>
+        <p:nvSpPr>
+          <p:cNvPr id="103" name="TextBox 102">
+            <a:extLst>
+              <a:ext uri="{FF2B5EF4-FFF2-40B4-BE49-F238E27FC236}">
+                <a16:creationId xmlns:a16="http://schemas.microsoft.com/office/drawing/2014/main" id="{8E30F876-B087-0F82-92C1-226584D7F9F5}"/>
+              </a:ext>
+            </a:extLst>
+          </p:cNvPr>
+          <p:cNvSpPr txBox="1"/>
+          <p:nvPr/>
+        </p:nvSpPr>
+        <p:spPr>
+          <a:xfrm>
+            <a:off x="5515551" y="2577999"/>
+            <a:ext cx="1148103" cy="577081"/>
+          </a:xfrm>
+          <a:prstGeom prst="rect">
+            <a:avLst/>
+          </a:prstGeom>
+          <a:noFill/>
+        </p:spPr>
+        <p:txBody>
+          <a:bodyPr wrap="square">
+            <a:spAutoFit/>
+          </a:bodyPr>
+          <a:lstStyle/>
+          <a:p>
+            <a:r>
+              <a:rPr lang="en-US" sz="1050" b="1" dirty="0">
+                <a:solidFill>
+                  <a:schemeClr val="tx1">
+                    <a:lumMod val="75000"/>
+                    <a:lumOff val="25000"/>
+                  </a:schemeClr>
+                </a:solidFill>
+              </a:rPr>
+              <a:t>Text Format MCQ question back file</a:t>
+            </a:r>
+            <a:endParaRPr lang="en-SG" sz="1050" b="1" dirty="0">
+              <a:solidFill>
+                <a:schemeClr val="tx1">
+                  <a:lumMod val="75000"/>
+                  <a:lumOff val="25000"/>
+                </a:schemeClr>
+              </a:solidFill>
+            </a:endParaRPr>
+          </a:p>
+        </p:txBody>
+      </p:sp>
+      <p:cxnSp>
+        <p:nvCxnSpPr>
+          <p:cNvPr id="109" name="Straight Arrow Connector 108">
+            <a:extLst>
+              <a:ext uri="{FF2B5EF4-FFF2-40B4-BE49-F238E27FC236}">
+                <a16:creationId xmlns:a16="http://schemas.microsoft.com/office/drawing/2014/main" id="{DBC76B1C-3AC1-AF8B-0C4D-EE0E10A3073E}"/>
+              </a:ext>
+            </a:extLst>
+          </p:cNvPr>
+          <p:cNvCxnSpPr>
+            <a:cxnSpLocks/>
+            <a:stCxn id="95" idx="1"/>
+            <a:endCxn id="49" idx="3"/>
+          </p:cNvCxnSpPr>
+          <p:nvPr/>
+        </p:nvCxnSpPr>
+        <p:spPr>
+          <a:xfrm flipH="1">
+            <a:off x="5818584" y="3573252"/>
+            <a:ext cx="366065" cy="547"/>
+          </a:xfrm>
+          <a:prstGeom prst="straightConnector1">
+            <a:avLst/>
+          </a:prstGeom>
+          <a:ln>
+            <a:solidFill>
+              <a:schemeClr val="tx1"/>
+            </a:solidFill>
+            <a:tailEnd type="triangle"/>
+          </a:ln>
+        </p:spPr>
+        <p:style>
+          <a:lnRef idx="1">
+            <a:schemeClr val="accent1"/>
+          </a:lnRef>
+          <a:fillRef idx="0">
+            <a:schemeClr val="accent1"/>
+          </a:fillRef>
+          <a:effectRef idx="0">
+            <a:schemeClr val="accent1"/>
+          </a:effectRef>
+          <a:fontRef idx="minor">
+            <a:schemeClr val="tx1"/>
+          </a:fontRef>
+        </p:style>
+      </p:cxnSp>
+      <p:pic>
+        <p:nvPicPr>
+          <p:cNvPr id="117" name="Picture 116">
+            <a:extLst>
+              <a:ext uri="{FF2B5EF4-FFF2-40B4-BE49-F238E27FC236}">
+                <a16:creationId xmlns:a16="http://schemas.microsoft.com/office/drawing/2014/main" id="{971B9B8C-ACF1-0D4A-FED5-6F29C3456516}"/>
+              </a:ext>
+            </a:extLst>
+          </p:cNvPr>
+          <p:cNvPicPr>
+            <a:picLocks noChangeAspect="1"/>
+          </p:cNvPicPr>
+          <p:nvPr/>
+        </p:nvPicPr>
+        <p:blipFill rotWithShape="1">
+          <a:blip r:embed="rId16"/>
+          <a:srcRect l="76289"/>
+          <a:stretch/>
+        </p:blipFill>
+        <p:spPr>
+          <a:xfrm>
+            <a:off x="4952931" y="4708514"/>
+            <a:ext cx="394367" cy="487504"/>
+          </a:xfrm>
+          <a:prstGeom prst="rect">
+            <a:avLst/>
+          </a:prstGeom>
+          <a:ln w="9525">
+            <a:solidFill>
+              <a:schemeClr val="tx1"/>
+            </a:solidFill>
+          </a:ln>
+        </p:spPr>
+      </p:pic>
+      <p:cxnSp>
+        <p:nvCxnSpPr>
+          <p:cNvPr id="118" name="Straight Arrow Connector 117">
+            <a:extLst>
+              <a:ext uri="{FF2B5EF4-FFF2-40B4-BE49-F238E27FC236}">
+                <a16:creationId xmlns:a16="http://schemas.microsoft.com/office/drawing/2014/main" id="{9C56066E-CCF0-68B2-A527-7B447F01A707}"/>
+              </a:ext>
+            </a:extLst>
+          </p:cNvPr>
+          <p:cNvCxnSpPr>
+            <a:cxnSpLocks/>
+            <a:endCxn id="117" idx="0"/>
+          </p:cNvCxnSpPr>
+          <p:nvPr/>
+        </p:nvCxnSpPr>
+        <p:spPr>
+          <a:xfrm>
+            <a:off x="5150114" y="4438337"/>
+            <a:ext cx="1" cy="270177"/>
+          </a:xfrm>
+          <a:prstGeom prst="straightConnector1">
+            <a:avLst/>
+          </a:prstGeom>
+          <a:ln>
+            <a:solidFill>
+              <a:schemeClr val="tx1"/>
+            </a:solidFill>
+            <a:tailEnd type="triangle"/>
+          </a:ln>
+        </p:spPr>
+        <p:style>
+          <a:lnRef idx="1">
+            <a:schemeClr val="accent1"/>
+          </a:lnRef>
+          <a:fillRef idx="0">
+            <a:schemeClr val="accent1"/>
+          </a:fillRef>
+          <a:effectRef idx="0">
+            <a:schemeClr val="accent1"/>
+          </a:effectRef>
+          <a:fontRef idx="minor">
+            <a:schemeClr val="tx1"/>
+          </a:fontRef>
+        </p:style>
+      </p:cxnSp>
+      <p:sp>
+        <p:nvSpPr>
+          <p:cNvPr id="121" name="Rectangle 120">
+            <a:extLst>
+              <a:ext uri="{FF2B5EF4-FFF2-40B4-BE49-F238E27FC236}">
+                <a16:creationId xmlns:a16="http://schemas.microsoft.com/office/drawing/2014/main" id="{4CA94F8E-22E0-6083-6063-52B32FB6DCEA}"/>
+              </a:ext>
+            </a:extLst>
+          </p:cNvPr>
+          <p:cNvSpPr/>
+          <p:nvPr/>
+        </p:nvSpPr>
+        <p:spPr>
+          <a:xfrm>
+            <a:off x="5789352" y="4715543"/>
+            <a:ext cx="1411070" cy="346917"/>
+          </a:xfrm>
+          <a:prstGeom prst="rect">
+            <a:avLst/>
+          </a:prstGeom>
+        </p:spPr>
+        <p:style>
+          <a:lnRef idx="2">
+            <a:schemeClr val="accent1">
+              <a:shade val="50000"/>
+            </a:schemeClr>
+          </a:lnRef>
+          <a:fillRef idx="1">
+            <a:schemeClr val="accent1"/>
+          </a:fillRef>
+          <a:effectRef idx="0">
+            <a:schemeClr val="accent1"/>
+          </a:effectRef>
+          <a:fontRef idx="minor">
+            <a:schemeClr val="lt1"/>
+          </a:fontRef>
+        </p:style>
+        <p:txBody>
+          <a:bodyPr rtlCol="0" anchor="ctr"/>
+          <a:lstStyle/>
+          <a:p>
+            <a:r>
+              <a:rPr lang="en-US" sz="1200" b="1" dirty="0"/>
+              <a:t>MCQ-GPT-Robot data manager </a:t>
+            </a:r>
+            <a:endParaRPr lang="en-SG" sz="1200" b="1" dirty="0"/>
+          </a:p>
+        </p:txBody>
+      </p:sp>
+      <p:cxnSp>
+        <p:nvCxnSpPr>
+          <p:cNvPr id="122" name="Straight Arrow Connector 121">
+            <a:extLst>
+              <a:ext uri="{FF2B5EF4-FFF2-40B4-BE49-F238E27FC236}">
+                <a16:creationId xmlns:a16="http://schemas.microsoft.com/office/drawing/2014/main" id="{6969618C-108A-1506-49B8-1F0F52228585}"/>
+              </a:ext>
+            </a:extLst>
+          </p:cNvPr>
+          <p:cNvCxnSpPr>
+            <a:cxnSpLocks/>
+            <a:stCxn id="117" idx="3"/>
+            <a:endCxn id="121" idx="1"/>
+          </p:cNvCxnSpPr>
+          <p:nvPr/>
+        </p:nvCxnSpPr>
+        <p:spPr>
+          <a:xfrm flipV="1">
+            <a:off x="5347298" y="4889002"/>
+            <a:ext cx="442054" cy="0"/>
+          </a:xfrm>
+          <a:prstGeom prst="straightConnector1">
+            <a:avLst/>
+          </a:prstGeom>
+          <a:ln>
+            <a:solidFill>
+              <a:schemeClr val="tx1"/>
+            </a:solidFill>
+            <a:tailEnd type="triangle"/>
+          </a:ln>
+        </p:spPr>
+        <p:style>
+          <a:lnRef idx="1">
+            <a:schemeClr val="accent1"/>
+          </a:lnRef>
+          <a:fillRef idx="0">
+            <a:schemeClr val="accent1"/>
+          </a:fillRef>
+          <a:effectRef idx="0">
+            <a:schemeClr val="accent1"/>
+          </a:effectRef>
+          <a:fontRef idx="minor">
+            <a:schemeClr val="tx1"/>
+          </a:fontRef>
+        </p:style>
+      </p:cxnSp>
+      <p:cxnSp>
+        <p:nvCxnSpPr>
+          <p:cNvPr id="125" name="Straight Arrow Connector 124">
+            <a:extLst>
+              <a:ext uri="{FF2B5EF4-FFF2-40B4-BE49-F238E27FC236}">
+                <a16:creationId xmlns:a16="http://schemas.microsoft.com/office/drawing/2014/main" id="{FFECCAAB-DC92-0CC8-CCF5-82F78B53FDD9}"/>
+              </a:ext>
+            </a:extLst>
+          </p:cNvPr>
+          <p:cNvCxnSpPr>
+            <a:cxnSpLocks/>
+          </p:cNvCxnSpPr>
+          <p:nvPr/>
+        </p:nvCxnSpPr>
+        <p:spPr>
+          <a:xfrm>
+            <a:off x="6089602" y="2448938"/>
+            <a:ext cx="0" cy="2266605"/>
+          </a:xfrm>
+          <a:prstGeom prst="straightConnector1">
+            <a:avLst/>
+          </a:prstGeom>
+          <a:ln>
+            <a:solidFill>
+              <a:schemeClr val="bg1">
+                <a:lumMod val="65000"/>
+              </a:schemeClr>
+            </a:solidFill>
+            <a:prstDash val="dash"/>
+            <a:tailEnd type="triangle"/>
+          </a:ln>
+        </p:spPr>
+        <p:style>
+          <a:lnRef idx="1">
+            <a:schemeClr val="accent1"/>
+          </a:lnRef>
+          <a:fillRef idx="0">
+            <a:schemeClr val="accent1"/>
+          </a:fillRef>
+          <a:effectRef idx="0">
+            <a:schemeClr val="accent1"/>
+          </a:effectRef>
+          <a:fontRef idx="minor">
+            <a:schemeClr val="tx1"/>
+          </a:fontRef>
+        </p:style>
+      </p:cxnSp>
+      <p:cxnSp>
+        <p:nvCxnSpPr>
+          <p:cNvPr id="1027" name="Connector: Elbow 1026">
+            <a:extLst>
+              <a:ext uri="{FF2B5EF4-FFF2-40B4-BE49-F238E27FC236}">
+                <a16:creationId xmlns:a16="http://schemas.microsoft.com/office/drawing/2014/main" id="{DE2FCE88-48EF-E194-11D9-6220C4D22C77}"/>
+              </a:ext>
+            </a:extLst>
+          </p:cNvPr>
+          <p:cNvCxnSpPr>
+            <a:stCxn id="92" idx="3"/>
+            <a:endCxn id="121" idx="0"/>
+          </p:cNvCxnSpPr>
+          <p:nvPr/>
+        </p:nvCxnSpPr>
+        <p:spPr>
+          <a:xfrm>
+            <a:off x="5798920" y="4275029"/>
+            <a:ext cx="695967" cy="440514"/>
+          </a:xfrm>
+          <a:prstGeom prst="bentConnector2">
+            <a:avLst/>
+          </a:prstGeom>
+          <a:ln>
+            <a:solidFill>
+              <a:schemeClr val="bg1">
+                <a:lumMod val="65000"/>
+              </a:schemeClr>
+            </a:solidFill>
+            <a:prstDash val="dash"/>
+            <a:headEnd type="triangle"/>
+            <a:tailEnd type="triangle"/>
+          </a:ln>
+        </p:spPr>
+        <p:style>
+          <a:lnRef idx="1">
+            <a:schemeClr val="dk1"/>
+          </a:lnRef>
+          <a:fillRef idx="0">
+            <a:schemeClr val="dk1"/>
+          </a:fillRef>
+          <a:effectRef idx="0">
+            <a:schemeClr val="dk1"/>
+          </a:effectRef>
+          <a:fontRef idx="minor">
+            <a:schemeClr val="tx1"/>
+          </a:fontRef>
+        </p:style>
+      </p:cxnSp>
+      <p:cxnSp>
+        <p:nvCxnSpPr>
+          <p:cNvPr id="1028" name="Straight Arrow Connector 1027">
+            <a:extLst>
+              <a:ext uri="{FF2B5EF4-FFF2-40B4-BE49-F238E27FC236}">
+                <a16:creationId xmlns:a16="http://schemas.microsoft.com/office/drawing/2014/main" id="{8C2C7F6C-9AD5-C79C-3F78-597AB67BB04F}"/>
+              </a:ext>
+            </a:extLst>
+          </p:cNvPr>
+          <p:cNvCxnSpPr>
+            <a:cxnSpLocks/>
+            <a:endCxn id="1029" idx="2"/>
+          </p:cNvCxnSpPr>
+          <p:nvPr/>
+        </p:nvCxnSpPr>
+        <p:spPr>
+          <a:xfrm>
+            <a:off x="7218654" y="4874860"/>
+            <a:ext cx="1240604" cy="0"/>
+          </a:xfrm>
+          <a:prstGeom prst="straightConnector1">
+            <a:avLst/>
+          </a:prstGeom>
+          <a:ln>
+            <a:solidFill>
+              <a:schemeClr val="tx1"/>
+            </a:solidFill>
+            <a:tailEnd type="triangle"/>
+          </a:ln>
+        </p:spPr>
+        <p:style>
+          <a:lnRef idx="1">
+            <a:schemeClr val="accent1"/>
+          </a:lnRef>
+          <a:fillRef idx="0">
+            <a:schemeClr val="accent1"/>
+          </a:fillRef>
+          <a:effectRef idx="0">
+            <a:schemeClr val="accent1"/>
+          </a:effectRef>
+          <a:fontRef idx="minor">
+            <a:schemeClr val="tx1"/>
+          </a:fontRef>
+        </p:style>
+      </p:cxnSp>
+      <p:sp>
+        <p:nvSpPr>
+          <p:cNvPr id="1029" name="Cylinder 1028">
+            <a:extLst>
+              <a:ext uri="{FF2B5EF4-FFF2-40B4-BE49-F238E27FC236}">
+                <a16:creationId xmlns:a16="http://schemas.microsoft.com/office/drawing/2014/main" id="{8FED740E-238C-35BD-898C-D2C9820842A3}"/>
+              </a:ext>
+            </a:extLst>
+          </p:cNvPr>
+          <p:cNvSpPr/>
+          <p:nvPr/>
+        </p:nvSpPr>
+        <p:spPr>
+          <a:xfrm>
+            <a:off x="8459258" y="4694373"/>
+            <a:ext cx="868907" cy="400110"/>
+          </a:xfrm>
+          <a:prstGeom prst="can">
+            <a:avLst/>
+          </a:prstGeom>
+        </p:spPr>
+        <p:style>
+          <a:lnRef idx="2">
+            <a:schemeClr val="accent1">
+              <a:shade val="15000"/>
+            </a:schemeClr>
+          </a:lnRef>
+          <a:fillRef idx="1">
+            <a:schemeClr val="accent1"/>
+          </a:fillRef>
+          <a:effectRef idx="0">
+            <a:schemeClr val="accent1"/>
+          </a:effectRef>
+          <a:fontRef idx="minor">
+            <a:schemeClr val="lt1"/>
+          </a:fontRef>
+        </p:style>
+        <p:txBody>
+          <a:bodyPr rtlCol="0" anchor="ctr"/>
+          <a:lstStyle/>
+          <a:p>
+            <a:pPr algn="ctr"/>
+            <a:r>
+              <a:rPr lang="en-US" sz="1200" dirty="0"/>
+              <a:t>Result DB</a:t>
+            </a:r>
+            <a:endParaRPr lang="en-SG" sz="1200" dirty="0"/>
+          </a:p>
+        </p:txBody>
+      </p:sp>
+      <p:sp>
+        <p:nvSpPr>
+          <p:cNvPr id="1030" name="TextBox 1029">
+            <a:extLst>
+              <a:ext uri="{FF2B5EF4-FFF2-40B4-BE49-F238E27FC236}">
+                <a16:creationId xmlns:a16="http://schemas.microsoft.com/office/drawing/2014/main" id="{D76D359F-22CA-E89B-B5AC-65AF54B5FD50}"/>
+              </a:ext>
+            </a:extLst>
+          </p:cNvPr>
+          <p:cNvSpPr txBox="1"/>
+          <p:nvPr/>
+        </p:nvSpPr>
+        <p:spPr>
+          <a:xfrm>
+            <a:off x="7448509" y="4431445"/>
+            <a:ext cx="1009692" cy="400110"/>
+          </a:xfrm>
+          <a:prstGeom prst="rect">
+            <a:avLst/>
+          </a:prstGeom>
+          <a:noFill/>
+        </p:spPr>
+        <p:txBody>
+          <a:bodyPr wrap="square" rtlCol="0">
+            <a:spAutoFit/>
+          </a:bodyPr>
+          <a:lstStyle/>
+          <a:p>
+            <a:r>
+              <a:rPr lang="en-US" sz="1000" dirty="0"/>
+              <a:t>Archive result to the result DB</a:t>
+            </a:r>
+            <a:endParaRPr lang="en-SG" sz="1000" dirty="0"/>
+          </a:p>
+        </p:txBody>
+      </p:sp>
+      <p:cxnSp>
+        <p:nvCxnSpPr>
+          <p:cNvPr id="1033" name="Connector: Elbow 1032">
+            <a:extLst>
+              <a:ext uri="{FF2B5EF4-FFF2-40B4-BE49-F238E27FC236}">
+                <a16:creationId xmlns:a16="http://schemas.microsoft.com/office/drawing/2014/main" id="{627F0230-AFE6-50A6-3194-E11FAD872565}"/>
+              </a:ext>
+            </a:extLst>
+          </p:cNvPr>
+          <p:cNvCxnSpPr>
+            <a:stCxn id="41" idx="2"/>
+            <a:endCxn id="3" idx="1"/>
+          </p:cNvCxnSpPr>
+          <p:nvPr/>
+        </p:nvCxnSpPr>
+        <p:spPr>
+          <a:xfrm rot="16200000" flipH="1">
+            <a:off x="4011330" y="1525352"/>
+            <a:ext cx="382173" cy="1149084"/>
+          </a:xfrm>
+          <a:prstGeom prst="bentConnector2">
+            <a:avLst/>
+          </a:prstGeom>
+          <a:ln w="19050">
+            <a:solidFill>
+              <a:schemeClr val="accent6">
+                <a:lumMod val="75000"/>
+              </a:schemeClr>
+            </a:solidFill>
+            <a:headEnd type="triangle"/>
+            <a:tailEnd type="triangle"/>
+          </a:ln>
+        </p:spPr>
+        <p:style>
+          <a:lnRef idx="1">
+            <a:schemeClr val="accent1"/>
+          </a:lnRef>
+          <a:fillRef idx="0">
+            <a:schemeClr val="accent1"/>
+          </a:fillRef>
+          <a:effectRef idx="0">
+            <a:schemeClr val="accent1"/>
+          </a:effectRef>
+          <a:fontRef idx="minor">
+            <a:schemeClr val="tx1"/>
+          </a:fontRef>
+        </p:style>
+      </p:cxnSp>
+      <p:cxnSp>
+        <p:nvCxnSpPr>
+          <p:cNvPr id="1034" name="Connector: Elbow 1033">
+            <a:extLst>
+              <a:ext uri="{FF2B5EF4-FFF2-40B4-BE49-F238E27FC236}">
+                <a16:creationId xmlns:a16="http://schemas.microsoft.com/office/drawing/2014/main" id="{7136428F-BC15-128F-D508-7B4F6FE85F6E}"/>
+              </a:ext>
+            </a:extLst>
+          </p:cNvPr>
+          <p:cNvCxnSpPr>
+            <a:cxnSpLocks/>
+            <a:stCxn id="41" idx="2"/>
+            <a:endCxn id="92" idx="1"/>
+          </p:cNvCxnSpPr>
+          <p:nvPr/>
+        </p:nvCxnSpPr>
+        <p:spPr>
+          <a:xfrm rot="16200000" flipH="1">
+            <a:off x="2778709" y="2757972"/>
+            <a:ext cx="2366221" cy="667891"/>
+          </a:xfrm>
+          <a:prstGeom prst="bentConnector2">
+            <a:avLst/>
+          </a:prstGeom>
+          <a:ln w="19050">
+            <a:solidFill>
+              <a:schemeClr val="accent6">
+                <a:lumMod val="75000"/>
+              </a:schemeClr>
+            </a:solidFill>
+            <a:headEnd type="triangle"/>
+            <a:tailEnd type="triangle"/>
+          </a:ln>
+        </p:spPr>
+        <p:style>
+          <a:lnRef idx="1">
+            <a:schemeClr val="accent1"/>
+          </a:lnRef>
+          <a:fillRef idx="0">
+            <a:schemeClr val="accent1"/>
+          </a:fillRef>
+          <a:effectRef idx="0">
+            <a:schemeClr val="accent1"/>
+          </a:effectRef>
+          <a:fontRef idx="minor">
+            <a:schemeClr val="tx1"/>
+          </a:fontRef>
+        </p:style>
+      </p:cxnSp>
+      <p:pic>
+        <p:nvPicPr>
+          <p:cNvPr id="1041" name="Picture 1040">
+            <a:extLst>
+              <a:ext uri="{FF2B5EF4-FFF2-40B4-BE49-F238E27FC236}">
+                <a16:creationId xmlns:a16="http://schemas.microsoft.com/office/drawing/2014/main" id="{0CAAC8CA-D7F3-EEE7-D229-2F736DC0ED13}"/>
+              </a:ext>
+            </a:extLst>
+          </p:cNvPr>
+          <p:cNvPicPr>
+            <a:picLocks noChangeAspect="1"/>
+          </p:cNvPicPr>
+          <p:nvPr/>
+        </p:nvPicPr>
+        <p:blipFill>
+          <a:blip r:embed="rId17"/>
+          <a:stretch>
+            <a:fillRect/>
+          </a:stretch>
+        </p:blipFill>
+        <p:spPr>
+          <a:xfrm>
+            <a:off x="1234612" y="4139830"/>
+            <a:ext cx="2037359" cy="1271215"/>
+          </a:xfrm>
+          <a:prstGeom prst="rect">
+            <a:avLst/>
+          </a:prstGeom>
+          <a:ln w="9525">
+            <a:solidFill>
+              <a:schemeClr val="tx1"/>
+            </a:solidFill>
+          </a:ln>
+        </p:spPr>
+      </p:pic>
+      <p:pic>
+        <p:nvPicPr>
+          <p:cNvPr id="1043" name="Picture 1042">
+            <a:extLst>
+              <a:ext uri="{FF2B5EF4-FFF2-40B4-BE49-F238E27FC236}">
+                <a16:creationId xmlns:a16="http://schemas.microsoft.com/office/drawing/2014/main" id="{F560E858-9C09-1A51-F7B1-1156367DC4C9}"/>
+              </a:ext>
+            </a:extLst>
+          </p:cNvPr>
+          <p:cNvPicPr>
+            <a:picLocks noChangeAspect="1"/>
+          </p:cNvPicPr>
+          <p:nvPr/>
+        </p:nvPicPr>
+        <p:blipFill>
+          <a:blip r:embed="rId18"/>
+          <a:stretch>
+            <a:fillRect/>
+          </a:stretch>
+        </p:blipFill>
+        <p:spPr>
+          <a:xfrm>
+            <a:off x="1226576" y="2476718"/>
+            <a:ext cx="2045395" cy="1288599"/>
+          </a:xfrm>
+          <a:prstGeom prst="rect">
+            <a:avLst/>
+          </a:prstGeom>
+          <a:ln w="6350">
+            <a:solidFill>
+              <a:schemeClr val="tx1"/>
+            </a:solidFill>
+          </a:ln>
+        </p:spPr>
+      </p:pic>
+      <p:sp>
+        <p:nvSpPr>
+          <p:cNvPr id="1044" name="Rectangle 1043">
+            <a:extLst>
+              <a:ext uri="{FF2B5EF4-FFF2-40B4-BE49-F238E27FC236}">
+                <a16:creationId xmlns:a16="http://schemas.microsoft.com/office/drawing/2014/main" id="{03D775C8-B1F2-7557-E7BC-A44E07F550E1}"/>
+              </a:ext>
+            </a:extLst>
+          </p:cNvPr>
+          <p:cNvSpPr/>
+          <p:nvPr/>
+        </p:nvSpPr>
+        <p:spPr>
+          <a:xfrm>
+            <a:off x="4003200" y="684899"/>
+            <a:ext cx="3475552" cy="4691366"/>
+          </a:xfrm>
+          <a:prstGeom prst="rect">
+            <a:avLst/>
+          </a:prstGeom>
+          <a:noFill/>
+          <a:ln w="9525" cap="flat" cmpd="sng" algn="ctr">
+            <a:solidFill>
+              <a:schemeClr val="accent1"/>
+            </a:solidFill>
+            <a:prstDash val="dash"/>
+            <a:round/>
+            <a:headEnd type="none" w="med" len="med"/>
+            <a:tailEnd type="none" w="med" len="med"/>
+          </a:ln>
+        </p:spPr>
+        <p:style>
+          <a:lnRef idx="0">
+            <a:scrgbClr r="0" g="0" b="0"/>
+          </a:lnRef>
+          <a:fillRef idx="0">
+            <a:scrgbClr r="0" g="0" b="0"/>
+          </a:fillRef>
+          <a:effectRef idx="0">
+            <a:scrgbClr r="0" g="0" b="0"/>
+          </a:effectRef>
+          <a:fontRef idx="minor">
+            <a:schemeClr val="dk1"/>
+          </a:fontRef>
+        </p:style>
+        <p:txBody>
+          <a:bodyPr rtlCol="0" anchor="ctr"/>
+          <a:lstStyle/>
+          <a:p>
+            <a:pPr algn="ctr"/>
+            <a:endParaRPr lang="en-SG" dirty="0">
+              <a:ln>
+                <a:solidFill>
+                  <a:schemeClr val="tx1"/>
+                </a:solidFill>
+                <a:prstDash val="sysDash"/>
+              </a:ln>
+            </a:endParaRPr>
+          </a:p>
+        </p:txBody>
+      </p:sp>
+      <p:sp>
+        <p:nvSpPr>
+          <p:cNvPr id="1045" name="TextBox 1044">
+            <a:extLst>
+              <a:ext uri="{FF2B5EF4-FFF2-40B4-BE49-F238E27FC236}">
+                <a16:creationId xmlns:a16="http://schemas.microsoft.com/office/drawing/2014/main" id="{A2E1D6CD-7E7D-4922-81EF-1FEF2136BE20}"/>
+              </a:ext>
+            </a:extLst>
+          </p:cNvPr>
+          <p:cNvSpPr txBox="1"/>
+          <p:nvPr/>
+        </p:nvSpPr>
+        <p:spPr>
+          <a:xfrm>
+            <a:off x="1128563" y="2154551"/>
+            <a:ext cx="1722885" cy="253916"/>
+          </a:xfrm>
+          <a:prstGeom prst="rect">
+            <a:avLst/>
+          </a:prstGeom>
+          <a:noFill/>
+        </p:spPr>
+        <p:txBody>
+          <a:bodyPr wrap="square">
+            <a:spAutoFit/>
+          </a:bodyPr>
+          <a:lstStyle/>
+          <a:p>
+            <a:r>
+              <a:rPr lang="en-US" sz="1050" b="1" dirty="0">
+                <a:solidFill>
+                  <a:schemeClr val="tx1">
+                    <a:lumMod val="75000"/>
+                    <a:lumOff val="25000"/>
+                  </a:schemeClr>
+                </a:solidFill>
+              </a:rPr>
+              <a:t>Web User Interface </a:t>
+            </a:r>
+            <a:endParaRPr lang="en-SG" sz="1050" b="1" dirty="0">
+              <a:solidFill>
+                <a:schemeClr val="tx1">
+                  <a:lumMod val="75000"/>
+                  <a:lumOff val="25000"/>
+                </a:schemeClr>
+              </a:solidFill>
+            </a:endParaRPr>
+          </a:p>
+        </p:txBody>
+      </p:sp>
+      <p:sp>
+        <p:nvSpPr>
+          <p:cNvPr id="1046" name="TextBox 1045">
+            <a:extLst>
+              <a:ext uri="{FF2B5EF4-FFF2-40B4-BE49-F238E27FC236}">
+                <a16:creationId xmlns:a16="http://schemas.microsoft.com/office/drawing/2014/main" id="{B8DA41D3-53BC-7B7F-79D4-D416D8D121E9}"/>
+              </a:ext>
+            </a:extLst>
+          </p:cNvPr>
+          <p:cNvSpPr txBox="1"/>
+          <p:nvPr/>
+        </p:nvSpPr>
+        <p:spPr>
+          <a:xfrm>
+            <a:off x="1163709" y="3826651"/>
+            <a:ext cx="2008956" cy="253916"/>
+          </a:xfrm>
+          <a:prstGeom prst="rect">
+            <a:avLst/>
+          </a:prstGeom>
+          <a:noFill/>
+        </p:spPr>
+        <p:txBody>
+          <a:bodyPr wrap="square">
+            <a:spAutoFit/>
+          </a:bodyPr>
+          <a:lstStyle/>
+          <a:p>
+            <a:r>
+              <a:rPr lang="en-US" sz="1050" b="1" dirty="0">
+                <a:solidFill>
+                  <a:schemeClr val="tx1">
+                    <a:lumMod val="75000"/>
+                    <a:lumOff val="25000"/>
+                  </a:schemeClr>
+                </a:solidFill>
+              </a:rPr>
+              <a:t>Command line User  interface </a:t>
+            </a:r>
+            <a:endParaRPr lang="en-SG" sz="1050" b="1" dirty="0">
+              <a:solidFill>
+                <a:schemeClr val="tx1">
+                  <a:lumMod val="75000"/>
+                  <a:lumOff val="25000"/>
+                </a:schemeClr>
+              </a:solidFill>
+            </a:endParaRPr>
+          </a:p>
+        </p:txBody>
+      </p:sp>
+      <p:cxnSp>
+        <p:nvCxnSpPr>
+          <p:cNvPr id="1048" name="Straight Arrow Connector 1047">
+            <a:extLst>
+              <a:ext uri="{FF2B5EF4-FFF2-40B4-BE49-F238E27FC236}">
+                <a16:creationId xmlns:a16="http://schemas.microsoft.com/office/drawing/2014/main" id="{BB8AAD24-693E-847A-C747-8148E183E240}"/>
+              </a:ext>
+            </a:extLst>
+          </p:cNvPr>
+          <p:cNvCxnSpPr>
+            <a:stCxn id="1044" idx="1"/>
+          </p:cNvCxnSpPr>
+          <p:nvPr/>
+        </p:nvCxnSpPr>
+        <p:spPr>
+          <a:xfrm flipH="1">
+            <a:off x="3297384" y="3030582"/>
+            <a:ext cx="705816" cy="0"/>
+          </a:xfrm>
+          <a:prstGeom prst="straightConnector1">
+            <a:avLst/>
+          </a:prstGeom>
+          <a:ln>
+            <a:prstDash val="dash"/>
+            <a:tailEnd type="triangle"/>
+          </a:ln>
+        </p:spPr>
+        <p:style>
+          <a:lnRef idx="1">
+            <a:schemeClr val="accent1"/>
+          </a:lnRef>
+          <a:fillRef idx="0">
+            <a:schemeClr val="accent1"/>
+          </a:fillRef>
+          <a:effectRef idx="0">
+            <a:schemeClr val="accent1"/>
+          </a:effectRef>
+          <a:fontRef idx="minor">
+            <a:schemeClr val="tx1"/>
+          </a:fontRef>
+        </p:style>
+      </p:cxnSp>
+      <p:cxnSp>
+        <p:nvCxnSpPr>
+          <p:cNvPr id="1049" name="Straight Arrow Connector 1048">
+            <a:extLst>
+              <a:ext uri="{FF2B5EF4-FFF2-40B4-BE49-F238E27FC236}">
+                <a16:creationId xmlns:a16="http://schemas.microsoft.com/office/drawing/2014/main" id="{250A38C5-A00A-310F-2ED8-50AB4B6DF7F6}"/>
+              </a:ext>
+            </a:extLst>
+          </p:cNvPr>
+          <p:cNvCxnSpPr/>
+          <p:nvPr/>
+        </p:nvCxnSpPr>
+        <p:spPr>
+          <a:xfrm flipH="1">
+            <a:off x="3271971" y="4829211"/>
+            <a:ext cx="705816" cy="0"/>
+          </a:xfrm>
+          <a:prstGeom prst="straightConnector1">
+            <a:avLst/>
+          </a:prstGeom>
+          <a:ln>
+            <a:prstDash val="dash"/>
+            <a:tailEnd type="triangle"/>
+          </a:ln>
+        </p:spPr>
+        <p:style>
+          <a:lnRef idx="1">
+            <a:schemeClr val="accent1"/>
+          </a:lnRef>
+          <a:fillRef idx="0">
+            <a:schemeClr val="accent1"/>
+          </a:fillRef>
+          <a:effectRef idx="0">
+            <a:schemeClr val="accent1"/>
+          </a:effectRef>
+          <a:fontRef idx="minor">
+            <a:schemeClr val="tx1"/>
+          </a:fontRef>
+        </p:style>
+      </p:cxnSp>
+      <p:cxnSp>
+        <p:nvCxnSpPr>
+          <p:cNvPr id="1050" name="Straight Arrow Connector 1049">
+            <a:extLst>
+              <a:ext uri="{FF2B5EF4-FFF2-40B4-BE49-F238E27FC236}">
+                <a16:creationId xmlns:a16="http://schemas.microsoft.com/office/drawing/2014/main" id="{E05F3B7A-752C-AC50-28C0-C1799547033F}"/>
+              </a:ext>
+            </a:extLst>
+          </p:cNvPr>
+          <p:cNvCxnSpPr>
+            <a:cxnSpLocks/>
+          </p:cNvCxnSpPr>
+          <p:nvPr/>
+        </p:nvCxnSpPr>
+        <p:spPr>
+          <a:xfrm>
+            <a:off x="1258343" y="1030923"/>
+            <a:ext cx="409885" cy="0"/>
+          </a:xfrm>
+          <a:prstGeom prst="straightConnector1">
+            <a:avLst/>
+          </a:prstGeom>
+          <a:ln>
+            <a:solidFill>
+              <a:schemeClr val="bg1">
+                <a:lumMod val="65000"/>
+              </a:schemeClr>
+            </a:solidFill>
+            <a:prstDash val="dash"/>
+            <a:tailEnd type="triangle"/>
+          </a:ln>
+        </p:spPr>
+        <p:style>
+          <a:lnRef idx="1">
+            <a:schemeClr val="accent1"/>
+          </a:lnRef>
+          <a:fillRef idx="0">
+            <a:schemeClr val="accent1"/>
+          </a:fillRef>
+          <a:effectRef idx="0">
+            <a:schemeClr val="accent1"/>
+          </a:effectRef>
+          <a:fontRef idx="minor">
+            <a:schemeClr val="tx1"/>
+          </a:fontRef>
+        </p:style>
+      </p:cxnSp>
+      <p:sp>
+        <p:nvSpPr>
+          <p:cNvPr id="1052" name="TextBox 1051">
+            <a:extLst>
+              <a:ext uri="{FF2B5EF4-FFF2-40B4-BE49-F238E27FC236}">
+                <a16:creationId xmlns:a16="http://schemas.microsoft.com/office/drawing/2014/main" id="{E0449EF3-CF60-6A6D-AA55-B8711DA646B3}"/>
+              </a:ext>
+            </a:extLst>
+          </p:cNvPr>
+          <p:cNvSpPr txBox="1"/>
+          <p:nvPr/>
+        </p:nvSpPr>
+        <p:spPr>
+          <a:xfrm>
+            <a:off x="7801457" y="575651"/>
+            <a:ext cx="2693787" cy="369332"/>
+          </a:xfrm>
+          <a:prstGeom prst="rect">
+            <a:avLst/>
+          </a:prstGeom>
+          <a:noFill/>
+        </p:spPr>
+        <p:txBody>
+          <a:bodyPr wrap="square">
+            <a:spAutoFit/>
+          </a:bodyPr>
+          <a:lstStyle/>
+          <a:p>
+            <a:r>
+              <a:rPr lang="en-US" b="1" dirty="0">
+                <a:solidFill>
+                  <a:schemeClr val="tx1">
+                    <a:lumMod val="75000"/>
+                    <a:lumOff val="25000"/>
+                  </a:schemeClr>
+                </a:solidFill>
+              </a:rPr>
+              <a:t>System Workflow </a:t>
+            </a:r>
+            <a:endParaRPr lang="en-SG" b="1" dirty="0">
+              <a:solidFill>
+                <a:schemeClr val="tx1">
+                  <a:lumMod val="75000"/>
+                  <a:lumOff val="25000"/>
+                </a:schemeClr>
+              </a:solidFill>
+            </a:endParaRPr>
+          </a:p>
+        </p:txBody>
+      </p:sp>
+      <p:sp>
+        <p:nvSpPr>
+          <p:cNvPr id="1053" name="Rectangle 1052">
+            <a:extLst>
+              <a:ext uri="{FF2B5EF4-FFF2-40B4-BE49-F238E27FC236}">
+                <a16:creationId xmlns:a16="http://schemas.microsoft.com/office/drawing/2014/main" id="{102EF1A3-402D-E864-5E55-3849BD5DE719}"/>
+              </a:ext>
+            </a:extLst>
+          </p:cNvPr>
+          <p:cNvSpPr/>
+          <p:nvPr/>
+        </p:nvSpPr>
+        <p:spPr>
+          <a:xfrm>
+            <a:off x="1012335" y="520803"/>
+            <a:ext cx="9521404" cy="5015838"/>
+          </a:xfrm>
+          <a:prstGeom prst="rect">
+            <a:avLst/>
+          </a:prstGeom>
+          <a:noFill/>
+          <a:ln w="19050" cap="flat" cmpd="sng" algn="ctr">
+            <a:solidFill>
+              <a:schemeClr val="dk1"/>
+            </a:solidFill>
+            <a:prstDash val="sysDash"/>
+            <a:round/>
+            <a:headEnd type="none" w="med" len="med"/>
+            <a:tailEnd type="none" w="med" len="med"/>
+          </a:ln>
+        </p:spPr>
+        <p:style>
+          <a:lnRef idx="0">
+            <a:scrgbClr r="0" g="0" b="0"/>
+          </a:lnRef>
+          <a:fillRef idx="0">
+            <a:scrgbClr r="0" g="0" b="0"/>
+          </a:fillRef>
+          <a:effectRef idx="0">
+            <a:scrgbClr r="0" g="0" b="0"/>
+          </a:effectRef>
+          <a:fontRef idx="minor">
+            <a:schemeClr val="dk1"/>
+          </a:fontRef>
+        </p:style>
+        <p:txBody>
+          <a:bodyPr rtlCol="0" anchor="ctr"/>
+          <a:lstStyle/>
+          <a:p>
+            <a:pPr algn="ctr"/>
+            <a:endParaRPr lang="en-SG" dirty="0">
+              <a:ln>
+                <a:solidFill>
+                  <a:schemeClr val="tx1"/>
+                </a:solidFill>
+                <a:prstDash val="sysDash"/>
+              </a:ln>
+            </a:endParaRPr>
+          </a:p>
+        </p:txBody>
+      </p:sp>
     </p:spTree>
     <p:extLst>
       <p:ext uri="{BB962C8B-B14F-4D97-AF65-F5344CB8AC3E}">
-        <p14:creationId xmlns:p14="http://schemas.microsoft.com/office/powerpoint/2010/main" val="559189620"/>
+        <p14:creationId xmlns:p14="http://schemas.microsoft.com/office/powerpoint/2010/main" val="3723481879"/>
       </p:ext>
     </p:extLst>
   </p:cSld>

</xml_diff>